<commit_message>
update ppt and some code
</commit_message>
<xml_diff>
--- a/ppt/Interpretation-9-20.pptx
+++ b/ppt/Interpretation-9-20.pptx
@@ -4,6 +4,9 @@
   <p:sldMasterIdLst>
     <p:sldMasterId id="2147483648" r:id="rId1"/>
   </p:sldMasterIdLst>
+  <p:notesMasterIdLst>
+    <p:notesMasterId r:id="rId13"/>
+  </p:notesMasterIdLst>
   <p:sldIdLst>
     <p:sldId id="256" r:id="rId2"/>
     <p:sldId id="258" r:id="rId3"/>
@@ -11,6 +14,11 @@
     <p:sldId id="259" r:id="rId5"/>
     <p:sldId id="260" r:id="rId6"/>
     <p:sldId id="262" r:id="rId7"/>
+    <p:sldId id="263" r:id="rId8"/>
+    <p:sldId id="264" r:id="rId9"/>
+    <p:sldId id="265" r:id="rId10"/>
+    <p:sldId id="266" r:id="rId11"/>
+    <p:sldId id="267" r:id="rId12"/>
   </p:sldIdLst>
   <p:sldSz cx="12192000" cy="6858000"/>
   <p:notesSz cx="6858000" cy="9144000"/>
@@ -109,7 +117,548 @@
       </a:defRPr>
     </a:lvl9pPr>
   </p:defaultTextStyle>
+  <p:extLst>
+    <p:ext uri="{521415D9-36F7-43E2-AB2F-B90AF26B5E84}">
+      <p14:sectionLst xmlns:p14="http://schemas.microsoft.com/office/powerpoint/2010/main">
+        <p14:section name="默认节" id="{00CC5C93-8BD6-44E3-BDAA-3784F2110946}">
+          <p14:sldIdLst>
+            <p14:sldId id="256"/>
+            <p14:sldId id="258"/>
+            <p14:sldId id="261"/>
+            <p14:sldId id="259"/>
+            <p14:sldId id="260"/>
+            <p14:sldId id="262"/>
+            <p14:sldId id="263"/>
+            <p14:sldId id="264"/>
+            <p14:sldId id="265"/>
+            <p14:sldId id="266"/>
+            <p14:sldId id="267"/>
+          </p14:sldIdLst>
+        </p14:section>
+      </p14:sectionLst>
+    </p:ext>
+    <p:ext uri="{EFAFB233-063F-42B5-8137-9DF3F51BA10A}">
+      <p15:sldGuideLst xmlns:p15="http://schemas.microsoft.com/office/powerpoint/2012/main"/>
+    </p:ext>
+  </p:extLst>
 </p:presentation>
+</file>
+
+<file path=ppt/notesMasters/notesMaster1.xml><?xml version="1.0" encoding="utf-8"?>
+<p:notesMaster xmlns:a="http://schemas.openxmlformats.org/drawingml/2006/main" xmlns:r="http://schemas.openxmlformats.org/officeDocument/2006/relationships" xmlns:p="http://schemas.openxmlformats.org/presentationml/2006/main">
+  <p:cSld>
+    <p:bg>
+      <p:bgRef idx="1001">
+        <a:schemeClr val="bg1"/>
+      </p:bgRef>
+    </p:bg>
+    <p:spTree>
+      <p:nvGrpSpPr>
+        <p:cNvPr id="1" name=""/>
+        <p:cNvGrpSpPr/>
+        <p:nvPr/>
+      </p:nvGrpSpPr>
+      <p:grpSpPr>
+        <a:xfrm>
+          <a:off x="0" y="0"/>
+          <a:ext cx="0" cy="0"/>
+          <a:chOff x="0" y="0"/>
+          <a:chExt cx="0" cy="0"/>
+        </a:xfrm>
+      </p:grpSpPr>
+      <p:sp>
+        <p:nvSpPr>
+          <p:cNvPr id="2" name="页眉占位符 1"/>
+          <p:cNvSpPr>
+            <a:spLocks noGrp="1"/>
+          </p:cNvSpPr>
+          <p:nvPr>
+            <p:ph type="hdr" sz="quarter"/>
+          </p:nvPr>
+        </p:nvSpPr>
+        <p:spPr>
+          <a:xfrm>
+            <a:off x="0" y="0"/>
+            <a:ext cx="2971800" cy="458788"/>
+          </a:xfrm>
+          <a:prstGeom prst="rect">
+            <a:avLst/>
+          </a:prstGeom>
+        </p:spPr>
+        <p:txBody>
+          <a:bodyPr vert="horz" lIns="91440" tIns="45720" rIns="91440" bIns="45720" rtlCol="0"/>
+          <a:lstStyle>
+            <a:lvl1pPr algn="l">
+              <a:defRPr sz="1200"/>
+            </a:lvl1pPr>
+          </a:lstStyle>
+          <a:p>
+            <a:endParaRPr lang="zh-CN" altLang="en-US"/>
+          </a:p>
+        </p:txBody>
+      </p:sp>
+      <p:sp>
+        <p:nvSpPr>
+          <p:cNvPr id="3" name="日期占位符 2"/>
+          <p:cNvSpPr>
+            <a:spLocks noGrp="1"/>
+          </p:cNvSpPr>
+          <p:nvPr>
+            <p:ph type="dt" idx="1"/>
+          </p:nvPr>
+        </p:nvSpPr>
+        <p:spPr>
+          <a:xfrm>
+            <a:off x="3884613" y="0"/>
+            <a:ext cx="2971800" cy="458788"/>
+          </a:xfrm>
+          <a:prstGeom prst="rect">
+            <a:avLst/>
+          </a:prstGeom>
+        </p:spPr>
+        <p:txBody>
+          <a:bodyPr vert="horz" lIns="91440" tIns="45720" rIns="91440" bIns="45720" rtlCol="0"/>
+          <a:lstStyle>
+            <a:lvl1pPr algn="r">
+              <a:defRPr sz="1200"/>
+            </a:lvl1pPr>
+          </a:lstStyle>
+          <a:p>
+            <a:fld id="{8A69F377-C162-4680-9BD9-7C23D4CFF851}" type="datetimeFigureOut">
+              <a:rPr lang="zh-CN" altLang="en-US" smtClean="0"/>
+              <a:t>2019/9/23</a:t>
+            </a:fld>
+            <a:endParaRPr lang="zh-CN" altLang="en-US"/>
+          </a:p>
+        </p:txBody>
+      </p:sp>
+      <p:sp>
+        <p:nvSpPr>
+          <p:cNvPr id="4" name="幻灯片图像占位符 3"/>
+          <p:cNvSpPr>
+            <a:spLocks noGrp="1" noRot="1" noChangeAspect="1"/>
+          </p:cNvSpPr>
+          <p:nvPr>
+            <p:ph type="sldImg" idx="2"/>
+          </p:nvPr>
+        </p:nvSpPr>
+        <p:spPr>
+          <a:xfrm>
+            <a:off x="685800" y="1143000"/>
+            <a:ext cx="5486400" cy="3086100"/>
+          </a:xfrm>
+          <a:prstGeom prst="rect">
+            <a:avLst/>
+          </a:prstGeom>
+          <a:noFill/>
+          <a:ln w="12700">
+            <a:solidFill>
+              <a:prstClr val="black"/>
+            </a:solidFill>
+          </a:ln>
+        </p:spPr>
+        <p:txBody>
+          <a:bodyPr vert="horz" lIns="91440" tIns="45720" rIns="91440" bIns="45720" rtlCol="0" anchor="ctr"/>
+          <a:lstStyle/>
+          <a:p>
+            <a:endParaRPr lang="zh-CN" altLang="en-US"/>
+          </a:p>
+        </p:txBody>
+      </p:sp>
+      <p:sp>
+        <p:nvSpPr>
+          <p:cNvPr id="5" name="备注占位符 4"/>
+          <p:cNvSpPr>
+            <a:spLocks noGrp="1"/>
+          </p:cNvSpPr>
+          <p:nvPr>
+            <p:ph type="body" sz="quarter" idx="3"/>
+          </p:nvPr>
+        </p:nvSpPr>
+        <p:spPr>
+          <a:xfrm>
+            <a:off x="685800" y="4400550"/>
+            <a:ext cx="5486400" cy="3600450"/>
+          </a:xfrm>
+          <a:prstGeom prst="rect">
+            <a:avLst/>
+          </a:prstGeom>
+        </p:spPr>
+        <p:txBody>
+          <a:bodyPr vert="horz" lIns="91440" tIns="45720" rIns="91440" bIns="45720" rtlCol="0"/>
+          <a:lstStyle/>
+          <a:p>
+            <a:pPr lvl="0"/>
+            <a:r>
+              <a:rPr lang="zh-CN" altLang="en-US"/>
+              <a:t>编辑母版文本样式</a:t>
+            </a:r>
+          </a:p>
+          <a:p>
+            <a:pPr lvl="1"/>
+            <a:r>
+              <a:rPr lang="zh-CN" altLang="en-US"/>
+              <a:t>第二级</a:t>
+            </a:r>
+          </a:p>
+          <a:p>
+            <a:pPr lvl="2"/>
+            <a:r>
+              <a:rPr lang="zh-CN" altLang="en-US"/>
+              <a:t>第三级</a:t>
+            </a:r>
+          </a:p>
+          <a:p>
+            <a:pPr lvl="3"/>
+            <a:r>
+              <a:rPr lang="zh-CN" altLang="en-US"/>
+              <a:t>第四级</a:t>
+            </a:r>
+          </a:p>
+          <a:p>
+            <a:pPr lvl="4"/>
+            <a:r>
+              <a:rPr lang="zh-CN" altLang="en-US"/>
+              <a:t>第五级</a:t>
+            </a:r>
+          </a:p>
+        </p:txBody>
+      </p:sp>
+      <p:sp>
+        <p:nvSpPr>
+          <p:cNvPr id="6" name="页脚占位符 5"/>
+          <p:cNvSpPr>
+            <a:spLocks noGrp="1"/>
+          </p:cNvSpPr>
+          <p:nvPr>
+            <p:ph type="ftr" sz="quarter" idx="4"/>
+          </p:nvPr>
+        </p:nvSpPr>
+        <p:spPr>
+          <a:xfrm>
+            <a:off x="0" y="8685213"/>
+            <a:ext cx="2971800" cy="458787"/>
+          </a:xfrm>
+          <a:prstGeom prst="rect">
+            <a:avLst/>
+          </a:prstGeom>
+        </p:spPr>
+        <p:txBody>
+          <a:bodyPr vert="horz" lIns="91440" tIns="45720" rIns="91440" bIns="45720" rtlCol="0" anchor="b"/>
+          <a:lstStyle>
+            <a:lvl1pPr algn="l">
+              <a:defRPr sz="1200"/>
+            </a:lvl1pPr>
+          </a:lstStyle>
+          <a:p>
+            <a:endParaRPr lang="zh-CN" altLang="en-US"/>
+          </a:p>
+        </p:txBody>
+      </p:sp>
+      <p:sp>
+        <p:nvSpPr>
+          <p:cNvPr id="7" name="灯片编号占位符 6"/>
+          <p:cNvSpPr>
+            <a:spLocks noGrp="1"/>
+          </p:cNvSpPr>
+          <p:nvPr>
+            <p:ph type="sldNum" sz="quarter" idx="5"/>
+          </p:nvPr>
+        </p:nvSpPr>
+        <p:spPr>
+          <a:xfrm>
+            <a:off x="3884613" y="8685213"/>
+            <a:ext cx="2971800" cy="458787"/>
+          </a:xfrm>
+          <a:prstGeom prst="rect">
+            <a:avLst/>
+          </a:prstGeom>
+        </p:spPr>
+        <p:txBody>
+          <a:bodyPr vert="horz" lIns="91440" tIns="45720" rIns="91440" bIns="45720" rtlCol="0" anchor="b"/>
+          <a:lstStyle>
+            <a:lvl1pPr algn="r">
+              <a:defRPr sz="1200"/>
+            </a:lvl1pPr>
+          </a:lstStyle>
+          <a:p>
+            <a:fld id="{116FD875-F69A-4A96-B7D4-B4AEE2998B17}" type="slidenum">
+              <a:rPr lang="zh-CN" altLang="en-US" smtClean="0"/>
+              <a:t>‹#›</a:t>
+            </a:fld>
+            <a:endParaRPr lang="zh-CN" altLang="en-US"/>
+          </a:p>
+        </p:txBody>
+      </p:sp>
+    </p:spTree>
+    <p:extLst>
+      <p:ext uri="{BB962C8B-B14F-4D97-AF65-F5344CB8AC3E}">
+        <p14:creationId xmlns:p14="http://schemas.microsoft.com/office/powerpoint/2010/main" val="1932124258"/>
+      </p:ext>
+    </p:extLst>
+  </p:cSld>
+  <p:clrMap bg1="lt1" tx1="dk1" bg2="lt2" tx2="dk2" accent1="accent1" accent2="accent2" accent3="accent3" accent4="accent4" accent5="accent5" accent6="accent6" hlink="hlink" folHlink="folHlink"/>
+  <p:notesStyle>
+    <a:lvl1pPr marL="0" algn="l" defTabSz="914400" rtl="0" eaLnBrk="1" latinLnBrk="0" hangingPunct="1">
+      <a:defRPr sz="1200" kern="1200">
+        <a:solidFill>
+          <a:schemeClr val="tx1"/>
+        </a:solidFill>
+        <a:latin typeface="+mn-lt"/>
+        <a:ea typeface="+mn-ea"/>
+        <a:cs typeface="+mn-cs"/>
+      </a:defRPr>
+    </a:lvl1pPr>
+    <a:lvl2pPr marL="457200" algn="l" defTabSz="914400" rtl="0" eaLnBrk="1" latinLnBrk="0" hangingPunct="1">
+      <a:defRPr sz="1200" kern="1200">
+        <a:solidFill>
+          <a:schemeClr val="tx1"/>
+        </a:solidFill>
+        <a:latin typeface="+mn-lt"/>
+        <a:ea typeface="+mn-ea"/>
+        <a:cs typeface="+mn-cs"/>
+      </a:defRPr>
+    </a:lvl2pPr>
+    <a:lvl3pPr marL="914400" algn="l" defTabSz="914400" rtl="0" eaLnBrk="1" latinLnBrk="0" hangingPunct="1">
+      <a:defRPr sz="1200" kern="1200">
+        <a:solidFill>
+          <a:schemeClr val="tx1"/>
+        </a:solidFill>
+        <a:latin typeface="+mn-lt"/>
+        <a:ea typeface="+mn-ea"/>
+        <a:cs typeface="+mn-cs"/>
+      </a:defRPr>
+    </a:lvl3pPr>
+    <a:lvl4pPr marL="1371600" algn="l" defTabSz="914400" rtl="0" eaLnBrk="1" latinLnBrk="0" hangingPunct="1">
+      <a:defRPr sz="1200" kern="1200">
+        <a:solidFill>
+          <a:schemeClr val="tx1"/>
+        </a:solidFill>
+        <a:latin typeface="+mn-lt"/>
+        <a:ea typeface="+mn-ea"/>
+        <a:cs typeface="+mn-cs"/>
+      </a:defRPr>
+    </a:lvl4pPr>
+    <a:lvl5pPr marL="1828800" algn="l" defTabSz="914400" rtl="0" eaLnBrk="1" latinLnBrk="0" hangingPunct="1">
+      <a:defRPr sz="1200" kern="1200">
+        <a:solidFill>
+          <a:schemeClr val="tx1"/>
+        </a:solidFill>
+        <a:latin typeface="+mn-lt"/>
+        <a:ea typeface="+mn-ea"/>
+        <a:cs typeface="+mn-cs"/>
+      </a:defRPr>
+    </a:lvl5pPr>
+    <a:lvl6pPr marL="2286000" algn="l" defTabSz="914400" rtl="0" eaLnBrk="1" latinLnBrk="0" hangingPunct="1">
+      <a:defRPr sz="1200" kern="1200">
+        <a:solidFill>
+          <a:schemeClr val="tx1"/>
+        </a:solidFill>
+        <a:latin typeface="+mn-lt"/>
+        <a:ea typeface="+mn-ea"/>
+        <a:cs typeface="+mn-cs"/>
+      </a:defRPr>
+    </a:lvl6pPr>
+    <a:lvl7pPr marL="2743200" algn="l" defTabSz="914400" rtl="0" eaLnBrk="1" latinLnBrk="0" hangingPunct="1">
+      <a:defRPr sz="1200" kern="1200">
+        <a:solidFill>
+          <a:schemeClr val="tx1"/>
+        </a:solidFill>
+        <a:latin typeface="+mn-lt"/>
+        <a:ea typeface="+mn-ea"/>
+        <a:cs typeface="+mn-cs"/>
+      </a:defRPr>
+    </a:lvl7pPr>
+    <a:lvl8pPr marL="3200400" algn="l" defTabSz="914400" rtl="0" eaLnBrk="1" latinLnBrk="0" hangingPunct="1">
+      <a:defRPr sz="1200" kern="1200">
+        <a:solidFill>
+          <a:schemeClr val="tx1"/>
+        </a:solidFill>
+        <a:latin typeface="+mn-lt"/>
+        <a:ea typeface="+mn-ea"/>
+        <a:cs typeface="+mn-cs"/>
+      </a:defRPr>
+    </a:lvl8pPr>
+    <a:lvl9pPr marL="3657600" algn="l" defTabSz="914400" rtl="0" eaLnBrk="1" latinLnBrk="0" hangingPunct="1">
+      <a:defRPr sz="1200" kern="1200">
+        <a:solidFill>
+          <a:schemeClr val="tx1"/>
+        </a:solidFill>
+        <a:latin typeface="+mn-lt"/>
+        <a:ea typeface="+mn-ea"/>
+        <a:cs typeface="+mn-cs"/>
+      </a:defRPr>
+    </a:lvl9pPr>
+  </p:notesStyle>
+</p:notesMaster>
+</file>
+
+<file path=ppt/notesSlides/notesSlide1.xml><?xml version="1.0" encoding="utf-8"?>
+<p:notes xmlns:a="http://schemas.openxmlformats.org/drawingml/2006/main" xmlns:r="http://schemas.openxmlformats.org/officeDocument/2006/relationships" xmlns:p="http://schemas.openxmlformats.org/presentationml/2006/main">
+  <p:cSld>
+    <p:spTree>
+      <p:nvGrpSpPr>
+        <p:cNvPr id="1" name=""/>
+        <p:cNvGrpSpPr/>
+        <p:nvPr/>
+      </p:nvGrpSpPr>
+      <p:grpSpPr>
+        <a:xfrm>
+          <a:off x="0" y="0"/>
+          <a:ext cx="0" cy="0"/>
+          <a:chOff x="0" y="0"/>
+          <a:chExt cx="0" cy="0"/>
+        </a:xfrm>
+      </p:grpSpPr>
+      <p:sp>
+        <p:nvSpPr>
+          <p:cNvPr id="2" name="幻灯片图像占位符 1"/>
+          <p:cNvSpPr>
+            <a:spLocks noGrp="1" noRot="1" noChangeAspect="1"/>
+          </p:cNvSpPr>
+          <p:nvPr>
+            <p:ph type="sldImg"/>
+          </p:nvPr>
+        </p:nvSpPr>
+        <p:spPr/>
+      </p:sp>
+      <p:sp>
+        <p:nvSpPr>
+          <p:cNvPr id="3" name="备注占位符 2"/>
+          <p:cNvSpPr>
+            <a:spLocks noGrp="1"/>
+          </p:cNvSpPr>
+          <p:nvPr>
+            <p:ph type="body" idx="1"/>
+          </p:nvPr>
+        </p:nvSpPr>
+        <p:spPr/>
+        <p:txBody>
+          <a:bodyPr/>
+          <a:lstStyle/>
+          <a:p>
+            <a:endParaRPr lang="zh-CN" altLang="en-US" dirty="0"/>
+          </a:p>
+        </p:txBody>
+      </p:sp>
+      <p:sp>
+        <p:nvSpPr>
+          <p:cNvPr id="4" name="灯片编号占位符 3"/>
+          <p:cNvSpPr>
+            <a:spLocks noGrp="1"/>
+          </p:cNvSpPr>
+          <p:nvPr>
+            <p:ph type="sldNum" sz="quarter" idx="5"/>
+          </p:nvPr>
+        </p:nvSpPr>
+        <p:spPr/>
+        <p:txBody>
+          <a:bodyPr/>
+          <a:lstStyle/>
+          <a:p>
+            <a:fld id="{116FD875-F69A-4A96-B7D4-B4AEE2998B17}" type="slidenum">
+              <a:rPr lang="zh-CN" altLang="en-US" smtClean="0"/>
+              <a:t>10</a:t>
+            </a:fld>
+            <a:endParaRPr lang="zh-CN" altLang="en-US"/>
+          </a:p>
+        </p:txBody>
+      </p:sp>
+    </p:spTree>
+    <p:extLst>
+      <p:ext uri="{BB962C8B-B14F-4D97-AF65-F5344CB8AC3E}">
+        <p14:creationId xmlns:p14="http://schemas.microsoft.com/office/powerpoint/2010/main" val="2137694354"/>
+      </p:ext>
+    </p:extLst>
+  </p:cSld>
+  <p:clrMapOvr>
+    <a:masterClrMapping/>
+  </p:clrMapOvr>
+</p:notes>
+</file>
+
+<file path=ppt/notesSlides/notesSlide2.xml><?xml version="1.0" encoding="utf-8"?>
+<p:notes xmlns:a="http://schemas.openxmlformats.org/drawingml/2006/main" xmlns:r="http://schemas.openxmlformats.org/officeDocument/2006/relationships" xmlns:p="http://schemas.openxmlformats.org/presentationml/2006/main">
+  <p:cSld>
+    <p:spTree>
+      <p:nvGrpSpPr>
+        <p:cNvPr id="1" name=""/>
+        <p:cNvGrpSpPr/>
+        <p:nvPr/>
+      </p:nvGrpSpPr>
+      <p:grpSpPr>
+        <a:xfrm>
+          <a:off x="0" y="0"/>
+          <a:ext cx="0" cy="0"/>
+          <a:chOff x="0" y="0"/>
+          <a:chExt cx="0" cy="0"/>
+        </a:xfrm>
+      </p:grpSpPr>
+      <p:sp>
+        <p:nvSpPr>
+          <p:cNvPr id="2" name="幻灯片图像占位符 1"/>
+          <p:cNvSpPr>
+            <a:spLocks noGrp="1" noRot="1" noChangeAspect="1"/>
+          </p:cNvSpPr>
+          <p:nvPr>
+            <p:ph type="sldImg"/>
+          </p:nvPr>
+        </p:nvSpPr>
+        <p:spPr/>
+      </p:sp>
+      <p:sp>
+        <p:nvSpPr>
+          <p:cNvPr id="3" name="备注占位符 2"/>
+          <p:cNvSpPr>
+            <a:spLocks noGrp="1"/>
+          </p:cNvSpPr>
+          <p:nvPr>
+            <p:ph type="body" idx="1"/>
+          </p:nvPr>
+        </p:nvSpPr>
+        <p:spPr/>
+        <p:txBody>
+          <a:bodyPr/>
+          <a:lstStyle/>
+          <a:p>
+            <a:endParaRPr lang="zh-CN" altLang="en-US" dirty="0"/>
+          </a:p>
+        </p:txBody>
+      </p:sp>
+      <p:sp>
+        <p:nvSpPr>
+          <p:cNvPr id="4" name="灯片编号占位符 3"/>
+          <p:cNvSpPr>
+            <a:spLocks noGrp="1"/>
+          </p:cNvSpPr>
+          <p:nvPr>
+            <p:ph type="sldNum" sz="quarter" idx="5"/>
+          </p:nvPr>
+        </p:nvSpPr>
+        <p:spPr/>
+        <p:txBody>
+          <a:bodyPr/>
+          <a:lstStyle/>
+          <a:p>
+            <a:fld id="{116FD875-F69A-4A96-B7D4-B4AEE2998B17}" type="slidenum">
+              <a:rPr lang="zh-CN" altLang="en-US" smtClean="0"/>
+              <a:t>11</a:t>
+            </a:fld>
+            <a:endParaRPr lang="zh-CN" altLang="en-US"/>
+          </a:p>
+        </p:txBody>
+      </p:sp>
+    </p:spTree>
+    <p:extLst>
+      <p:ext uri="{BB962C8B-B14F-4D97-AF65-F5344CB8AC3E}">
+        <p14:creationId xmlns:p14="http://schemas.microsoft.com/office/powerpoint/2010/main" val="1350635610"/>
+      </p:ext>
+    </p:extLst>
+  </p:cSld>
+  <p:clrMapOvr>
+    <a:masterClrMapping/>
+  </p:clrMapOvr>
+</p:notes>
 </file>
 
 <file path=ppt/slideLayouts/slideLayout1.xml><?xml version="1.0" encoding="utf-8"?>
@@ -257,9 +806,9 @@
           <a:bodyPr/>
           <a:lstStyle/>
           <a:p>
-            <a:fld id="{8E975045-9683-F041-B0AE-1460E1D7AB98}" type="datetimeFigureOut">
-              <a:rPr lang="en-US" smtClean="0"/>
-              <a:t>9/19/19</a:t>
+            <a:fld id="{6110C06D-7A5C-4EFC-997D-06100A497197}" type="datetime1">
+              <a:rPr lang="en-US" altLang="zh-CN" smtClean="0"/>
+              <a:t>9/23/19</a:t>
             </a:fld>
             <a:endParaRPr lang="en-US"/>
           </a:p>
@@ -455,9 +1004,9 @@
           <a:bodyPr/>
           <a:lstStyle/>
           <a:p>
-            <a:fld id="{8E975045-9683-F041-B0AE-1460E1D7AB98}" type="datetimeFigureOut">
-              <a:rPr lang="en-US" smtClean="0"/>
-              <a:t>9/19/19</a:t>
+            <a:fld id="{208693CD-EAB3-4C4A-B6BC-E13B4E22CFEC}" type="datetime1">
+              <a:rPr lang="en-US" altLang="zh-CN" smtClean="0"/>
+              <a:t>9/23/19</a:t>
             </a:fld>
             <a:endParaRPr lang="en-US"/>
           </a:p>
@@ -663,9 +1212,9 @@
           <a:bodyPr/>
           <a:lstStyle/>
           <a:p>
-            <a:fld id="{8E975045-9683-F041-B0AE-1460E1D7AB98}" type="datetimeFigureOut">
-              <a:rPr lang="en-US" smtClean="0"/>
-              <a:t>9/19/19</a:t>
+            <a:fld id="{DF2B9BE3-15D4-4DBE-A744-51C26D8C89F5}" type="datetime1">
+              <a:rPr lang="en-US" altLang="zh-CN" smtClean="0"/>
+              <a:t>9/23/19</a:t>
             </a:fld>
             <a:endParaRPr lang="en-US"/>
           </a:p>
@@ -861,9 +1410,9 @@
           <a:bodyPr/>
           <a:lstStyle/>
           <a:p>
-            <a:fld id="{8E975045-9683-F041-B0AE-1460E1D7AB98}" type="datetimeFigureOut">
-              <a:rPr lang="en-US" smtClean="0"/>
-              <a:t>9/19/19</a:t>
+            <a:fld id="{D483111E-5384-4450-87E5-51B3B2328436}" type="datetime1">
+              <a:rPr lang="en-US" altLang="zh-CN" smtClean="0"/>
+              <a:t>9/23/19</a:t>
             </a:fld>
             <a:endParaRPr lang="en-US"/>
           </a:p>
@@ -1136,9 +1685,9 @@
           <a:bodyPr/>
           <a:lstStyle/>
           <a:p>
-            <a:fld id="{8E975045-9683-F041-B0AE-1460E1D7AB98}" type="datetimeFigureOut">
-              <a:rPr lang="en-US" smtClean="0"/>
-              <a:t>9/19/19</a:t>
+            <a:fld id="{4C883E3E-2C2C-4299-A198-43C5B9691ED8}" type="datetime1">
+              <a:rPr lang="en-US" altLang="zh-CN" smtClean="0"/>
+              <a:t>9/23/19</a:t>
             </a:fld>
             <a:endParaRPr lang="en-US"/>
           </a:p>
@@ -1401,9 +1950,9 @@
           <a:bodyPr/>
           <a:lstStyle/>
           <a:p>
-            <a:fld id="{8E975045-9683-F041-B0AE-1460E1D7AB98}" type="datetimeFigureOut">
-              <a:rPr lang="en-US" smtClean="0"/>
-              <a:t>9/19/19</a:t>
+            <a:fld id="{8AE1C8E2-3477-408B-8A18-BC57B5A57DE5}" type="datetime1">
+              <a:rPr lang="en-US" altLang="zh-CN" smtClean="0"/>
+              <a:t>9/23/19</a:t>
             </a:fld>
             <a:endParaRPr lang="en-US"/>
           </a:p>
@@ -1813,9 +2362,9 @@
           <a:bodyPr/>
           <a:lstStyle/>
           <a:p>
-            <a:fld id="{8E975045-9683-F041-B0AE-1460E1D7AB98}" type="datetimeFigureOut">
-              <a:rPr lang="en-US" smtClean="0"/>
-              <a:t>9/19/19</a:t>
+            <a:fld id="{93B8B463-FD8B-4FE3-A2B0-56A8F331639C}" type="datetime1">
+              <a:rPr lang="en-US" altLang="zh-CN" smtClean="0"/>
+              <a:t>9/23/19</a:t>
             </a:fld>
             <a:endParaRPr lang="en-US"/>
           </a:p>
@@ -1954,9 +2503,9 @@
           <a:bodyPr/>
           <a:lstStyle/>
           <a:p>
-            <a:fld id="{8E975045-9683-F041-B0AE-1460E1D7AB98}" type="datetimeFigureOut">
-              <a:rPr lang="en-US" smtClean="0"/>
-              <a:t>9/19/19</a:t>
+            <a:fld id="{FDB557D0-8350-4B6D-8E8F-81F075A8CA5A}" type="datetime1">
+              <a:rPr lang="en-US" altLang="zh-CN" smtClean="0"/>
+              <a:t>9/23/19</a:t>
             </a:fld>
             <a:endParaRPr lang="en-US"/>
           </a:p>
@@ -2067,9 +2616,9 @@
           <a:bodyPr/>
           <a:lstStyle/>
           <a:p>
-            <a:fld id="{8E975045-9683-F041-B0AE-1460E1D7AB98}" type="datetimeFigureOut">
-              <a:rPr lang="en-US" smtClean="0"/>
-              <a:t>9/19/19</a:t>
+            <a:fld id="{2351E6A3-8727-4C49-BB0B-8D3B215E0F05}" type="datetime1">
+              <a:rPr lang="en-US" altLang="zh-CN" smtClean="0"/>
+              <a:t>9/23/19</a:t>
             </a:fld>
             <a:endParaRPr lang="en-US"/>
           </a:p>
@@ -2378,9 +2927,9 @@
           <a:bodyPr/>
           <a:lstStyle/>
           <a:p>
-            <a:fld id="{8E975045-9683-F041-B0AE-1460E1D7AB98}" type="datetimeFigureOut">
-              <a:rPr lang="en-US" smtClean="0"/>
-              <a:t>9/19/19</a:t>
+            <a:fld id="{79C7CDA5-BE82-46C9-84A7-917789A4507C}" type="datetime1">
+              <a:rPr lang="en-US" altLang="zh-CN" smtClean="0"/>
+              <a:t>9/23/19</a:t>
             </a:fld>
             <a:endParaRPr lang="en-US"/>
           </a:p>
@@ -2666,9 +3215,9 @@
           <a:bodyPr/>
           <a:lstStyle/>
           <a:p>
-            <a:fld id="{8E975045-9683-F041-B0AE-1460E1D7AB98}" type="datetimeFigureOut">
-              <a:rPr lang="en-US" smtClean="0"/>
-              <a:t>9/19/19</a:t>
+            <a:fld id="{867D3553-557E-47A6-AA35-FB9764499B9E}" type="datetime1">
+              <a:rPr lang="en-US" altLang="zh-CN" smtClean="0"/>
+              <a:t>9/23/19</a:t>
             </a:fld>
             <a:endParaRPr lang="en-US"/>
           </a:p>
@@ -2907,9 +3456,9 @@
             </a:lvl1pPr>
           </a:lstStyle>
           <a:p>
-            <a:fld id="{8E975045-9683-F041-B0AE-1460E1D7AB98}" type="datetimeFigureOut">
-              <a:rPr lang="en-US" smtClean="0"/>
-              <a:t>9/19/19</a:t>
+            <a:fld id="{8A5258A8-249F-4202-8A92-0C595567D6C5}" type="datetime1">
+              <a:rPr lang="en-US" altLang="zh-CN" smtClean="0"/>
+              <a:t>9/23/19</a:t>
             </a:fld>
             <a:endParaRPr lang="en-US"/>
           </a:p>
@@ -3026,6 +3575,7 @@
     <p:sldLayoutId id="2147483658" r:id="rId10"/>
     <p:sldLayoutId id="2147483659" r:id="rId11"/>
   </p:sldLayoutIdLst>
+  <p:hf hdr="0" ftr="0"/>
   <p:txStyles>
     <p:titleStyle>
       <a:lvl1pPr algn="l" defTabSz="914400" rtl="0" eaLnBrk="1" latinLnBrk="0" hangingPunct="1">
@@ -3379,10 +3929,406 @@
           </a:p>
         </p:txBody>
       </p:sp>
+      <p:sp>
+        <p:nvSpPr>
+          <p:cNvPr id="4" name="日期占位符 3">
+            <a:extLst>
+              <a:ext uri="{FF2B5EF4-FFF2-40B4-BE49-F238E27FC236}">
+                <a16:creationId xmlns:a16="http://schemas.microsoft.com/office/drawing/2014/main" id="{43375F58-6602-4BB2-9B52-C33DFD3534A9}"/>
+              </a:ext>
+            </a:extLst>
+          </p:cNvPr>
+          <p:cNvSpPr>
+            <a:spLocks noGrp="1"/>
+          </p:cNvSpPr>
+          <p:nvPr>
+            <p:ph type="dt" sz="half" idx="10"/>
+          </p:nvPr>
+        </p:nvSpPr>
+        <p:spPr/>
+        <p:txBody>
+          <a:bodyPr/>
+          <a:lstStyle/>
+          <a:p>
+            <a:fld id="{D17A8FA8-D9AF-44A9-9447-58E55764C556}" type="datetime1">
+              <a:rPr lang="en-US" altLang="zh-CN" smtClean="0"/>
+              <a:t>9/23/19</a:t>
+            </a:fld>
+            <a:endParaRPr lang="en-US"/>
+          </a:p>
+        </p:txBody>
+      </p:sp>
+      <p:sp>
+        <p:nvSpPr>
+          <p:cNvPr id="5" name="灯片编号占位符 4">
+            <a:extLst>
+              <a:ext uri="{FF2B5EF4-FFF2-40B4-BE49-F238E27FC236}">
+                <a16:creationId xmlns:a16="http://schemas.microsoft.com/office/drawing/2014/main" id="{800711A6-827C-49F2-A75E-F13EC8F5B0E8}"/>
+              </a:ext>
+            </a:extLst>
+          </p:cNvPr>
+          <p:cNvSpPr>
+            <a:spLocks noGrp="1"/>
+          </p:cNvSpPr>
+          <p:nvPr>
+            <p:ph type="sldNum" sz="quarter" idx="12"/>
+          </p:nvPr>
+        </p:nvSpPr>
+        <p:spPr/>
+        <p:txBody>
+          <a:bodyPr/>
+          <a:lstStyle/>
+          <a:p>
+            <a:fld id="{93D7A402-3076-2049-A745-4823B471CC62}" type="slidenum">
+              <a:rPr lang="en-US" smtClean="0"/>
+              <a:t>1</a:t>
+            </a:fld>
+            <a:endParaRPr lang="en-US"/>
+          </a:p>
+        </p:txBody>
+      </p:sp>
     </p:spTree>
     <p:extLst>
       <p:ext uri="{BB962C8B-B14F-4D97-AF65-F5344CB8AC3E}">
         <p14:creationId xmlns:p14="http://schemas.microsoft.com/office/powerpoint/2010/main" val="3254276070"/>
+      </p:ext>
+    </p:extLst>
+  </p:cSld>
+  <p:clrMapOvr>
+    <a:masterClrMapping/>
+  </p:clrMapOvr>
+</p:sld>
+</file>
+
+<file path=ppt/slides/slide10.xml><?xml version="1.0" encoding="utf-8"?>
+<p:sld xmlns:a="http://schemas.openxmlformats.org/drawingml/2006/main" xmlns:r="http://schemas.openxmlformats.org/officeDocument/2006/relationships" xmlns:p="http://schemas.openxmlformats.org/presentationml/2006/main">
+  <p:cSld>
+    <p:spTree>
+      <p:nvGrpSpPr>
+        <p:cNvPr id="1" name=""/>
+        <p:cNvGrpSpPr/>
+        <p:nvPr/>
+      </p:nvGrpSpPr>
+      <p:grpSpPr>
+        <a:xfrm>
+          <a:off x="0" y="0"/>
+          <a:ext cx="0" cy="0"/>
+          <a:chOff x="0" y="0"/>
+          <a:chExt cx="0" cy="0"/>
+        </a:xfrm>
+      </p:grpSpPr>
+      <p:sp>
+        <p:nvSpPr>
+          <p:cNvPr id="2" name="Title 1">
+            <a:extLst>
+              <a:ext uri="{FF2B5EF4-FFF2-40B4-BE49-F238E27FC236}">
+                <a16:creationId xmlns:a16="http://schemas.microsoft.com/office/drawing/2014/main" id="{B071AE84-1CB7-1C46-9F72-CB3FB82F3447}"/>
+              </a:ext>
+            </a:extLst>
+          </p:cNvPr>
+          <p:cNvSpPr>
+            <a:spLocks noGrp="1"/>
+          </p:cNvSpPr>
+          <p:nvPr>
+            <p:ph type="title"/>
+          </p:nvPr>
+        </p:nvSpPr>
+        <p:spPr/>
+        <p:txBody>
+          <a:bodyPr/>
+          <a:lstStyle/>
+          <a:p>
+            <a:r>
+              <a:rPr lang="en-US" altLang="zh-CN"/>
+              <a:t>Exp-TODO-4 </a:t>
+            </a:r>
+            <a:r>
+              <a:rPr lang="zh-CN" altLang="en-US" dirty="0"/>
+              <a:t>探究实验</a:t>
+            </a:r>
+            <a:endParaRPr lang="en-US" dirty="0"/>
+          </a:p>
+        </p:txBody>
+      </p:sp>
+      <p:sp>
+        <p:nvSpPr>
+          <p:cNvPr id="3" name="Content Placeholder 2">
+            <a:extLst>
+              <a:ext uri="{FF2B5EF4-FFF2-40B4-BE49-F238E27FC236}">
+                <a16:creationId xmlns:a16="http://schemas.microsoft.com/office/drawing/2014/main" id="{5DE9B7D8-C997-384D-98CA-E108203C4B9C}"/>
+              </a:ext>
+            </a:extLst>
+          </p:cNvPr>
+          <p:cNvSpPr>
+            <a:spLocks noGrp="1"/>
+          </p:cNvSpPr>
+          <p:nvPr>
+            <p:ph idx="1"/>
+          </p:nvPr>
+        </p:nvSpPr>
+        <p:spPr>
+          <a:xfrm>
+            <a:off x="718931" y="1547329"/>
+            <a:ext cx="10515600" cy="4787209"/>
+          </a:xfrm>
+        </p:spPr>
+        <p:txBody>
+          <a:bodyPr>
+            <a:normAutofit/>
+          </a:bodyPr>
+          <a:lstStyle/>
+          <a:p>
+            <a:endParaRPr lang="en-US" altLang="zh-CN" dirty="0"/>
+          </a:p>
+          <a:p>
+            <a:pPr lvl="1"/>
+            <a:r>
+              <a:rPr lang="zh-CN" altLang="en-US" dirty="0"/>
+              <a:t>在</a:t>
+            </a:r>
+            <a:r>
+              <a:rPr lang="en-US" altLang="zh-CN" dirty="0" err="1"/>
+              <a:t>imagenet</a:t>
+            </a:r>
+            <a:r>
+              <a:rPr lang="zh-CN" altLang="en-US" dirty="0"/>
+              <a:t>上重复实验，使用预先训练好的模型，选择训练集的图片即可（现在训练好的图片上，可能可以得到更容易解释的结果，然后再考虑更复杂的验证集）</a:t>
+            </a:r>
+            <a:endParaRPr lang="en-US" altLang="zh-CN" sz="2200" dirty="0"/>
+          </a:p>
+        </p:txBody>
+      </p:sp>
+      <p:sp>
+        <p:nvSpPr>
+          <p:cNvPr id="4" name="日期占位符 3">
+            <a:extLst>
+              <a:ext uri="{FF2B5EF4-FFF2-40B4-BE49-F238E27FC236}">
+                <a16:creationId xmlns:a16="http://schemas.microsoft.com/office/drawing/2014/main" id="{2765B96B-3E85-40A3-A296-091D4989186B}"/>
+              </a:ext>
+            </a:extLst>
+          </p:cNvPr>
+          <p:cNvSpPr>
+            <a:spLocks noGrp="1"/>
+          </p:cNvSpPr>
+          <p:nvPr>
+            <p:ph type="dt" sz="half" idx="10"/>
+          </p:nvPr>
+        </p:nvSpPr>
+        <p:spPr/>
+        <p:txBody>
+          <a:bodyPr/>
+          <a:lstStyle/>
+          <a:p>
+            <a:fld id="{BF677F50-21D8-40BE-B8F0-B2270733CF6B}" type="datetime1">
+              <a:rPr lang="en-US" altLang="zh-CN" smtClean="0"/>
+              <a:t>9/23/19</a:t>
+            </a:fld>
+            <a:endParaRPr lang="en-US"/>
+          </a:p>
+        </p:txBody>
+      </p:sp>
+      <p:sp>
+        <p:nvSpPr>
+          <p:cNvPr id="5" name="灯片编号占位符 4">
+            <a:extLst>
+              <a:ext uri="{FF2B5EF4-FFF2-40B4-BE49-F238E27FC236}">
+                <a16:creationId xmlns:a16="http://schemas.microsoft.com/office/drawing/2014/main" id="{57EAF1FF-820C-427B-BE1E-A008AA61BA6C}"/>
+              </a:ext>
+            </a:extLst>
+          </p:cNvPr>
+          <p:cNvSpPr>
+            <a:spLocks noGrp="1"/>
+          </p:cNvSpPr>
+          <p:nvPr>
+            <p:ph type="sldNum" sz="quarter" idx="12"/>
+          </p:nvPr>
+        </p:nvSpPr>
+        <p:spPr/>
+        <p:txBody>
+          <a:bodyPr/>
+          <a:lstStyle/>
+          <a:p>
+            <a:fld id="{93D7A402-3076-2049-A745-4823B471CC62}" type="slidenum">
+              <a:rPr lang="en-US" smtClean="0"/>
+              <a:t>10</a:t>
+            </a:fld>
+            <a:endParaRPr lang="en-US"/>
+          </a:p>
+        </p:txBody>
+      </p:sp>
+    </p:spTree>
+    <p:extLst>
+      <p:ext uri="{BB962C8B-B14F-4D97-AF65-F5344CB8AC3E}">
+        <p14:creationId xmlns:p14="http://schemas.microsoft.com/office/powerpoint/2010/main" val="1216967140"/>
+      </p:ext>
+    </p:extLst>
+  </p:cSld>
+  <p:clrMapOvr>
+    <a:masterClrMapping/>
+  </p:clrMapOvr>
+</p:sld>
+</file>
+
+<file path=ppt/slides/slide11.xml><?xml version="1.0" encoding="utf-8"?>
+<p:sld xmlns:a="http://schemas.openxmlformats.org/drawingml/2006/main" xmlns:r="http://schemas.openxmlformats.org/officeDocument/2006/relationships" xmlns:p="http://schemas.openxmlformats.org/presentationml/2006/main">
+  <p:cSld>
+    <p:spTree>
+      <p:nvGrpSpPr>
+        <p:cNvPr id="1" name=""/>
+        <p:cNvGrpSpPr/>
+        <p:nvPr/>
+      </p:nvGrpSpPr>
+      <p:grpSpPr>
+        <a:xfrm>
+          <a:off x="0" y="0"/>
+          <a:ext cx="0" cy="0"/>
+          <a:chOff x="0" y="0"/>
+          <a:chExt cx="0" cy="0"/>
+        </a:xfrm>
+      </p:grpSpPr>
+      <p:sp>
+        <p:nvSpPr>
+          <p:cNvPr id="2" name="Title 1">
+            <a:extLst>
+              <a:ext uri="{FF2B5EF4-FFF2-40B4-BE49-F238E27FC236}">
+                <a16:creationId xmlns:a16="http://schemas.microsoft.com/office/drawing/2014/main" id="{B071AE84-1CB7-1C46-9F72-CB3FB82F3447}"/>
+              </a:ext>
+            </a:extLst>
+          </p:cNvPr>
+          <p:cNvSpPr>
+            <a:spLocks noGrp="1"/>
+          </p:cNvSpPr>
+          <p:nvPr>
+            <p:ph type="title"/>
+          </p:nvPr>
+        </p:nvSpPr>
+        <p:spPr/>
+        <p:txBody>
+          <a:bodyPr/>
+          <a:lstStyle/>
+          <a:p>
+            <a:r>
+              <a:rPr lang="en-US" altLang="zh-CN" dirty="0"/>
+              <a:t>Exp-TODO-5 </a:t>
+            </a:r>
+            <a:r>
+              <a:rPr lang="zh-CN" altLang="en-US" dirty="0"/>
+              <a:t>探究实验</a:t>
+            </a:r>
+            <a:endParaRPr lang="en-US" dirty="0"/>
+          </a:p>
+        </p:txBody>
+      </p:sp>
+      <p:sp>
+        <p:nvSpPr>
+          <p:cNvPr id="3" name="Content Placeholder 2">
+            <a:extLst>
+              <a:ext uri="{FF2B5EF4-FFF2-40B4-BE49-F238E27FC236}">
+                <a16:creationId xmlns:a16="http://schemas.microsoft.com/office/drawing/2014/main" id="{5DE9B7D8-C997-384D-98CA-E108203C4B9C}"/>
+              </a:ext>
+            </a:extLst>
+          </p:cNvPr>
+          <p:cNvSpPr>
+            <a:spLocks noGrp="1"/>
+          </p:cNvSpPr>
+          <p:nvPr>
+            <p:ph idx="1"/>
+          </p:nvPr>
+        </p:nvSpPr>
+        <p:spPr>
+          <a:xfrm>
+            <a:off x="718931" y="1547329"/>
+            <a:ext cx="10515600" cy="4787209"/>
+          </a:xfrm>
+        </p:spPr>
+        <p:txBody>
+          <a:bodyPr>
+            <a:normAutofit/>
+          </a:bodyPr>
+          <a:lstStyle/>
+          <a:p>
+            <a:endParaRPr lang="en-US" altLang="zh-CN" dirty="0"/>
+          </a:p>
+          <a:p>
+            <a:pPr lvl="1"/>
+            <a:r>
+              <a:rPr lang="zh-CN" altLang="en-US" dirty="0"/>
+              <a:t>在</a:t>
+            </a:r>
+            <a:r>
+              <a:rPr lang="en-US" altLang="zh-CN" dirty="0" err="1"/>
+              <a:t>imagenet</a:t>
+            </a:r>
+            <a:r>
+              <a:rPr lang="zh-CN" altLang="en-US" dirty="0"/>
+              <a:t>上重复实验，使用预先训练好的模型，选择训练集的图片即可（现在训练好的图片上，可能可以得到更容易解释的结果，然后再考虑更复杂的验证集）</a:t>
+            </a:r>
+            <a:endParaRPr lang="en-US" altLang="zh-CN" sz="2200" dirty="0"/>
+          </a:p>
+        </p:txBody>
+      </p:sp>
+      <p:sp>
+        <p:nvSpPr>
+          <p:cNvPr id="4" name="日期占位符 3">
+            <a:extLst>
+              <a:ext uri="{FF2B5EF4-FFF2-40B4-BE49-F238E27FC236}">
+                <a16:creationId xmlns:a16="http://schemas.microsoft.com/office/drawing/2014/main" id="{2765B96B-3E85-40A3-A296-091D4989186B}"/>
+              </a:ext>
+            </a:extLst>
+          </p:cNvPr>
+          <p:cNvSpPr>
+            <a:spLocks noGrp="1"/>
+          </p:cNvSpPr>
+          <p:nvPr>
+            <p:ph type="dt" sz="half" idx="10"/>
+          </p:nvPr>
+        </p:nvSpPr>
+        <p:spPr/>
+        <p:txBody>
+          <a:bodyPr/>
+          <a:lstStyle/>
+          <a:p>
+            <a:fld id="{BF677F50-21D8-40BE-B8F0-B2270733CF6B}" type="datetime1">
+              <a:rPr lang="en-US" altLang="zh-CN" smtClean="0"/>
+              <a:t>9/23/19</a:t>
+            </a:fld>
+            <a:endParaRPr lang="en-US"/>
+          </a:p>
+        </p:txBody>
+      </p:sp>
+      <p:sp>
+        <p:nvSpPr>
+          <p:cNvPr id="5" name="灯片编号占位符 4">
+            <a:extLst>
+              <a:ext uri="{FF2B5EF4-FFF2-40B4-BE49-F238E27FC236}">
+                <a16:creationId xmlns:a16="http://schemas.microsoft.com/office/drawing/2014/main" id="{57EAF1FF-820C-427B-BE1E-A008AA61BA6C}"/>
+              </a:ext>
+            </a:extLst>
+          </p:cNvPr>
+          <p:cNvSpPr>
+            <a:spLocks noGrp="1"/>
+          </p:cNvSpPr>
+          <p:nvPr>
+            <p:ph type="sldNum" sz="quarter" idx="12"/>
+          </p:nvPr>
+        </p:nvSpPr>
+        <p:spPr/>
+        <p:txBody>
+          <a:bodyPr/>
+          <a:lstStyle/>
+          <a:p>
+            <a:fld id="{93D7A402-3076-2049-A745-4823B471CC62}" type="slidenum">
+              <a:rPr lang="en-US" smtClean="0"/>
+              <a:t>11</a:t>
+            </a:fld>
+            <a:endParaRPr lang="en-US"/>
+          </a:p>
+        </p:txBody>
+      </p:sp>
+    </p:spTree>
+    <p:extLst>
+      <p:ext uri="{BB962C8B-B14F-4D97-AF65-F5344CB8AC3E}">
+        <p14:creationId xmlns:p14="http://schemas.microsoft.com/office/powerpoint/2010/main" val="3291905231"/>
       </p:ext>
     </p:extLst>
   </p:cSld>
@@ -3492,6 +4438,64 @@
           </a:prstGeom>
         </p:spPr>
       </p:pic>
+      <p:sp>
+        <p:nvSpPr>
+          <p:cNvPr id="5" name="日期占位符 4">
+            <a:extLst>
+              <a:ext uri="{FF2B5EF4-FFF2-40B4-BE49-F238E27FC236}">
+                <a16:creationId xmlns:a16="http://schemas.microsoft.com/office/drawing/2014/main" id="{E069A727-5D8C-4F08-A1E8-C67DC66C2B11}"/>
+              </a:ext>
+            </a:extLst>
+          </p:cNvPr>
+          <p:cNvSpPr>
+            <a:spLocks noGrp="1"/>
+          </p:cNvSpPr>
+          <p:nvPr>
+            <p:ph type="dt" sz="half" idx="10"/>
+          </p:nvPr>
+        </p:nvSpPr>
+        <p:spPr/>
+        <p:txBody>
+          <a:bodyPr/>
+          <a:lstStyle/>
+          <a:p>
+            <a:fld id="{C563B692-CE74-499F-9357-A4F8D07A9D42}" type="datetime1">
+              <a:rPr lang="en-US" altLang="zh-CN" smtClean="0"/>
+              <a:t>9/23/19</a:t>
+            </a:fld>
+            <a:endParaRPr lang="en-US"/>
+          </a:p>
+        </p:txBody>
+      </p:sp>
+      <p:sp>
+        <p:nvSpPr>
+          <p:cNvPr id="6" name="灯片编号占位符 5">
+            <a:extLst>
+              <a:ext uri="{FF2B5EF4-FFF2-40B4-BE49-F238E27FC236}">
+                <a16:creationId xmlns:a16="http://schemas.microsoft.com/office/drawing/2014/main" id="{035B2EB2-8ED9-44AF-BB8F-6A3E917DF6BA}"/>
+              </a:ext>
+            </a:extLst>
+          </p:cNvPr>
+          <p:cNvSpPr>
+            <a:spLocks noGrp="1"/>
+          </p:cNvSpPr>
+          <p:nvPr>
+            <p:ph type="sldNum" sz="quarter" idx="12"/>
+          </p:nvPr>
+        </p:nvSpPr>
+        <p:spPr/>
+        <p:txBody>
+          <a:bodyPr/>
+          <a:lstStyle/>
+          <a:p>
+            <a:fld id="{93D7A402-3076-2049-A745-4823B471CC62}" type="slidenum">
+              <a:rPr lang="en-US" smtClean="0"/>
+              <a:t>2</a:t>
+            </a:fld>
+            <a:endParaRPr lang="en-US"/>
+          </a:p>
+        </p:txBody>
+      </p:sp>
     </p:spTree>
     <p:extLst>
       <p:ext uri="{BB962C8B-B14F-4D97-AF65-F5344CB8AC3E}">
@@ -3878,6 +4882,64 @@
           </a:p>
         </p:txBody>
       </p:sp>
+      <p:sp>
+        <p:nvSpPr>
+          <p:cNvPr id="7" name="日期占位符 6">
+            <a:extLst>
+              <a:ext uri="{FF2B5EF4-FFF2-40B4-BE49-F238E27FC236}">
+                <a16:creationId xmlns:a16="http://schemas.microsoft.com/office/drawing/2014/main" id="{EB5A5D22-CF29-4D86-BB05-C2200298FDD4}"/>
+              </a:ext>
+            </a:extLst>
+          </p:cNvPr>
+          <p:cNvSpPr>
+            <a:spLocks noGrp="1"/>
+          </p:cNvSpPr>
+          <p:nvPr>
+            <p:ph type="dt" sz="half" idx="10"/>
+          </p:nvPr>
+        </p:nvSpPr>
+        <p:spPr/>
+        <p:txBody>
+          <a:bodyPr/>
+          <a:lstStyle/>
+          <a:p>
+            <a:fld id="{A871C4F0-1127-448D-8D03-CE814C5D2706}" type="datetime1">
+              <a:rPr lang="en-US" altLang="zh-CN" smtClean="0"/>
+              <a:t>9/23/19</a:t>
+            </a:fld>
+            <a:endParaRPr lang="en-US"/>
+          </a:p>
+        </p:txBody>
+      </p:sp>
+      <p:sp>
+        <p:nvSpPr>
+          <p:cNvPr id="8" name="灯片编号占位符 7">
+            <a:extLst>
+              <a:ext uri="{FF2B5EF4-FFF2-40B4-BE49-F238E27FC236}">
+                <a16:creationId xmlns:a16="http://schemas.microsoft.com/office/drawing/2014/main" id="{5482CCEA-766C-4FE7-BA5B-83AACEB587C8}"/>
+              </a:ext>
+            </a:extLst>
+          </p:cNvPr>
+          <p:cNvSpPr>
+            <a:spLocks noGrp="1"/>
+          </p:cNvSpPr>
+          <p:nvPr>
+            <p:ph type="sldNum" sz="quarter" idx="12"/>
+          </p:nvPr>
+        </p:nvSpPr>
+        <p:spPr/>
+        <p:txBody>
+          <a:bodyPr/>
+          <a:lstStyle/>
+          <a:p>
+            <a:fld id="{93D7A402-3076-2049-A745-4823B471CC62}" type="slidenum">
+              <a:rPr lang="en-US" smtClean="0"/>
+              <a:t>3</a:t>
+            </a:fld>
+            <a:endParaRPr lang="en-US"/>
+          </a:p>
+        </p:txBody>
+      </p:sp>
     </p:spTree>
     <p:extLst>
       <p:ext uri="{BB962C8B-B14F-4D97-AF65-F5344CB8AC3E}">
@@ -4635,6 +5697,64 @@
           </a:fontRef>
         </p:style>
       </p:cxnSp>
+      <p:sp>
+        <p:nvSpPr>
+          <p:cNvPr id="3" name="日期占位符 2">
+            <a:extLst>
+              <a:ext uri="{FF2B5EF4-FFF2-40B4-BE49-F238E27FC236}">
+                <a16:creationId xmlns:a16="http://schemas.microsoft.com/office/drawing/2014/main" id="{10E00656-63CA-4714-BF82-EE1F75978D48}"/>
+              </a:ext>
+            </a:extLst>
+          </p:cNvPr>
+          <p:cNvSpPr>
+            <a:spLocks noGrp="1"/>
+          </p:cNvSpPr>
+          <p:nvPr>
+            <p:ph type="dt" sz="half" idx="10"/>
+          </p:nvPr>
+        </p:nvSpPr>
+        <p:spPr/>
+        <p:txBody>
+          <a:bodyPr/>
+          <a:lstStyle/>
+          <a:p>
+            <a:fld id="{1255B269-F348-439F-A6D0-CBB90A314411}" type="datetime1">
+              <a:rPr lang="en-US" altLang="zh-CN" smtClean="0"/>
+              <a:t>9/23/19</a:t>
+            </a:fld>
+            <a:endParaRPr lang="en-US"/>
+          </a:p>
+        </p:txBody>
+      </p:sp>
+      <p:sp>
+        <p:nvSpPr>
+          <p:cNvPr id="4" name="灯片编号占位符 3">
+            <a:extLst>
+              <a:ext uri="{FF2B5EF4-FFF2-40B4-BE49-F238E27FC236}">
+                <a16:creationId xmlns:a16="http://schemas.microsoft.com/office/drawing/2014/main" id="{20B303A2-06DF-439F-8FD1-47A9E80DC47C}"/>
+              </a:ext>
+            </a:extLst>
+          </p:cNvPr>
+          <p:cNvSpPr>
+            <a:spLocks noGrp="1"/>
+          </p:cNvSpPr>
+          <p:nvPr>
+            <p:ph type="sldNum" sz="quarter" idx="12"/>
+          </p:nvPr>
+        </p:nvSpPr>
+        <p:spPr/>
+        <p:txBody>
+          <a:bodyPr/>
+          <a:lstStyle/>
+          <a:p>
+            <a:fld id="{93D7A402-3076-2049-A745-4823B471CC62}" type="slidenum">
+              <a:rPr lang="en-US" smtClean="0"/>
+              <a:t>4</a:t>
+            </a:fld>
+            <a:endParaRPr lang="en-US"/>
+          </a:p>
+        </p:txBody>
+      </p:sp>
     </p:spTree>
     <p:extLst>
       <p:ext uri="{BB962C8B-B14F-4D97-AF65-F5344CB8AC3E}">
@@ -4968,6 +6088,64 @@
           </a:p>
         </p:txBody>
       </p:sp>
+      <p:sp>
+        <p:nvSpPr>
+          <p:cNvPr id="4" name="日期占位符 3">
+            <a:extLst>
+              <a:ext uri="{FF2B5EF4-FFF2-40B4-BE49-F238E27FC236}">
+                <a16:creationId xmlns:a16="http://schemas.microsoft.com/office/drawing/2014/main" id="{C994E394-047A-4693-BDC7-386A16AABCF9}"/>
+              </a:ext>
+            </a:extLst>
+          </p:cNvPr>
+          <p:cNvSpPr>
+            <a:spLocks noGrp="1"/>
+          </p:cNvSpPr>
+          <p:nvPr>
+            <p:ph type="dt" sz="half" idx="10"/>
+          </p:nvPr>
+        </p:nvSpPr>
+        <p:spPr/>
+        <p:txBody>
+          <a:bodyPr/>
+          <a:lstStyle/>
+          <a:p>
+            <a:fld id="{CF64532A-7BDE-40DC-A051-D57142ED605E}" type="datetime1">
+              <a:rPr lang="en-US" altLang="zh-CN" smtClean="0"/>
+              <a:t>9/23/19</a:t>
+            </a:fld>
+            <a:endParaRPr lang="en-US"/>
+          </a:p>
+        </p:txBody>
+      </p:sp>
+      <p:sp>
+        <p:nvSpPr>
+          <p:cNvPr id="5" name="灯片编号占位符 4">
+            <a:extLst>
+              <a:ext uri="{FF2B5EF4-FFF2-40B4-BE49-F238E27FC236}">
+                <a16:creationId xmlns:a16="http://schemas.microsoft.com/office/drawing/2014/main" id="{450C055F-2429-430B-834A-EE8B83228E03}"/>
+              </a:ext>
+            </a:extLst>
+          </p:cNvPr>
+          <p:cNvSpPr>
+            <a:spLocks noGrp="1"/>
+          </p:cNvSpPr>
+          <p:nvPr>
+            <p:ph type="sldNum" sz="quarter" idx="12"/>
+          </p:nvPr>
+        </p:nvSpPr>
+        <p:spPr/>
+        <p:txBody>
+          <a:bodyPr/>
+          <a:lstStyle/>
+          <a:p>
+            <a:fld id="{93D7A402-3076-2049-A745-4823B471CC62}" type="slidenum">
+              <a:rPr lang="en-US" smtClean="0"/>
+              <a:t>5</a:t>
+            </a:fld>
+            <a:endParaRPr lang="en-US"/>
+          </a:p>
+        </p:txBody>
+      </p:sp>
     </p:spTree>
     <p:extLst>
       <p:ext uri="{BB962C8B-B14F-4D97-AF65-F5344CB8AC3E}">
@@ -5135,10 +6313,795 @@
           </a:p>
         </p:txBody>
       </p:sp>
+      <p:sp>
+        <p:nvSpPr>
+          <p:cNvPr id="4" name="日期占位符 3">
+            <a:extLst>
+              <a:ext uri="{FF2B5EF4-FFF2-40B4-BE49-F238E27FC236}">
+                <a16:creationId xmlns:a16="http://schemas.microsoft.com/office/drawing/2014/main" id="{459C68B2-B75D-438D-B7C9-B7AEFBC4C2F3}"/>
+              </a:ext>
+            </a:extLst>
+          </p:cNvPr>
+          <p:cNvSpPr>
+            <a:spLocks noGrp="1"/>
+          </p:cNvSpPr>
+          <p:nvPr>
+            <p:ph type="dt" sz="half" idx="10"/>
+          </p:nvPr>
+        </p:nvSpPr>
+        <p:spPr/>
+        <p:txBody>
+          <a:bodyPr/>
+          <a:lstStyle/>
+          <a:p>
+            <a:fld id="{57C153ED-CC8E-4B72-9AF7-5F1AF4B98566}" type="datetime1">
+              <a:rPr lang="en-US" altLang="zh-CN" smtClean="0"/>
+              <a:t>9/23/19</a:t>
+            </a:fld>
+            <a:endParaRPr lang="en-US"/>
+          </a:p>
+        </p:txBody>
+      </p:sp>
+      <p:sp>
+        <p:nvSpPr>
+          <p:cNvPr id="5" name="灯片编号占位符 4">
+            <a:extLst>
+              <a:ext uri="{FF2B5EF4-FFF2-40B4-BE49-F238E27FC236}">
+                <a16:creationId xmlns:a16="http://schemas.microsoft.com/office/drawing/2014/main" id="{75592EBE-4669-4329-9CC3-19C79DCE9255}"/>
+              </a:ext>
+            </a:extLst>
+          </p:cNvPr>
+          <p:cNvSpPr>
+            <a:spLocks noGrp="1"/>
+          </p:cNvSpPr>
+          <p:nvPr>
+            <p:ph type="sldNum" sz="quarter" idx="12"/>
+          </p:nvPr>
+        </p:nvSpPr>
+        <p:spPr/>
+        <p:txBody>
+          <a:bodyPr/>
+          <a:lstStyle/>
+          <a:p>
+            <a:fld id="{93D7A402-3076-2049-A745-4823B471CC62}" type="slidenum">
+              <a:rPr lang="en-US" smtClean="0"/>
+              <a:t>6</a:t>
+            </a:fld>
+            <a:endParaRPr lang="en-US"/>
+          </a:p>
+        </p:txBody>
+      </p:sp>
     </p:spTree>
     <p:extLst>
       <p:ext uri="{BB962C8B-B14F-4D97-AF65-F5344CB8AC3E}">
         <p14:creationId xmlns:p14="http://schemas.microsoft.com/office/powerpoint/2010/main" val="2788067291"/>
+      </p:ext>
+    </p:extLst>
+  </p:cSld>
+  <p:clrMapOvr>
+    <a:masterClrMapping/>
+  </p:clrMapOvr>
+</p:sld>
+</file>
+
+<file path=ppt/slides/slide7.xml><?xml version="1.0" encoding="utf-8"?>
+<p:sld xmlns:a="http://schemas.openxmlformats.org/drawingml/2006/main" xmlns:r="http://schemas.openxmlformats.org/officeDocument/2006/relationships" xmlns:p="http://schemas.openxmlformats.org/presentationml/2006/main">
+  <p:cSld>
+    <p:spTree>
+      <p:nvGrpSpPr>
+        <p:cNvPr id="1" name=""/>
+        <p:cNvGrpSpPr/>
+        <p:nvPr/>
+      </p:nvGrpSpPr>
+      <p:grpSpPr>
+        <a:xfrm>
+          <a:off x="0" y="0"/>
+          <a:ext cx="0" cy="0"/>
+          <a:chOff x="0" y="0"/>
+          <a:chExt cx="0" cy="0"/>
+        </a:xfrm>
+      </p:grpSpPr>
+      <p:sp>
+        <p:nvSpPr>
+          <p:cNvPr id="2" name="Title 1">
+            <a:extLst>
+              <a:ext uri="{FF2B5EF4-FFF2-40B4-BE49-F238E27FC236}">
+                <a16:creationId xmlns:a16="http://schemas.microsoft.com/office/drawing/2014/main" id="{B071AE84-1CB7-1C46-9F72-CB3FB82F3447}"/>
+              </a:ext>
+            </a:extLst>
+          </p:cNvPr>
+          <p:cNvSpPr>
+            <a:spLocks noGrp="1"/>
+          </p:cNvSpPr>
+          <p:nvPr>
+            <p:ph type="title"/>
+          </p:nvPr>
+        </p:nvSpPr>
+        <p:spPr/>
+        <p:txBody>
+          <a:bodyPr/>
+          <a:lstStyle/>
+          <a:p>
+            <a:r>
+              <a:rPr lang="en-US" altLang="zh-CN" dirty="0"/>
+              <a:t>Exp-TODO-1 </a:t>
+            </a:r>
+            <a:endParaRPr lang="en-US" dirty="0"/>
+          </a:p>
+        </p:txBody>
+      </p:sp>
+      <p:sp>
+        <p:nvSpPr>
+          <p:cNvPr id="3" name="Content Placeholder 2">
+            <a:extLst>
+              <a:ext uri="{FF2B5EF4-FFF2-40B4-BE49-F238E27FC236}">
+                <a16:creationId xmlns:a16="http://schemas.microsoft.com/office/drawing/2014/main" id="{5DE9B7D8-C997-384D-98CA-E108203C4B9C}"/>
+              </a:ext>
+            </a:extLst>
+          </p:cNvPr>
+          <p:cNvSpPr>
+            <a:spLocks noGrp="1"/>
+          </p:cNvSpPr>
+          <p:nvPr>
+            <p:ph idx="1"/>
+          </p:nvPr>
+        </p:nvSpPr>
+        <p:spPr>
+          <a:xfrm>
+            <a:off x="718931" y="1547329"/>
+            <a:ext cx="10515600" cy="4787209"/>
+          </a:xfrm>
+        </p:spPr>
+        <p:txBody>
+          <a:bodyPr>
+            <a:normAutofit/>
+          </a:bodyPr>
+          <a:lstStyle/>
+          <a:p>
+            <a:r>
+              <a:rPr lang="zh-CN" altLang="en-US" dirty="0"/>
+              <a:t>训练方式</a:t>
+            </a:r>
+            <a:r>
+              <a:rPr lang="en-US" altLang="zh-CN" dirty="0"/>
+              <a:t>: </a:t>
+            </a:r>
+            <a:r>
+              <a:rPr lang="zh-CN" altLang="en-US" dirty="0"/>
+              <a:t>针对同一个</a:t>
+            </a:r>
+            <a:r>
+              <a:rPr lang="en-US" altLang="zh-CN" dirty="0"/>
+              <a:t>filter</a:t>
+            </a:r>
+            <a:r>
+              <a:rPr lang="zh-CN" altLang="en-US" dirty="0"/>
+              <a:t>，现在的方法是对针对同一张图像优化至收敛。通过观察生成图片，生成的图像有</a:t>
+            </a:r>
+            <a:r>
+              <a:rPr lang="en-US" altLang="zh-CN" dirty="0"/>
+              <a:t>pattern</a:t>
+            </a:r>
+            <a:r>
+              <a:rPr lang="zh-CN" altLang="en-US" dirty="0"/>
+              <a:t>均匀，我们希望得到的是某一块特定的小区域。可以尝试的方法（按照优先级）</a:t>
+            </a:r>
+            <a:endParaRPr lang="en-US" altLang="zh-CN" dirty="0"/>
+          </a:p>
+          <a:p>
+            <a:pPr lvl="1"/>
+            <a:r>
+              <a:rPr lang="zh-CN" altLang="en-US" dirty="0"/>
+              <a:t>同一类图片，同时优化，比如同时优化</a:t>
+            </a:r>
+            <a:r>
+              <a:rPr lang="en-US" altLang="zh-CN" dirty="0"/>
+              <a:t>MNIST</a:t>
+            </a:r>
+            <a:r>
+              <a:rPr lang="zh-CN" altLang="en-US" dirty="0"/>
+              <a:t>的</a:t>
+            </a:r>
+            <a:r>
+              <a:rPr lang="en-US" altLang="zh-CN" dirty="0"/>
+              <a:t>1000</a:t>
+            </a:r>
+            <a:r>
+              <a:rPr lang="zh-CN" altLang="en-US" dirty="0"/>
+              <a:t>张图片，这样可能部分区域会比较明显</a:t>
+            </a:r>
+            <a:endParaRPr lang="en-US" altLang="zh-CN" dirty="0"/>
+          </a:p>
+          <a:p>
+            <a:pPr lvl="1"/>
+            <a:r>
+              <a:rPr lang="zh-CN" altLang="en-US" dirty="0"/>
+              <a:t>受</a:t>
+            </a:r>
+            <a:r>
+              <a:rPr lang="en-US" altLang="zh-CN" dirty="0"/>
+              <a:t>deep dream</a:t>
+            </a:r>
+            <a:r>
+              <a:rPr lang="zh-CN" altLang="en-US" dirty="0"/>
+              <a:t>启发，对生成的</a:t>
+            </a:r>
+            <a:r>
+              <a:rPr lang="en-US" altLang="zh-CN" dirty="0"/>
+              <a:t>feature map,</a:t>
+            </a:r>
+            <a:r>
+              <a:rPr lang="zh-CN" altLang="en-US" dirty="0"/>
+              <a:t>可以加入，比如：相邻像素要比较相似，来使得优化出来的图片的语义信息更加充分。</a:t>
+            </a:r>
+            <a:endParaRPr lang="en-US" altLang="zh-CN" dirty="0"/>
+          </a:p>
+          <a:p>
+            <a:pPr lvl="1"/>
+            <a:r>
+              <a:rPr lang="zh-CN" altLang="en-US" dirty="0"/>
+              <a:t>从结果出发</a:t>
+            </a:r>
+            <a:r>
+              <a:rPr lang="en-US" altLang="zh-CN" dirty="0"/>
+              <a:t>, </a:t>
+            </a:r>
+            <a:r>
+              <a:rPr lang="zh-CN" altLang="en-US" dirty="0"/>
+              <a:t>将 “小区域” 编码入网络的训练之中。</a:t>
+            </a:r>
+            <a:endParaRPr lang="en-US" altLang="zh-CN" dirty="0"/>
+          </a:p>
+        </p:txBody>
+      </p:sp>
+      <p:sp>
+        <p:nvSpPr>
+          <p:cNvPr id="4" name="日期占位符 3">
+            <a:extLst>
+              <a:ext uri="{FF2B5EF4-FFF2-40B4-BE49-F238E27FC236}">
+                <a16:creationId xmlns:a16="http://schemas.microsoft.com/office/drawing/2014/main" id="{2765B96B-3E85-40A3-A296-091D4989186B}"/>
+              </a:ext>
+            </a:extLst>
+          </p:cNvPr>
+          <p:cNvSpPr>
+            <a:spLocks noGrp="1"/>
+          </p:cNvSpPr>
+          <p:nvPr>
+            <p:ph type="dt" sz="half" idx="10"/>
+          </p:nvPr>
+        </p:nvSpPr>
+        <p:spPr/>
+        <p:txBody>
+          <a:bodyPr/>
+          <a:lstStyle/>
+          <a:p>
+            <a:fld id="{BF677F50-21D8-40BE-B8F0-B2270733CF6B}" type="datetime1">
+              <a:rPr lang="en-US" altLang="zh-CN" smtClean="0"/>
+              <a:t>9/23/19</a:t>
+            </a:fld>
+            <a:endParaRPr lang="en-US"/>
+          </a:p>
+        </p:txBody>
+      </p:sp>
+      <p:sp>
+        <p:nvSpPr>
+          <p:cNvPr id="5" name="灯片编号占位符 4">
+            <a:extLst>
+              <a:ext uri="{FF2B5EF4-FFF2-40B4-BE49-F238E27FC236}">
+                <a16:creationId xmlns:a16="http://schemas.microsoft.com/office/drawing/2014/main" id="{57EAF1FF-820C-427B-BE1E-A008AA61BA6C}"/>
+              </a:ext>
+            </a:extLst>
+          </p:cNvPr>
+          <p:cNvSpPr>
+            <a:spLocks noGrp="1"/>
+          </p:cNvSpPr>
+          <p:nvPr>
+            <p:ph type="sldNum" sz="quarter" idx="12"/>
+          </p:nvPr>
+        </p:nvSpPr>
+        <p:spPr/>
+        <p:txBody>
+          <a:bodyPr/>
+          <a:lstStyle/>
+          <a:p>
+            <a:fld id="{93D7A402-3076-2049-A745-4823B471CC62}" type="slidenum">
+              <a:rPr lang="en-US" smtClean="0"/>
+              <a:t>7</a:t>
+            </a:fld>
+            <a:endParaRPr lang="en-US"/>
+          </a:p>
+        </p:txBody>
+      </p:sp>
+    </p:spTree>
+    <p:extLst>
+      <p:ext uri="{BB962C8B-B14F-4D97-AF65-F5344CB8AC3E}">
+        <p14:creationId xmlns:p14="http://schemas.microsoft.com/office/powerpoint/2010/main" val="1298032522"/>
+      </p:ext>
+    </p:extLst>
+  </p:cSld>
+  <p:clrMapOvr>
+    <a:masterClrMapping/>
+  </p:clrMapOvr>
+</p:sld>
+</file>
+
+<file path=ppt/slides/slide8.xml><?xml version="1.0" encoding="utf-8"?>
+<p:sld xmlns:a="http://schemas.openxmlformats.org/drawingml/2006/main" xmlns:r="http://schemas.openxmlformats.org/officeDocument/2006/relationships" xmlns:p="http://schemas.openxmlformats.org/presentationml/2006/main">
+  <p:cSld>
+    <p:spTree>
+      <p:nvGrpSpPr>
+        <p:cNvPr id="1" name=""/>
+        <p:cNvGrpSpPr/>
+        <p:nvPr/>
+      </p:nvGrpSpPr>
+      <p:grpSpPr>
+        <a:xfrm>
+          <a:off x="0" y="0"/>
+          <a:ext cx="0" cy="0"/>
+          <a:chOff x="0" y="0"/>
+          <a:chExt cx="0" cy="0"/>
+        </a:xfrm>
+      </p:grpSpPr>
+      <p:sp>
+        <p:nvSpPr>
+          <p:cNvPr id="2" name="Title 1">
+            <a:extLst>
+              <a:ext uri="{FF2B5EF4-FFF2-40B4-BE49-F238E27FC236}">
+                <a16:creationId xmlns:a16="http://schemas.microsoft.com/office/drawing/2014/main" id="{B071AE84-1CB7-1C46-9F72-CB3FB82F3447}"/>
+              </a:ext>
+            </a:extLst>
+          </p:cNvPr>
+          <p:cNvSpPr>
+            <a:spLocks noGrp="1"/>
+          </p:cNvSpPr>
+          <p:nvPr>
+            <p:ph type="title"/>
+          </p:nvPr>
+        </p:nvSpPr>
+        <p:spPr/>
+        <p:txBody>
+          <a:bodyPr/>
+          <a:lstStyle/>
+          <a:p>
+            <a:r>
+              <a:rPr lang="en-US" altLang="zh-CN" dirty="0"/>
+              <a:t>Exp-TODO-2</a:t>
+            </a:r>
+            <a:endParaRPr lang="en-US" dirty="0"/>
+          </a:p>
+        </p:txBody>
+      </p:sp>
+      <p:sp>
+        <p:nvSpPr>
+          <p:cNvPr id="3" name="Content Placeholder 2">
+            <a:extLst>
+              <a:ext uri="{FF2B5EF4-FFF2-40B4-BE49-F238E27FC236}">
+                <a16:creationId xmlns:a16="http://schemas.microsoft.com/office/drawing/2014/main" id="{5DE9B7D8-C997-384D-98CA-E108203C4B9C}"/>
+              </a:ext>
+            </a:extLst>
+          </p:cNvPr>
+          <p:cNvSpPr>
+            <a:spLocks noGrp="1"/>
+          </p:cNvSpPr>
+          <p:nvPr>
+            <p:ph idx="1"/>
+          </p:nvPr>
+        </p:nvSpPr>
+        <p:spPr>
+          <a:xfrm>
+            <a:off x="718931" y="1547329"/>
+            <a:ext cx="10515600" cy="4787209"/>
+          </a:xfrm>
+        </p:spPr>
+        <p:txBody>
+          <a:bodyPr>
+            <a:normAutofit/>
+          </a:bodyPr>
+          <a:lstStyle/>
+          <a:p>
+            <a:r>
+              <a:rPr lang="zh-CN" altLang="en-US" dirty="0"/>
+              <a:t>选择</a:t>
+            </a:r>
+            <a:r>
+              <a:rPr lang="en-US" altLang="zh-CN" dirty="0"/>
+              <a:t>filter</a:t>
+            </a:r>
+            <a:r>
+              <a:rPr lang="zh-CN" altLang="en-US" dirty="0"/>
+              <a:t>生成的</a:t>
+            </a:r>
+            <a:r>
+              <a:rPr lang="en-US" altLang="zh-CN" dirty="0"/>
+              <a:t>feature map</a:t>
+            </a:r>
+            <a:r>
+              <a:rPr lang="zh-CN" altLang="en-US" dirty="0"/>
+              <a:t>的方法：思路是，对输入图片，选择响应最强的</a:t>
+            </a:r>
+            <a:r>
+              <a:rPr lang="en-US" altLang="zh-CN" dirty="0"/>
+              <a:t>feature map</a:t>
+            </a:r>
+            <a:r>
+              <a:rPr lang="zh-CN" altLang="en-US" dirty="0"/>
+              <a:t>对应的</a:t>
+            </a:r>
+            <a:r>
+              <a:rPr lang="en-US" altLang="zh-CN" dirty="0"/>
+              <a:t>filter</a:t>
+            </a:r>
+            <a:r>
+              <a:rPr lang="zh-CN" altLang="en-US" dirty="0"/>
+              <a:t>作为观察的对象。</a:t>
+            </a:r>
+            <a:endParaRPr lang="en-US" altLang="zh-CN" dirty="0"/>
+          </a:p>
+          <a:p>
+            <a:pPr lvl="1"/>
+            <a:r>
+              <a:rPr lang="zh-CN" altLang="en-US" dirty="0"/>
+              <a:t>对于不同类别，</a:t>
+            </a:r>
+            <a:r>
+              <a:rPr lang="en-US" altLang="zh-CN" dirty="0"/>
+              <a:t>filter</a:t>
+            </a:r>
+            <a:r>
+              <a:rPr lang="zh-CN" altLang="en-US" dirty="0"/>
+              <a:t>可能不一样。</a:t>
+            </a:r>
+            <a:endParaRPr lang="en-US" altLang="zh-CN" dirty="0"/>
+          </a:p>
+          <a:p>
+            <a:pPr lvl="1"/>
+            <a:r>
+              <a:rPr lang="zh-CN" altLang="en-US" dirty="0"/>
+              <a:t>对于同一类的一批数据，可能需要通过统计的方式，选择平均响应最强对应的</a:t>
+            </a:r>
+            <a:r>
+              <a:rPr lang="en-US" altLang="zh-CN" dirty="0"/>
+              <a:t>filter</a:t>
+            </a:r>
+            <a:r>
+              <a:rPr lang="zh-CN" altLang="en-US" dirty="0"/>
+              <a:t>来作为实验对象。</a:t>
+            </a:r>
+            <a:endParaRPr lang="en-US" altLang="zh-CN" dirty="0"/>
+          </a:p>
+          <a:p>
+            <a:pPr lvl="1"/>
+            <a:r>
+              <a:rPr lang="zh-CN" altLang="en-US" dirty="0"/>
+              <a:t>定义最强：</a:t>
+            </a:r>
+            <a:endParaRPr lang="en-US" altLang="zh-CN" dirty="0"/>
+          </a:p>
+          <a:p>
+            <a:pPr lvl="2"/>
+            <a:r>
+              <a:rPr lang="zh-CN" altLang="en-US" dirty="0"/>
+              <a:t>平均绝对值幅值最大</a:t>
+            </a:r>
+            <a:endParaRPr lang="en-US" altLang="zh-CN" dirty="0"/>
+          </a:p>
+          <a:p>
+            <a:pPr lvl="2"/>
+            <a:r>
+              <a:rPr lang="zh-CN" altLang="en-US" dirty="0"/>
+              <a:t>参考</a:t>
+            </a:r>
+            <a:r>
+              <a:rPr lang="en-US" altLang="zh-CN" dirty="0"/>
+              <a:t>dissection</a:t>
+            </a:r>
+            <a:r>
+              <a:rPr lang="zh-CN" altLang="en-US" dirty="0"/>
+              <a:t>，</a:t>
+            </a:r>
+            <a:r>
+              <a:rPr lang="en-US" altLang="zh-CN" dirty="0" err="1"/>
+              <a:t>zhoubolei</a:t>
+            </a:r>
+            <a:endParaRPr lang="en-US" altLang="zh-CN" dirty="0"/>
+          </a:p>
+          <a:p>
+            <a:pPr lvl="2"/>
+            <a:r>
+              <a:rPr lang="zh-CN" altLang="en-US" dirty="0"/>
+              <a:t>参考</a:t>
+            </a:r>
+            <a:r>
+              <a:rPr lang="en-US" altLang="zh-CN" dirty="0"/>
+              <a:t>eccv2014</a:t>
+            </a:r>
+            <a:r>
+              <a:rPr lang="zh-CN" altLang="en-US" dirty="0"/>
+              <a:t>， </a:t>
+            </a:r>
+            <a:r>
+              <a:rPr lang="en-US" altLang="zh-CN" dirty="0" err="1"/>
+              <a:t>visualizeing</a:t>
+            </a:r>
+            <a:r>
+              <a:rPr lang="zh-CN" altLang="en-US" dirty="0"/>
+              <a:t>的选择方式</a:t>
+            </a:r>
+            <a:endParaRPr lang="en-US" altLang="zh-CN" dirty="0"/>
+          </a:p>
+          <a:p>
+            <a:pPr lvl="2"/>
+            <a:endParaRPr lang="en-US" altLang="zh-CN" dirty="0"/>
+          </a:p>
+          <a:p>
+            <a:pPr lvl="1"/>
+            <a:endParaRPr lang="en-US" altLang="zh-CN" dirty="0"/>
+          </a:p>
+        </p:txBody>
+      </p:sp>
+      <p:sp>
+        <p:nvSpPr>
+          <p:cNvPr id="4" name="日期占位符 3">
+            <a:extLst>
+              <a:ext uri="{FF2B5EF4-FFF2-40B4-BE49-F238E27FC236}">
+                <a16:creationId xmlns:a16="http://schemas.microsoft.com/office/drawing/2014/main" id="{2765B96B-3E85-40A3-A296-091D4989186B}"/>
+              </a:ext>
+            </a:extLst>
+          </p:cNvPr>
+          <p:cNvSpPr>
+            <a:spLocks noGrp="1"/>
+          </p:cNvSpPr>
+          <p:nvPr>
+            <p:ph type="dt" sz="half" idx="10"/>
+          </p:nvPr>
+        </p:nvSpPr>
+        <p:spPr/>
+        <p:txBody>
+          <a:bodyPr/>
+          <a:lstStyle/>
+          <a:p>
+            <a:fld id="{BF677F50-21D8-40BE-B8F0-B2270733CF6B}" type="datetime1">
+              <a:rPr lang="en-US" altLang="zh-CN" smtClean="0"/>
+              <a:t>9/23/19</a:t>
+            </a:fld>
+            <a:endParaRPr lang="en-US"/>
+          </a:p>
+        </p:txBody>
+      </p:sp>
+      <p:sp>
+        <p:nvSpPr>
+          <p:cNvPr id="5" name="灯片编号占位符 4">
+            <a:extLst>
+              <a:ext uri="{FF2B5EF4-FFF2-40B4-BE49-F238E27FC236}">
+                <a16:creationId xmlns:a16="http://schemas.microsoft.com/office/drawing/2014/main" id="{57EAF1FF-820C-427B-BE1E-A008AA61BA6C}"/>
+              </a:ext>
+            </a:extLst>
+          </p:cNvPr>
+          <p:cNvSpPr>
+            <a:spLocks noGrp="1"/>
+          </p:cNvSpPr>
+          <p:nvPr>
+            <p:ph type="sldNum" sz="quarter" idx="12"/>
+          </p:nvPr>
+        </p:nvSpPr>
+        <p:spPr/>
+        <p:txBody>
+          <a:bodyPr/>
+          <a:lstStyle/>
+          <a:p>
+            <a:fld id="{93D7A402-3076-2049-A745-4823B471CC62}" type="slidenum">
+              <a:rPr lang="en-US" smtClean="0"/>
+              <a:t>8</a:t>
+            </a:fld>
+            <a:endParaRPr lang="en-US"/>
+          </a:p>
+        </p:txBody>
+      </p:sp>
+    </p:spTree>
+    <p:extLst>
+      <p:ext uri="{BB962C8B-B14F-4D97-AF65-F5344CB8AC3E}">
+        <p14:creationId xmlns:p14="http://schemas.microsoft.com/office/powerpoint/2010/main" val="3011895022"/>
+      </p:ext>
+    </p:extLst>
+  </p:cSld>
+  <p:clrMapOvr>
+    <a:masterClrMapping/>
+  </p:clrMapOvr>
+</p:sld>
+</file>
+
+<file path=ppt/slides/slide9.xml><?xml version="1.0" encoding="utf-8"?>
+<p:sld xmlns:a="http://schemas.openxmlformats.org/drawingml/2006/main" xmlns:r="http://schemas.openxmlformats.org/officeDocument/2006/relationships" xmlns:p="http://schemas.openxmlformats.org/presentationml/2006/main">
+  <p:cSld>
+    <p:spTree>
+      <p:nvGrpSpPr>
+        <p:cNvPr id="1" name=""/>
+        <p:cNvGrpSpPr/>
+        <p:nvPr/>
+      </p:nvGrpSpPr>
+      <p:grpSpPr>
+        <a:xfrm>
+          <a:off x="0" y="0"/>
+          <a:ext cx="0" cy="0"/>
+          <a:chOff x="0" y="0"/>
+          <a:chExt cx="0" cy="0"/>
+        </a:xfrm>
+      </p:grpSpPr>
+      <p:sp>
+        <p:nvSpPr>
+          <p:cNvPr id="2" name="Title 1">
+            <a:extLst>
+              <a:ext uri="{FF2B5EF4-FFF2-40B4-BE49-F238E27FC236}">
+                <a16:creationId xmlns:a16="http://schemas.microsoft.com/office/drawing/2014/main" id="{B071AE84-1CB7-1C46-9F72-CB3FB82F3447}"/>
+              </a:ext>
+            </a:extLst>
+          </p:cNvPr>
+          <p:cNvSpPr>
+            <a:spLocks noGrp="1"/>
+          </p:cNvSpPr>
+          <p:nvPr>
+            <p:ph type="title"/>
+          </p:nvPr>
+        </p:nvSpPr>
+        <p:spPr/>
+        <p:txBody>
+          <a:bodyPr/>
+          <a:lstStyle/>
+          <a:p>
+            <a:r>
+              <a:rPr lang="en-US" altLang="zh-CN" dirty="0"/>
+              <a:t>Exp-TODO-3 </a:t>
+            </a:r>
+            <a:r>
+              <a:rPr lang="zh-CN" altLang="en-US" dirty="0"/>
+              <a:t>观察性实验</a:t>
+            </a:r>
+            <a:endParaRPr lang="en-US" dirty="0"/>
+          </a:p>
+        </p:txBody>
+      </p:sp>
+      <p:sp>
+        <p:nvSpPr>
+          <p:cNvPr id="3" name="Content Placeholder 2">
+            <a:extLst>
+              <a:ext uri="{FF2B5EF4-FFF2-40B4-BE49-F238E27FC236}">
+                <a16:creationId xmlns:a16="http://schemas.microsoft.com/office/drawing/2014/main" id="{5DE9B7D8-C997-384D-98CA-E108203C4B9C}"/>
+              </a:ext>
+            </a:extLst>
+          </p:cNvPr>
+          <p:cNvSpPr>
+            <a:spLocks noGrp="1"/>
+          </p:cNvSpPr>
+          <p:nvPr>
+            <p:ph idx="1"/>
+          </p:nvPr>
+        </p:nvSpPr>
+        <p:spPr>
+          <a:xfrm>
+            <a:off x="718931" y="1547329"/>
+            <a:ext cx="10515600" cy="4787209"/>
+          </a:xfrm>
+        </p:spPr>
+        <p:txBody>
+          <a:bodyPr>
+            <a:normAutofit/>
+          </a:bodyPr>
+          <a:lstStyle/>
+          <a:p>
+            <a:endParaRPr lang="en-US" altLang="zh-CN" dirty="0"/>
+          </a:p>
+          <a:p>
+            <a:pPr lvl="1"/>
+            <a:r>
+              <a:rPr lang="zh-CN" altLang="en-US" dirty="0"/>
+              <a:t>对于同一张图，选定</a:t>
+            </a:r>
+            <a:r>
+              <a:rPr lang="en-US" altLang="zh-CN" dirty="0"/>
+              <a:t>filter</a:t>
+            </a:r>
+            <a:r>
+              <a:rPr lang="zh-CN" altLang="en-US" dirty="0"/>
+              <a:t>之后产生的</a:t>
+            </a:r>
+            <a:r>
+              <a:rPr lang="en-US" altLang="zh-CN" dirty="0"/>
+              <a:t>feature map</a:t>
+            </a:r>
+            <a:r>
+              <a:rPr lang="zh-CN" altLang="en-US" dirty="0"/>
+              <a:t>（做了插值放大）和优化出来的图片，视觉上应该有什么差别？</a:t>
+            </a:r>
+            <a:endParaRPr lang="en-US" altLang="zh-CN" dirty="0"/>
+          </a:p>
+          <a:p>
+            <a:pPr lvl="2"/>
+            <a:r>
+              <a:rPr lang="zh-CN" altLang="en-US" dirty="0"/>
+              <a:t>（</a:t>
+            </a:r>
+            <a:r>
+              <a:rPr lang="en-US" altLang="zh-CN" dirty="0"/>
+              <a:t>JX</a:t>
+            </a:r>
+            <a:r>
+              <a:rPr lang="zh-CN" altLang="en-US" dirty="0"/>
+              <a:t>）可能区域的位置上比较重合，但是优化出来的图像应该保留了更加丰富的信息，因为经过逐层的流动，信息应该是越来越抽象的。</a:t>
+            </a:r>
+            <a:endParaRPr lang="en-US" altLang="zh-CN" sz="1800" dirty="0"/>
+          </a:p>
+          <a:p>
+            <a:pPr lvl="1"/>
+            <a:r>
+              <a:rPr lang="zh-CN" altLang="en-US" sz="2200" dirty="0"/>
+              <a:t>同一类优化出来的图片是否具有共性（无论是一张图优化，还是一批图优化）</a:t>
+            </a:r>
+            <a:endParaRPr lang="en-US" altLang="zh-CN" sz="2200" dirty="0"/>
+          </a:p>
+        </p:txBody>
+      </p:sp>
+      <p:sp>
+        <p:nvSpPr>
+          <p:cNvPr id="4" name="日期占位符 3">
+            <a:extLst>
+              <a:ext uri="{FF2B5EF4-FFF2-40B4-BE49-F238E27FC236}">
+                <a16:creationId xmlns:a16="http://schemas.microsoft.com/office/drawing/2014/main" id="{2765B96B-3E85-40A3-A296-091D4989186B}"/>
+              </a:ext>
+            </a:extLst>
+          </p:cNvPr>
+          <p:cNvSpPr>
+            <a:spLocks noGrp="1"/>
+          </p:cNvSpPr>
+          <p:nvPr>
+            <p:ph type="dt" sz="half" idx="10"/>
+          </p:nvPr>
+        </p:nvSpPr>
+        <p:spPr/>
+        <p:txBody>
+          <a:bodyPr/>
+          <a:lstStyle/>
+          <a:p>
+            <a:fld id="{BF677F50-21D8-40BE-B8F0-B2270733CF6B}" type="datetime1">
+              <a:rPr lang="en-US" altLang="zh-CN" smtClean="0"/>
+              <a:t>9/23/19</a:t>
+            </a:fld>
+            <a:endParaRPr lang="en-US"/>
+          </a:p>
+        </p:txBody>
+      </p:sp>
+      <p:sp>
+        <p:nvSpPr>
+          <p:cNvPr id="5" name="灯片编号占位符 4">
+            <a:extLst>
+              <a:ext uri="{FF2B5EF4-FFF2-40B4-BE49-F238E27FC236}">
+                <a16:creationId xmlns:a16="http://schemas.microsoft.com/office/drawing/2014/main" id="{57EAF1FF-820C-427B-BE1E-A008AA61BA6C}"/>
+              </a:ext>
+            </a:extLst>
+          </p:cNvPr>
+          <p:cNvSpPr>
+            <a:spLocks noGrp="1"/>
+          </p:cNvSpPr>
+          <p:nvPr>
+            <p:ph type="sldNum" sz="quarter" idx="12"/>
+          </p:nvPr>
+        </p:nvSpPr>
+        <p:spPr/>
+        <p:txBody>
+          <a:bodyPr/>
+          <a:lstStyle/>
+          <a:p>
+            <a:fld id="{93D7A402-3076-2049-A745-4823B471CC62}" type="slidenum">
+              <a:rPr lang="en-US" smtClean="0"/>
+              <a:t>9</a:t>
+            </a:fld>
+            <a:endParaRPr lang="en-US"/>
+          </a:p>
+        </p:txBody>
+      </p:sp>
+    </p:spTree>
+    <p:extLst>
+      <p:ext uri="{BB962C8B-B14F-4D97-AF65-F5344CB8AC3E}">
+        <p14:creationId xmlns:p14="http://schemas.microsoft.com/office/powerpoint/2010/main" val="1465195693"/>
       </p:ext>
     </p:extLst>
   </p:cSld>
@@ -5441,4 +7404,299 @@
     </a:ext>
   </a:extLst>
 </a:theme>
+</file>
+
+<file path=ppt/theme/theme2.xml><?xml version="1.0" encoding="utf-8"?>
+<a:theme xmlns:a="http://schemas.openxmlformats.org/drawingml/2006/main" name="Office 主题​​">
+  <a:themeElements>
+    <a:clrScheme name="Office">
+      <a:dk1>
+        <a:sysClr val="windowText" lastClr="000000"/>
+      </a:dk1>
+      <a:lt1>
+        <a:sysClr val="window" lastClr="FFFFFF"/>
+      </a:lt1>
+      <a:dk2>
+        <a:srgbClr val="44546A"/>
+      </a:dk2>
+      <a:lt2>
+        <a:srgbClr val="E7E6E6"/>
+      </a:lt2>
+      <a:accent1>
+        <a:srgbClr val="4472C4"/>
+      </a:accent1>
+      <a:accent2>
+        <a:srgbClr val="ED7D31"/>
+      </a:accent2>
+      <a:accent3>
+        <a:srgbClr val="A5A5A5"/>
+      </a:accent3>
+      <a:accent4>
+        <a:srgbClr val="FFC000"/>
+      </a:accent4>
+      <a:accent5>
+        <a:srgbClr val="5B9BD5"/>
+      </a:accent5>
+      <a:accent6>
+        <a:srgbClr val="70AD47"/>
+      </a:accent6>
+      <a:hlink>
+        <a:srgbClr val="0563C1"/>
+      </a:hlink>
+      <a:folHlink>
+        <a:srgbClr val="954F72"/>
+      </a:folHlink>
+    </a:clrScheme>
+    <a:fontScheme name="Office">
+      <a:majorFont>
+        <a:latin typeface="等线 Light" panose="020F0302020204030204"/>
+        <a:ea typeface=""/>
+        <a:cs typeface=""/>
+        <a:font script="Jpan" typeface="游ゴシック Light"/>
+        <a:font script="Hang" typeface="맑은 고딕"/>
+        <a:font script="Hans" typeface="等线 Light"/>
+        <a:font script="Hant" typeface="新細明體"/>
+        <a:font script="Arab" typeface="Times New Roman"/>
+        <a:font script="Hebr" typeface="Times New Roman"/>
+        <a:font script="Thai" typeface="Angsana New"/>
+        <a:font script="Ethi" typeface="Nyala"/>
+        <a:font script="Beng" typeface="Vrinda"/>
+        <a:font script="Gujr" typeface="Shruti"/>
+        <a:font script="Khmr" typeface="MoolBoran"/>
+        <a:font script="Knda" typeface="Tunga"/>
+        <a:font script="Guru" typeface="Raavi"/>
+        <a:font script="Cans" typeface="Euphemia"/>
+        <a:font script="Cher" typeface="Plantagenet Cherokee"/>
+        <a:font script="Yiii" typeface="Microsoft Yi Baiti"/>
+        <a:font script="Tibt" typeface="Microsoft Himalaya"/>
+        <a:font script="Thaa" typeface="MV Boli"/>
+        <a:font script="Deva" typeface="Mangal"/>
+        <a:font script="Telu" typeface="Gautami"/>
+        <a:font script="Taml" typeface="Latha"/>
+        <a:font script="Syrc" typeface="Estrangelo Edessa"/>
+        <a:font script="Orya" typeface="Kalinga"/>
+        <a:font script="Mlym" typeface="Kartika"/>
+        <a:font script="Laoo" typeface="DokChampa"/>
+        <a:font script="Sinh" typeface="Iskoola Pota"/>
+        <a:font script="Mong" typeface="Mongolian Baiti"/>
+        <a:font script="Viet" typeface="Times New Roman"/>
+        <a:font script="Uigh" typeface="Microsoft Uighur"/>
+        <a:font script="Geor" typeface="Sylfaen"/>
+        <a:font script="Armn" typeface="Arial"/>
+        <a:font script="Bugi" typeface="Leelawadee UI"/>
+        <a:font script="Bopo" typeface="Microsoft JhengHei"/>
+        <a:font script="Java" typeface="Javanese Text"/>
+        <a:font script="Lisu" typeface="Segoe UI"/>
+        <a:font script="Mymr" typeface="Myanmar Text"/>
+        <a:font script="Nkoo" typeface="Ebrima"/>
+        <a:font script="Olck" typeface="Nirmala UI"/>
+        <a:font script="Osma" typeface="Ebrima"/>
+        <a:font script="Phag" typeface="Phagspa"/>
+        <a:font script="Syrn" typeface="Estrangelo Edessa"/>
+        <a:font script="Syrj" typeface="Estrangelo Edessa"/>
+        <a:font script="Syre" typeface="Estrangelo Edessa"/>
+        <a:font script="Sora" typeface="Nirmala UI"/>
+        <a:font script="Tale" typeface="Microsoft Tai Le"/>
+        <a:font script="Talu" typeface="Microsoft New Tai Lue"/>
+        <a:font script="Tfng" typeface="Ebrima"/>
+      </a:majorFont>
+      <a:minorFont>
+        <a:latin typeface="等线" panose="020F0502020204030204"/>
+        <a:ea typeface=""/>
+        <a:cs typeface=""/>
+        <a:font script="Jpan" typeface="游ゴシック"/>
+        <a:font script="Hang" typeface="맑은 고딕"/>
+        <a:font script="Hans" typeface="等线"/>
+        <a:font script="Hant" typeface="新細明體"/>
+        <a:font script="Arab" typeface="Arial"/>
+        <a:font script="Hebr" typeface="Arial"/>
+        <a:font script="Thai" typeface="Cordia New"/>
+        <a:font script="Ethi" typeface="Nyala"/>
+        <a:font script="Beng" typeface="Vrinda"/>
+        <a:font script="Gujr" typeface="Shruti"/>
+        <a:font script="Khmr" typeface="DaunPenh"/>
+        <a:font script="Knda" typeface="Tunga"/>
+        <a:font script="Guru" typeface="Raavi"/>
+        <a:font script="Cans" typeface="Euphemia"/>
+        <a:font script="Cher" typeface="Plantagenet Cherokee"/>
+        <a:font script="Yiii" typeface="Microsoft Yi Baiti"/>
+        <a:font script="Tibt" typeface="Microsoft Himalaya"/>
+        <a:font script="Thaa" typeface="MV Boli"/>
+        <a:font script="Deva" typeface="Mangal"/>
+        <a:font script="Telu" typeface="Gautami"/>
+        <a:font script="Taml" typeface="Latha"/>
+        <a:font script="Syrc" typeface="Estrangelo Edessa"/>
+        <a:font script="Orya" typeface="Kalinga"/>
+        <a:font script="Mlym" typeface="Kartika"/>
+        <a:font script="Laoo" typeface="DokChampa"/>
+        <a:font script="Sinh" typeface="Iskoola Pota"/>
+        <a:font script="Mong" typeface="Mongolian Baiti"/>
+        <a:font script="Viet" typeface="Arial"/>
+        <a:font script="Uigh" typeface="Microsoft Uighur"/>
+        <a:font script="Geor" typeface="Sylfaen"/>
+        <a:font script="Armn" typeface="Arial"/>
+        <a:font script="Bugi" typeface="Leelawadee UI"/>
+        <a:font script="Bopo" typeface="Microsoft JhengHei"/>
+        <a:font script="Java" typeface="Javanese Text"/>
+        <a:font script="Lisu" typeface="Segoe UI"/>
+        <a:font script="Mymr" typeface="Myanmar Text"/>
+        <a:font script="Nkoo" typeface="Ebrima"/>
+        <a:font script="Olck" typeface="Nirmala UI"/>
+        <a:font script="Osma" typeface="Ebrima"/>
+        <a:font script="Phag" typeface="Phagspa"/>
+        <a:font script="Syrn" typeface="Estrangelo Edessa"/>
+        <a:font script="Syrj" typeface="Estrangelo Edessa"/>
+        <a:font script="Syre" typeface="Estrangelo Edessa"/>
+        <a:font script="Sora" typeface="Nirmala UI"/>
+        <a:font script="Tale" typeface="Microsoft Tai Le"/>
+        <a:font script="Talu" typeface="Microsoft New Tai Lue"/>
+        <a:font script="Tfng" typeface="Ebrima"/>
+      </a:minorFont>
+    </a:fontScheme>
+    <a:fmtScheme name="Office">
+      <a:fillStyleLst>
+        <a:solidFill>
+          <a:schemeClr val="phClr"/>
+        </a:solidFill>
+        <a:gradFill rotWithShape="1">
+          <a:gsLst>
+            <a:gs pos="0">
+              <a:schemeClr val="phClr">
+                <a:lumMod val="110000"/>
+                <a:satMod val="105000"/>
+                <a:tint val="67000"/>
+              </a:schemeClr>
+            </a:gs>
+            <a:gs pos="50000">
+              <a:schemeClr val="phClr">
+                <a:lumMod val="105000"/>
+                <a:satMod val="103000"/>
+                <a:tint val="73000"/>
+              </a:schemeClr>
+            </a:gs>
+            <a:gs pos="100000">
+              <a:schemeClr val="phClr">
+                <a:lumMod val="105000"/>
+                <a:satMod val="109000"/>
+                <a:tint val="81000"/>
+              </a:schemeClr>
+            </a:gs>
+          </a:gsLst>
+          <a:lin ang="5400000" scaled="0"/>
+        </a:gradFill>
+        <a:gradFill rotWithShape="1">
+          <a:gsLst>
+            <a:gs pos="0">
+              <a:schemeClr val="phClr">
+                <a:satMod val="103000"/>
+                <a:lumMod val="102000"/>
+                <a:tint val="94000"/>
+              </a:schemeClr>
+            </a:gs>
+            <a:gs pos="50000">
+              <a:schemeClr val="phClr">
+                <a:satMod val="110000"/>
+                <a:lumMod val="100000"/>
+                <a:shade val="100000"/>
+              </a:schemeClr>
+            </a:gs>
+            <a:gs pos="100000">
+              <a:schemeClr val="phClr">
+                <a:lumMod val="99000"/>
+                <a:satMod val="120000"/>
+                <a:shade val="78000"/>
+              </a:schemeClr>
+            </a:gs>
+          </a:gsLst>
+          <a:lin ang="5400000" scaled="0"/>
+        </a:gradFill>
+      </a:fillStyleLst>
+      <a:lnStyleLst>
+        <a:ln w="6350" cap="flat" cmpd="sng" algn="ctr">
+          <a:solidFill>
+            <a:schemeClr val="phClr"/>
+          </a:solidFill>
+          <a:prstDash val="solid"/>
+          <a:miter lim="800000"/>
+        </a:ln>
+        <a:ln w="12700" cap="flat" cmpd="sng" algn="ctr">
+          <a:solidFill>
+            <a:schemeClr val="phClr"/>
+          </a:solidFill>
+          <a:prstDash val="solid"/>
+          <a:miter lim="800000"/>
+        </a:ln>
+        <a:ln w="19050" cap="flat" cmpd="sng" algn="ctr">
+          <a:solidFill>
+            <a:schemeClr val="phClr"/>
+          </a:solidFill>
+          <a:prstDash val="solid"/>
+          <a:miter lim="800000"/>
+        </a:ln>
+      </a:lnStyleLst>
+      <a:effectStyleLst>
+        <a:effectStyle>
+          <a:effectLst/>
+        </a:effectStyle>
+        <a:effectStyle>
+          <a:effectLst/>
+        </a:effectStyle>
+        <a:effectStyle>
+          <a:effectLst>
+            <a:outerShdw blurRad="57150" dist="19050" dir="5400000" algn="ctr" rotWithShape="0">
+              <a:srgbClr val="000000">
+                <a:alpha val="63000"/>
+              </a:srgbClr>
+            </a:outerShdw>
+          </a:effectLst>
+        </a:effectStyle>
+      </a:effectStyleLst>
+      <a:bgFillStyleLst>
+        <a:solidFill>
+          <a:schemeClr val="phClr"/>
+        </a:solidFill>
+        <a:solidFill>
+          <a:schemeClr val="phClr">
+            <a:tint val="95000"/>
+            <a:satMod val="170000"/>
+          </a:schemeClr>
+        </a:solidFill>
+        <a:gradFill rotWithShape="1">
+          <a:gsLst>
+            <a:gs pos="0">
+              <a:schemeClr val="phClr">
+                <a:tint val="93000"/>
+                <a:satMod val="150000"/>
+                <a:shade val="98000"/>
+                <a:lumMod val="102000"/>
+              </a:schemeClr>
+            </a:gs>
+            <a:gs pos="50000">
+              <a:schemeClr val="phClr">
+                <a:tint val="98000"/>
+                <a:satMod val="130000"/>
+                <a:shade val="90000"/>
+                <a:lumMod val="103000"/>
+              </a:schemeClr>
+            </a:gs>
+            <a:gs pos="100000">
+              <a:schemeClr val="phClr">
+                <a:shade val="63000"/>
+                <a:satMod val="120000"/>
+              </a:schemeClr>
+            </a:gs>
+          </a:gsLst>
+          <a:lin ang="5400000" scaled="0"/>
+        </a:gradFill>
+      </a:bgFillStyleLst>
+    </a:fmtScheme>
+  </a:themeElements>
+  <a:objectDefaults/>
+  <a:extraClrSchemeLst/>
+  <a:extLst>
+    <a:ext uri="{05A4C25C-085E-4340-85A3-A5531E510DB2}">
+      <thm15:themeFamily xmlns:thm15="http://schemas.microsoft.com/office/thememl/2012/main" name="Office Theme" id="{62F939B6-93AF-4DB8-9C6B-D6C7DFDC589F}" vid="{4A3C46E8-61CC-4603-A589-7422A47A8E4A}"/>
+    </a:ext>
+  </a:extLst>
+</a:theme>
 </file>
</xml_diff>

<commit_message>
try to add visualization of feature map and filter
</commit_message>
<xml_diff>
--- a/ppt/Interpretation-9-20.pptx
+++ b/ppt/Interpretation-9-20.pptx
@@ -5,7 +5,7 @@
     <p:sldMasterId id="2147483648" r:id="rId1"/>
   </p:sldMasterIdLst>
   <p:notesMasterIdLst>
-    <p:notesMasterId r:id="rId13"/>
+    <p:notesMasterId r:id="rId15"/>
   </p:notesMasterIdLst>
   <p:sldIdLst>
     <p:sldId id="256" r:id="rId2"/>
@@ -19,6 +19,8 @@
     <p:sldId id="265" r:id="rId10"/>
     <p:sldId id="266" r:id="rId11"/>
     <p:sldId id="267" r:id="rId12"/>
+    <p:sldId id="268" r:id="rId13"/>
+    <p:sldId id="269" r:id="rId14"/>
   </p:sldIdLst>
   <p:sldSz cx="12192000" cy="6858000"/>
   <p:notesSz cx="6858000" cy="9144000"/>
@@ -133,6 +135,8 @@
             <p14:sldId id="265"/>
             <p14:sldId id="266"/>
             <p14:sldId id="267"/>
+            <p14:sldId id="268"/>
+            <p14:sldId id="269"/>
           </p14:sldIdLst>
         </p14:section>
       </p14:sectionLst>
@@ -651,7 +655,7 @@
     </p:spTree>
     <p:extLst>
       <p:ext uri="{BB962C8B-B14F-4D97-AF65-F5344CB8AC3E}">
-        <p14:creationId xmlns:p14="http://schemas.microsoft.com/office/powerpoint/2010/main" val="1350635610"/>
+        <p14:creationId xmlns:p14="http://schemas.microsoft.com/office/powerpoint/2010/main" val="367010992"/>
       </p:ext>
     </p:extLst>
   </p:cSld>
@@ -4208,8 +4212,8 @@
           <a:lstStyle/>
           <a:p>
             <a:r>
-              <a:rPr lang="en-US" altLang="zh-CN" dirty="0"/>
-              <a:t>Exp-TODO-5 </a:t>
+              <a:rPr lang="en-US" altLang="zh-CN"/>
+              <a:t>Exp-TODO-4 </a:t>
             </a:r>
             <a:r>
               <a:rPr lang="zh-CN" altLang="en-US" dirty="0"/>
@@ -4252,16 +4256,8 @@
           <a:p>
             <a:pPr lvl="1"/>
             <a:r>
-              <a:rPr lang="zh-CN" altLang="en-US" dirty="0"/>
-              <a:t>在</a:t>
-            </a:r>
-            <a:r>
-              <a:rPr lang="en-US" altLang="zh-CN" dirty="0" err="1"/>
-              <a:t>imagenet</a:t>
-            </a:r>
-            <a:r>
-              <a:rPr lang="zh-CN" altLang="en-US" dirty="0"/>
-              <a:t>上重复实验，使用预先训练好的模型，选择训练集的图片即可（现在训练好的图片上，可能可以得到更容易解释的结果，然后再考虑更复杂的验证集）</a:t>
+              <a:rPr lang="zh-CN" altLang="en-US" sz="2200" dirty="0"/>
+              <a:t>更新好的图作为输入</a:t>
             </a:r>
             <a:endParaRPr lang="en-US" altLang="zh-CN" sz="2200" dirty="0"/>
           </a:p>
@@ -4328,7 +4324,382 @@
     </p:spTree>
     <p:extLst>
       <p:ext uri="{BB962C8B-B14F-4D97-AF65-F5344CB8AC3E}">
-        <p14:creationId xmlns:p14="http://schemas.microsoft.com/office/powerpoint/2010/main" val="3291905231"/>
+        <p14:creationId xmlns:p14="http://schemas.microsoft.com/office/powerpoint/2010/main" val="160395671"/>
+      </p:ext>
+    </p:extLst>
+  </p:cSld>
+  <p:clrMapOvr>
+    <a:masterClrMapping/>
+  </p:clrMapOvr>
+</p:sld>
+</file>
+
+<file path=ppt/slides/slide12.xml><?xml version="1.0" encoding="utf-8"?>
+<p:sld xmlns:a="http://schemas.openxmlformats.org/drawingml/2006/main" xmlns:r="http://schemas.openxmlformats.org/officeDocument/2006/relationships" xmlns:p="http://schemas.openxmlformats.org/presentationml/2006/main">
+  <p:cSld>
+    <p:spTree>
+      <p:nvGrpSpPr>
+        <p:cNvPr id="1" name=""/>
+        <p:cNvGrpSpPr/>
+        <p:nvPr/>
+      </p:nvGrpSpPr>
+      <p:grpSpPr>
+        <a:xfrm>
+          <a:off x="0" y="0"/>
+          <a:ext cx="0" cy="0"/>
+          <a:chOff x="0" y="0"/>
+          <a:chExt cx="0" cy="0"/>
+        </a:xfrm>
+      </p:grpSpPr>
+      <p:sp>
+        <p:nvSpPr>
+          <p:cNvPr id="2" name="Title 1">
+            <a:extLst>
+              <a:ext uri="{FF2B5EF4-FFF2-40B4-BE49-F238E27FC236}">
+                <a16:creationId xmlns:a16="http://schemas.microsoft.com/office/drawing/2014/main" id="{C7AD168B-F31C-F24B-A01A-D6C41301391F}"/>
+              </a:ext>
+            </a:extLst>
+          </p:cNvPr>
+          <p:cNvSpPr>
+            <a:spLocks noGrp="1"/>
+          </p:cNvSpPr>
+          <p:nvPr>
+            <p:ph type="title"/>
+          </p:nvPr>
+        </p:nvSpPr>
+        <p:spPr/>
+        <p:txBody>
+          <a:bodyPr/>
+          <a:lstStyle/>
+          <a:p>
+            <a:r>
+              <a:rPr lang="en-US" dirty="0"/>
+              <a:t>JX</a:t>
+            </a:r>
+            <a:r>
+              <a:rPr lang="en-US" altLang="zh-CN" dirty="0"/>
+              <a:t>-</a:t>
+            </a:r>
+            <a:r>
+              <a:rPr lang="zh-CN" altLang="en-US" dirty="0"/>
+              <a:t>可视化</a:t>
+            </a:r>
+            <a:r>
+              <a:rPr lang="en-US" altLang="zh-CN" dirty="0"/>
+              <a:t>feature map</a:t>
+            </a:r>
+            <a:endParaRPr lang="en-US" dirty="0"/>
+          </a:p>
+        </p:txBody>
+      </p:sp>
+      <p:sp>
+        <p:nvSpPr>
+          <p:cNvPr id="3" name="Content Placeholder 2">
+            <a:extLst>
+              <a:ext uri="{FF2B5EF4-FFF2-40B4-BE49-F238E27FC236}">
+                <a16:creationId xmlns:a16="http://schemas.microsoft.com/office/drawing/2014/main" id="{081D77C2-CD68-8944-AB87-3A854D1C32EC}"/>
+              </a:ext>
+            </a:extLst>
+          </p:cNvPr>
+          <p:cNvSpPr>
+            <a:spLocks noGrp="1"/>
+          </p:cNvSpPr>
+          <p:nvPr>
+            <p:ph idx="1"/>
+          </p:nvPr>
+        </p:nvSpPr>
+        <p:spPr/>
+        <p:txBody>
+          <a:bodyPr/>
+          <a:lstStyle/>
+          <a:p>
+            <a:r>
+              <a:rPr lang="zh-CN" altLang="en-US" dirty="0"/>
+              <a:t>在</a:t>
+            </a:r>
+            <a:r>
+              <a:rPr lang="en-US" altLang="zh-CN" dirty="0" err="1"/>
+              <a:t>jupyter</a:t>
+            </a:r>
+            <a:r>
+              <a:rPr lang="zh-CN" altLang="en-US" dirty="0"/>
+              <a:t>上，构建可视化</a:t>
+            </a:r>
+            <a:r>
+              <a:rPr lang="en-US" altLang="zh-CN" dirty="0"/>
+              <a:t>feature map</a:t>
+            </a:r>
+            <a:r>
+              <a:rPr lang="zh-CN" altLang="en-US" dirty="0"/>
+              <a:t>的方法，并且进行可视化。</a:t>
+            </a:r>
+            <a:endParaRPr lang="en-US" altLang="zh-CN" dirty="0"/>
+          </a:p>
+          <a:p>
+            <a:r>
+              <a:rPr lang="en-US" dirty="0"/>
+              <a:t>Ref: </a:t>
+            </a:r>
+            <a:r>
+              <a:rPr lang="en-US" dirty="0">
+                <a:hlinkClick r:id="rId2"/>
+              </a:rPr>
+              <a:t>How to Visualize Filters and Feature Maps in Convolutional Neural Networks</a:t>
+            </a:r>
+            <a:endParaRPr lang="en-US" dirty="0"/>
+          </a:p>
+          <a:p>
+            <a:endParaRPr lang="en-US" dirty="0"/>
+          </a:p>
+        </p:txBody>
+      </p:sp>
+      <p:sp>
+        <p:nvSpPr>
+          <p:cNvPr id="4" name="Date Placeholder 3">
+            <a:extLst>
+              <a:ext uri="{FF2B5EF4-FFF2-40B4-BE49-F238E27FC236}">
+                <a16:creationId xmlns:a16="http://schemas.microsoft.com/office/drawing/2014/main" id="{D4F46E80-CB5D-2846-B36E-EE50A34F84C8}"/>
+              </a:ext>
+            </a:extLst>
+          </p:cNvPr>
+          <p:cNvSpPr>
+            <a:spLocks noGrp="1"/>
+          </p:cNvSpPr>
+          <p:nvPr>
+            <p:ph type="dt" sz="half" idx="10"/>
+          </p:nvPr>
+        </p:nvSpPr>
+        <p:spPr/>
+        <p:txBody>
+          <a:bodyPr/>
+          <a:lstStyle/>
+          <a:p>
+            <a:fld id="{D483111E-5384-4450-87E5-51B3B2328436}" type="datetime1">
+              <a:rPr lang="en-US" altLang="zh-CN" smtClean="0"/>
+              <a:t>9/23/19</a:t>
+            </a:fld>
+            <a:endParaRPr lang="en-US"/>
+          </a:p>
+        </p:txBody>
+      </p:sp>
+      <p:sp>
+        <p:nvSpPr>
+          <p:cNvPr id="5" name="Slide Number Placeholder 4">
+            <a:extLst>
+              <a:ext uri="{FF2B5EF4-FFF2-40B4-BE49-F238E27FC236}">
+                <a16:creationId xmlns:a16="http://schemas.microsoft.com/office/drawing/2014/main" id="{C733172F-CA26-D24C-A717-04495F9B2A0E}"/>
+              </a:ext>
+            </a:extLst>
+          </p:cNvPr>
+          <p:cNvSpPr>
+            <a:spLocks noGrp="1"/>
+          </p:cNvSpPr>
+          <p:nvPr>
+            <p:ph type="sldNum" sz="quarter" idx="12"/>
+          </p:nvPr>
+        </p:nvSpPr>
+        <p:spPr/>
+        <p:txBody>
+          <a:bodyPr/>
+          <a:lstStyle/>
+          <a:p>
+            <a:fld id="{93D7A402-3076-2049-A745-4823B471CC62}" type="slidenum">
+              <a:rPr lang="en-US" smtClean="0"/>
+              <a:t>12</a:t>
+            </a:fld>
+            <a:endParaRPr lang="en-US"/>
+          </a:p>
+        </p:txBody>
+      </p:sp>
+    </p:spTree>
+    <p:extLst>
+      <p:ext uri="{BB962C8B-B14F-4D97-AF65-F5344CB8AC3E}">
+        <p14:creationId xmlns:p14="http://schemas.microsoft.com/office/powerpoint/2010/main" val="2422101946"/>
+      </p:ext>
+    </p:extLst>
+  </p:cSld>
+  <p:clrMapOvr>
+    <a:masterClrMapping/>
+  </p:clrMapOvr>
+</p:sld>
+</file>
+
+<file path=ppt/slides/slide13.xml><?xml version="1.0" encoding="utf-8"?>
+<p:sld xmlns:a="http://schemas.openxmlformats.org/drawingml/2006/main" xmlns:r="http://schemas.openxmlformats.org/officeDocument/2006/relationships" xmlns:p="http://schemas.openxmlformats.org/presentationml/2006/main">
+  <p:cSld>
+    <p:spTree>
+      <p:nvGrpSpPr>
+        <p:cNvPr id="1" name=""/>
+        <p:cNvGrpSpPr/>
+        <p:nvPr/>
+      </p:nvGrpSpPr>
+      <p:grpSpPr>
+        <a:xfrm>
+          <a:off x="0" y="0"/>
+          <a:ext cx="0" cy="0"/>
+          <a:chOff x="0" y="0"/>
+          <a:chExt cx="0" cy="0"/>
+        </a:xfrm>
+      </p:grpSpPr>
+      <p:sp>
+        <p:nvSpPr>
+          <p:cNvPr id="2" name="Title 1">
+            <a:extLst>
+              <a:ext uri="{FF2B5EF4-FFF2-40B4-BE49-F238E27FC236}">
+                <a16:creationId xmlns:a16="http://schemas.microsoft.com/office/drawing/2014/main" id="{C7AD168B-F31C-F24B-A01A-D6C41301391F}"/>
+              </a:ext>
+            </a:extLst>
+          </p:cNvPr>
+          <p:cNvSpPr>
+            <a:spLocks noGrp="1"/>
+          </p:cNvSpPr>
+          <p:nvPr>
+            <p:ph type="title"/>
+          </p:nvPr>
+        </p:nvSpPr>
+        <p:spPr/>
+        <p:txBody>
+          <a:bodyPr/>
+          <a:lstStyle/>
+          <a:p>
+            <a:r>
+              <a:rPr lang="en-US" dirty="0"/>
+              <a:t>JX</a:t>
+            </a:r>
+            <a:r>
+              <a:rPr lang="en-US" altLang="zh-CN" dirty="0"/>
+              <a:t>-</a:t>
+            </a:r>
+            <a:r>
+              <a:rPr lang="zh-CN" altLang="en-US" dirty="0"/>
+              <a:t>损失函数的范数</a:t>
+            </a:r>
+            <a:endParaRPr lang="en-US" dirty="0"/>
+          </a:p>
+        </p:txBody>
+      </p:sp>
+      <p:sp>
+        <p:nvSpPr>
+          <p:cNvPr id="3" name="Content Placeholder 2">
+            <a:extLst>
+              <a:ext uri="{FF2B5EF4-FFF2-40B4-BE49-F238E27FC236}">
+                <a16:creationId xmlns:a16="http://schemas.microsoft.com/office/drawing/2014/main" id="{081D77C2-CD68-8944-AB87-3A854D1C32EC}"/>
+              </a:ext>
+            </a:extLst>
+          </p:cNvPr>
+          <p:cNvSpPr>
+            <a:spLocks noGrp="1"/>
+          </p:cNvSpPr>
+          <p:nvPr>
+            <p:ph idx="1"/>
+          </p:nvPr>
+        </p:nvSpPr>
+        <p:spPr/>
+        <p:txBody>
+          <a:bodyPr/>
+          <a:lstStyle/>
+          <a:p>
+            <a:r>
+              <a:rPr lang="zh-CN" altLang="en-US" dirty="0"/>
+              <a:t>损失函数的范数可以尝试</a:t>
+            </a:r>
+            <a:r>
+              <a:rPr lang="en-US" altLang="zh-CN" dirty="0"/>
+              <a:t>L2</a:t>
+            </a:r>
+            <a:r>
+              <a:rPr lang="zh-CN" altLang="en-US" dirty="0"/>
+              <a:t>或者</a:t>
+            </a:r>
+            <a:r>
+              <a:rPr lang="en-US" altLang="zh-CN" dirty="0"/>
+              <a:t>L1, </a:t>
+            </a:r>
+            <a:r>
+              <a:rPr lang="zh-CN" altLang="en-US" dirty="0"/>
+              <a:t>需要通过实验比较其意义</a:t>
+            </a:r>
+            <a:endParaRPr lang="en-US" altLang="zh-CN" dirty="0"/>
+          </a:p>
+          <a:p>
+            <a:r>
+              <a:rPr lang="zh-CN" altLang="en-US" dirty="0"/>
+              <a:t>在</a:t>
+            </a:r>
+            <a:r>
+              <a:rPr lang="en-US" altLang="zh-CN" dirty="0" err="1"/>
+              <a:t>config.py</a:t>
+            </a:r>
+            <a:r>
+              <a:rPr lang="zh-CN" altLang="en-US" dirty="0"/>
+              <a:t>中增加该选项</a:t>
+            </a:r>
+            <a:endParaRPr lang="en-US" altLang="zh-CN" dirty="0"/>
+          </a:p>
+        </p:txBody>
+      </p:sp>
+      <p:sp>
+        <p:nvSpPr>
+          <p:cNvPr id="4" name="Date Placeholder 3">
+            <a:extLst>
+              <a:ext uri="{FF2B5EF4-FFF2-40B4-BE49-F238E27FC236}">
+                <a16:creationId xmlns:a16="http://schemas.microsoft.com/office/drawing/2014/main" id="{D4F46E80-CB5D-2846-B36E-EE50A34F84C8}"/>
+              </a:ext>
+            </a:extLst>
+          </p:cNvPr>
+          <p:cNvSpPr>
+            <a:spLocks noGrp="1"/>
+          </p:cNvSpPr>
+          <p:nvPr>
+            <p:ph type="dt" sz="half" idx="10"/>
+          </p:nvPr>
+        </p:nvSpPr>
+        <p:spPr/>
+        <p:txBody>
+          <a:bodyPr/>
+          <a:lstStyle/>
+          <a:p>
+            <a:fld id="{D483111E-5384-4450-87E5-51B3B2328436}" type="datetime1">
+              <a:rPr lang="en-US" altLang="zh-CN" smtClean="0"/>
+              <a:t>9/23/19</a:t>
+            </a:fld>
+            <a:endParaRPr lang="en-US"/>
+          </a:p>
+        </p:txBody>
+      </p:sp>
+      <p:sp>
+        <p:nvSpPr>
+          <p:cNvPr id="5" name="Slide Number Placeholder 4">
+            <a:extLst>
+              <a:ext uri="{FF2B5EF4-FFF2-40B4-BE49-F238E27FC236}">
+                <a16:creationId xmlns:a16="http://schemas.microsoft.com/office/drawing/2014/main" id="{C733172F-CA26-D24C-A717-04495F9B2A0E}"/>
+              </a:ext>
+            </a:extLst>
+          </p:cNvPr>
+          <p:cNvSpPr>
+            <a:spLocks noGrp="1"/>
+          </p:cNvSpPr>
+          <p:nvPr>
+            <p:ph type="sldNum" sz="quarter" idx="12"/>
+          </p:nvPr>
+        </p:nvSpPr>
+        <p:spPr/>
+        <p:txBody>
+          <a:bodyPr/>
+          <a:lstStyle/>
+          <a:p>
+            <a:fld id="{93D7A402-3076-2049-A745-4823B471CC62}" type="slidenum">
+              <a:rPr lang="en-US" smtClean="0"/>
+              <a:t>13</a:t>
+            </a:fld>
+            <a:endParaRPr lang="en-US"/>
+          </a:p>
+        </p:txBody>
+      </p:sp>
+    </p:spTree>
+    <p:extLst>
+      <p:ext uri="{BB962C8B-B14F-4D97-AF65-F5344CB8AC3E}">
+        <p14:creationId xmlns:p14="http://schemas.microsoft.com/office/powerpoint/2010/main" val="1580152589"/>
       </p:ext>
     </p:extLst>
   </p:cSld>
@@ -6579,7 +6950,7 @@
               <a:rPr lang="en-US" altLang="zh-CN" smtClean="0"/>
               <a:t>9/23/19</a:t>
             </a:fld>
-            <a:endParaRPr lang="en-US"/>
+            <a:endParaRPr lang="en-US" dirty="0"/>
           </a:p>
         </p:txBody>
       </p:sp>

</xml_diff>

<commit_message>
add visualize feature map
</commit_message>
<xml_diff>
--- a/ppt/Interpretation-9-20.pptx
+++ b/ppt/Interpretation-9-20.pptx
@@ -5,7 +5,7 @@
     <p:sldMasterId id="2147483648" r:id="rId1"/>
   </p:sldMasterIdLst>
   <p:notesMasterIdLst>
-    <p:notesMasterId r:id="rId15"/>
+    <p:notesMasterId r:id="rId21"/>
   </p:notesMasterIdLst>
   <p:sldIdLst>
     <p:sldId id="256" r:id="rId2"/>
@@ -20,7 +20,13 @@
     <p:sldId id="266" r:id="rId11"/>
     <p:sldId id="267" r:id="rId12"/>
     <p:sldId id="268" r:id="rId13"/>
-    <p:sldId id="269" r:id="rId14"/>
+    <p:sldId id="270" r:id="rId14"/>
+    <p:sldId id="271" r:id="rId15"/>
+    <p:sldId id="272" r:id="rId16"/>
+    <p:sldId id="273" r:id="rId17"/>
+    <p:sldId id="274" r:id="rId18"/>
+    <p:sldId id="275" r:id="rId19"/>
+    <p:sldId id="269" r:id="rId20"/>
   </p:sldIdLst>
   <p:sldSz cx="12192000" cy="6858000"/>
   <p:notesSz cx="6858000" cy="9144000"/>
@@ -136,6 +142,12 @@
             <p14:sldId id="266"/>
             <p14:sldId id="267"/>
             <p14:sldId id="268"/>
+            <p14:sldId id="270"/>
+            <p14:sldId id="271"/>
+            <p14:sldId id="272"/>
+            <p14:sldId id="273"/>
+            <p14:sldId id="274"/>
+            <p14:sldId id="275"/>
             <p14:sldId id="269"/>
           </p14:sldIdLst>
         </p14:section>
@@ -230,7 +242,7 @@
           <a:p>
             <a:fld id="{8A69F377-C162-4680-9BD9-7C23D4CFF851}" type="datetimeFigureOut">
               <a:rPr lang="zh-CN" altLang="en-US" smtClean="0"/>
-              <a:t>2019/9/23</a:t>
+              <a:t>2019/9/24</a:t>
             </a:fld>
             <a:endParaRPr lang="zh-CN" altLang="en-US"/>
           </a:p>
@@ -812,7 +824,7 @@
           <a:p>
             <a:fld id="{6110C06D-7A5C-4EFC-997D-06100A497197}" type="datetime1">
               <a:rPr lang="en-US" altLang="zh-CN" smtClean="0"/>
-              <a:t>9/23/19</a:t>
+              <a:t>9/24/19</a:t>
             </a:fld>
             <a:endParaRPr lang="en-US"/>
           </a:p>
@@ -1010,7 +1022,7 @@
           <a:p>
             <a:fld id="{208693CD-EAB3-4C4A-B6BC-E13B4E22CFEC}" type="datetime1">
               <a:rPr lang="en-US" altLang="zh-CN" smtClean="0"/>
-              <a:t>9/23/19</a:t>
+              <a:t>9/24/19</a:t>
             </a:fld>
             <a:endParaRPr lang="en-US"/>
           </a:p>
@@ -1218,7 +1230,7 @@
           <a:p>
             <a:fld id="{DF2B9BE3-15D4-4DBE-A744-51C26D8C89F5}" type="datetime1">
               <a:rPr lang="en-US" altLang="zh-CN" smtClean="0"/>
-              <a:t>9/23/19</a:t>
+              <a:t>9/24/19</a:t>
             </a:fld>
             <a:endParaRPr lang="en-US"/>
           </a:p>
@@ -1416,7 +1428,7 @@
           <a:p>
             <a:fld id="{D483111E-5384-4450-87E5-51B3B2328436}" type="datetime1">
               <a:rPr lang="en-US" altLang="zh-CN" smtClean="0"/>
-              <a:t>9/23/19</a:t>
+              <a:t>9/24/19</a:t>
             </a:fld>
             <a:endParaRPr lang="en-US"/>
           </a:p>
@@ -1691,7 +1703,7 @@
           <a:p>
             <a:fld id="{4C883E3E-2C2C-4299-A198-43C5B9691ED8}" type="datetime1">
               <a:rPr lang="en-US" altLang="zh-CN" smtClean="0"/>
-              <a:t>9/23/19</a:t>
+              <a:t>9/24/19</a:t>
             </a:fld>
             <a:endParaRPr lang="en-US"/>
           </a:p>
@@ -1956,7 +1968,7 @@
           <a:p>
             <a:fld id="{8AE1C8E2-3477-408B-8A18-BC57B5A57DE5}" type="datetime1">
               <a:rPr lang="en-US" altLang="zh-CN" smtClean="0"/>
-              <a:t>9/23/19</a:t>
+              <a:t>9/24/19</a:t>
             </a:fld>
             <a:endParaRPr lang="en-US"/>
           </a:p>
@@ -2368,7 +2380,7 @@
           <a:p>
             <a:fld id="{93B8B463-FD8B-4FE3-A2B0-56A8F331639C}" type="datetime1">
               <a:rPr lang="en-US" altLang="zh-CN" smtClean="0"/>
-              <a:t>9/23/19</a:t>
+              <a:t>9/24/19</a:t>
             </a:fld>
             <a:endParaRPr lang="en-US"/>
           </a:p>
@@ -2509,7 +2521,7 @@
           <a:p>
             <a:fld id="{FDB557D0-8350-4B6D-8E8F-81F075A8CA5A}" type="datetime1">
               <a:rPr lang="en-US" altLang="zh-CN" smtClean="0"/>
-              <a:t>9/23/19</a:t>
+              <a:t>9/24/19</a:t>
             </a:fld>
             <a:endParaRPr lang="en-US"/>
           </a:p>
@@ -2622,7 +2634,7 @@
           <a:p>
             <a:fld id="{2351E6A3-8727-4C49-BB0B-8D3B215E0F05}" type="datetime1">
               <a:rPr lang="en-US" altLang="zh-CN" smtClean="0"/>
-              <a:t>9/23/19</a:t>
+              <a:t>9/24/19</a:t>
             </a:fld>
             <a:endParaRPr lang="en-US"/>
           </a:p>
@@ -2933,7 +2945,7 @@
           <a:p>
             <a:fld id="{79C7CDA5-BE82-46C9-84A7-917789A4507C}" type="datetime1">
               <a:rPr lang="en-US" altLang="zh-CN" smtClean="0"/>
-              <a:t>9/23/19</a:t>
+              <a:t>9/24/19</a:t>
             </a:fld>
             <a:endParaRPr lang="en-US"/>
           </a:p>
@@ -3221,7 +3233,7 @@
           <a:p>
             <a:fld id="{867D3553-557E-47A6-AA35-FB9764499B9E}" type="datetime1">
               <a:rPr lang="en-US" altLang="zh-CN" smtClean="0"/>
-              <a:t>9/23/19</a:t>
+              <a:t>9/24/19</a:t>
             </a:fld>
             <a:endParaRPr lang="en-US"/>
           </a:p>
@@ -3462,7 +3474,7 @@
           <a:p>
             <a:fld id="{8A5258A8-249F-4202-8A92-0C595567D6C5}" type="datetime1">
               <a:rPr lang="en-US" altLang="zh-CN" smtClean="0"/>
-              <a:t>9/23/19</a:t>
+              <a:t>9/24/19</a:t>
             </a:fld>
             <a:endParaRPr lang="en-US"/>
           </a:p>
@@ -3956,7 +3968,7 @@
           <a:p>
             <a:fld id="{D17A8FA8-D9AF-44A9-9447-58E55764C556}" type="datetime1">
               <a:rPr lang="en-US" altLang="zh-CN" smtClean="0"/>
-              <a:t>9/23/19</a:t>
+              <a:t>9/24/19</a:t>
             </a:fld>
             <a:endParaRPr lang="en-US"/>
           </a:p>
@@ -4125,7 +4137,7 @@
           <a:p>
             <a:fld id="{BF677F50-21D8-40BE-B8F0-B2270733CF6B}" type="datetime1">
               <a:rPr lang="en-US" altLang="zh-CN" smtClean="0"/>
-              <a:t>9/23/19</a:t>
+              <a:t>9/24/19</a:t>
             </a:fld>
             <a:endParaRPr lang="en-US"/>
           </a:p>
@@ -4286,7 +4298,7 @@
           <a:p>
             <a:fld id="{BF677F50-21D8-40BE-B8F0-B2270733CF6B}" type="datetime1">
               <a:rPr lang="en-US" altLang="zh-CN" smtClean="0"/>
-              <a:t>9/23/19</a:t>
+              <a:t>9/24/19</a:t>
             </a:fld>
             <a:endParaRPr lang="en-US"/>
           </a:p>
@@ -4410,7 +4422,9 @@
         </p:nvSpPr>
         <p:spPr/>
         <p:txBody>
-          <a:bodyPr/>
+          <a:bodyPr>
+            <a:normAutofit fontScale="92500" lnSpcReduction="10000"/>
+          </a:bodyPr>
           <a:lstStyle/>
           <a:p>
             <a:r>
@@ -4449,7 +4463,48 @@
             <a:endParaRPr lang="en-US" dirty="0"/>
           </a:p>
           <a:p>
-            <a:endParaRPr lang="en-US" dirty="0"/>
+            <a:r>
+              <a:rPr lang="en-US" dirty="0"/>
+              <a:t>The idea of visualizing a feature map for a specific input image would be to understand </a:t>
+            </a:r>
+            <a:r>
+              <a:rPr lang="en-US" b="1" dirty="0"/>
+              <a:t>what features of the input are detected </a:t>
+            </a:r>
+            <a:r>
+              <a:rPr lang="en-US" dirty="0"/>
+              <a:t>or </a:t>
+            </a:r>
+            <a:r>
+              <a:rPr lang="en-US" b="1" dirty="0"/>
+              <a:t>preserved in the feature maps</a:t>
+            </a:r>
+            <a:r>
+              <a:rPr lang="en-US" dirty="0"/>
+              <a:t>. The expectation would be that the feature maps </a:t>
+            </a:r>
+            <a:r>
+              <a:rPr lang="en-US" b="1" dirty="0"/>
+              <a:t>close to the input detect small or fine-grained detail</a:t>
+            </a:r>
+            <a:r>
+              <a:rPr lang="en-US" dirty="0"/>
+              <a:t>, whereas feature maps </a:t>
+            </a:r>
+            <a:r>
+              <a:rPr lang="en-US" b="1" dirty="0"/>
+              <a:t>close to the output of the model capture more general features</a:t>
+            </a:r>
+            <a:r>
+              <a:rPr lang="en-US" dirty="0"/>
+              <a:t>. </a:t>
+            </a:r>
+          </a:p>
+          <a:p>
+            <a:r>
+              <a:rPr lang="en-US" dirty="0"/>
+              <a:t>Model abstract features from the image into more general concepts that can be used to make a classification. We generally lose the ability to interpret these deeper feature maps. </a:t>
+            </a:r>
           </a:p>
         </p:txBody>
       </p:sp>
@@ -4476,7 +4531,7 @@
           <a:p>
             <a:fld id="{D483111E-5384-4450-87E5-51B3B2328436}" type="datetime1">
               <a:rPr lang="en-US" altLang="zh-CN" smtClean="0"/>
-              <a:t>9/23/19</a:t>
+              <a:t>9/24/19</a:t>
             </a:fld>
             <a:endParaRPr lang="en-US"/>
           </a:p>
@@ -4572,7 +4627,11 @@
             </a:r>
             <a:r>
               <a:rPr lang="zh-CN" altLang="en-US" dirty="0"/>
-              <a:t>损失函数的范数</a:t>
+              <a:t>可视化</a:t>
+            </a:r>
+            <a:r>
+              <a:rPr lang="en-US" altLang="zh-CN" dirty="0"/>
+              <a:t>feature map</a:t>
             </a:r>
             <a:endParaRPr lang="en-US" dirty="0"/>
           </a:p>
@@ -4596,45 +4655,44 @@
         </p:nvSpPr>
         <p:spPr/>
         <p:txBody>
-          <a:bodyPr/>
-          <a:lstStyle/>
-          <a:p>
-            <a:r>
-              <a:rPr lang="zh-CN" altLang="en-US" dirty="0"/>
-              <a:t>损失函数的范数可以尝试</a:t>
+          <a:bodyPr>
+            <a:normAutofit/>
+          </a:bodyPr>
+          <a:lstStyle/>
+          <a:p>
+            <a:r>
+              <a:rPr lang="en-US" dirty="0"/>
+              <a:t>Features</a:t>
+            </a:r>
+            <a:r>
+              <a:rPr lang="zh-CN" altLang="en-US" dirty="0"/>
+              <a:t> </a:t>
             </a:r>
             <a:r>
               <a:rPr lang="en-US" altLang="zh-CN" dirty="0"/>
-              <a:t>L2</a:t>
-            </a:r>
-            <a:r>
-              <a:rPr lang="zh-CN" altLang="en-US" dirty="0"/>
-              <a:t>或者</a:t>
-            </a:r>
-            <a:r>
-              <a:rPr lang="en-US" altLang="zh-CN" dirty="0"/>
-              <a:t>L1, </a:t>
-            </a:r>
-            <a:r>
-              <a:rPr lang="zh-CN" altLang="en-US" dirty="0"/>
-              <a:t>需要通过实验比较其意义</a:t>
-            </a:r>
-            <a:endParaRPr lang="en-US" altLang="zh-CN" dirty="0"/>
-          </a:p>
-          <a:p>
-            <a:r>
-              <a:rPr lang="zh-CN" altLang="en-US" dirty="0"/>
-              <a:t>在</a:t>
+              <a:t>map</a:t>
+            </a:r>
+            <a:r>
+              <a:rPr lang="zh-CN" altLang="en-US" dirty="0"/>
+              <a:t>的可视化应该是在卷积后还是</a:t>
             </a:r>
             <a:r>
               <a:rPr lang="en-US" altLang="zh-CN" dirty="0" err="1"/>
-              <a:t>config.py</a:t>
-            </a:r>
-            <a:r>
-              <a:rPr lang="zh-CN" altLang="en-US" dirty="0"/>
-              <a:t>中增加该选项</a:t>
-            </a:r>
-            <a:endParaRPr lang="en-US" altLang="zh-CN" dirty="0"/>
+              <a:t>relu</a:t>
+            </a:r>
+            <a:r>
+              <a:rPr lang="zh-CN" altLang="en-US" dirty="0"/>
+              <a:t>之后， 看到的做法：</a:t>
+            </a:r>
+            <a:r>
+              <a:rPr lang="en-US" altLang="zh-CN" dirty="0" err="1"/>
+              <a:t>relu</a:t>
+            </a:r>
+            <a:r>
+              <a:rPr lang="zh-CN" altLang="en-US" dirty="0"/>
+              <a:t>之后</a:t>
+            </a:r>
+            <a:endParaRPr lang="en-US" dirty="0"/>
           </a:p>
         </p:txBody>
       </p:sp>
@@ -4661,7 +4719,7 @@
           <a:p>
             <a:fld id="{D483111E-5384-4450-87E5-51B3B2328436}" type="datetime1">
               <a:rPr lang="en-US" altLang="zh-CN" smtClean="0"/>
-              <a:t>9/23/19</a:t>
+              <a:t>9/24/19</a:t>
             </a:fld>
             <a:endParaRPr lang="en-US"/>
           </a:p>
@@ -4691,6 +4749,1606 @@
             <a:fld id="{93D7A402-3076-2049-A745-4823B471CC62}" type="slidenum">
               <a:rPr lang="en-US" smtClean="0"/>
               <a:t>13</a:t>
+            </a:fld>
+            <a:endParaRPr lang="en-US"/>
+          </a:p>
+        </p:txBody>
+      </p:sp>
+    </p:spTree>
+    <p:extLst>
+      <p:ext uri="{BB962C8B-B14F-4D97-AF65-F5344CB8AC3E}">
+        <p14:creationId xmlns:p14="http://schemas.microsoft.com/office/powerpoint/2010/main" val="2308448632"/>
+      </p:ext>
+    </p:extLst>
+  </p:cSld>
+  <p:clrMapOvr>
+    <a:masterClrMapping/>
+  </p:clrMapOvr>
+</p:sld>
+</file>
+
+<file path=ppt/slides/slide14.xml><?xml version="1.0" encoding="utf-8"?>
+<p:sld xmlns:a="http://schemas.openxmlformats.org/drawingml/2006/main" xmlns:r="http://schemas.openxmlformats.org/officeDocument/2006/relationships" xmlns:p="http://schemas.openxmlformats.org/presentationml/2006/main">
+  <p:cSld>
+    <p:spTree>
+      <p:nvGrpSpPr>
+        <p:cNvPr id="1" name=""/>
+        <p:cNvGrpSpPr/>
+        <p:nvPr/>
+      </p:nvGrpSpPr>
+      <p:grpSpPr>
+        <a:xfrm>
+          <a:off x="0" y="0"/>
+          <a:ext cx="0" cy="0"/>
+          <a:chOff x="0" y="0"/>
+          <a:chExt cx="0" cy="0"/>
+        </a:xfrm>
+      </p:grpSpPr>
+      <p:sp>
+        <p:nvSpPr>
+          <p:cNvPr id="2" name="Title 1">
+            <a:extLst>
+              <a:ext uri="{FF2B5EF4-FFF2-40B4-BE49-F238E27FC236}">
+                <a16:creationId xmlns:a16="http://schemas.microsoft.com/office/drawing/2014/main" id="{C7AD168B-F31C-F24B-A01A-D6C41301391F}"/>
+              </a:ext>
+            </a:extLst>
+          </p:cNvPr>
+          <p:cNvSpPr>
+            <a:spLocks noGrp="1"/>
+          </p:cNvSpPr>
+          <p:nvPr>
+            <p:ph type="title"/>
+          </p:nvPr>
+        </p:nvSpPr>
+        <p:spPr/>
+        <p:txBody>
+          <a:bodyPr/>
+          <a:lstStyle/>
+          <a:p>
+            <a:r>
+              <a:rPr lang="en-US" dirty="0"/>
+              <a:t>JX</a:t>
+            </a:r>
+            <a:r>
+              <a:rPr lang="en-US" altLang="zh-CN" dirty="0"/>
+              <a:t>-</a:t>
+            </a:r>
+            <a:r>
+              <a:rPr lang="zh-CN" altLang="en-US" dirty="0"/>
+              <a:t>可视化</a:t>
+            </a:r>
+            <a:r>
+              <a:rPr lang="en-US" altLang="zh-CN" dirty="0"/>
+              <a:t>feature map-</a:t>
+            </a:r>
+            <a:r>
+              <a:rPr lang="zh-CN" altLang="en-US" dirty="0">
+                <a:solidFill>
+                  <a:srgbClr val="FF0000"/>
+                </a:solidFill>
+              </a:rPr>
+              <a:t>结果分析（</a:t>
+            </a:r>
+            <a:r>
+              <a:rPr lang="en-US" altLang="zh-CN" dirty="0">
+                <a:solidFill>
+                  <a:srgbClr val="FF0000"/>
+                </a:solidFill>
+              </a:rPr>
+              <a:t>1</a:t>
+            </a:r>
+            <a:r>
+              <a:rPr lang="zh-CN" altLang="en-US" dirty="0">
+                <a:solidFill>
+                  <a:srgbClr val="FF0000"/>
+                </a:solidFill>
+              </a:rPr>
+              <a:t>）</a:t>
+            </a:r>
+            <a:endParaRPr lang="en-US" dirty="0">
+              <a:solidFill>
+                <a:srgbClr val="FF0000"/>
+              </a:solidFill>
+            </a:endParaRPr>
+          </a:p>
+        </p:txBody>
+      </p:sp>
+      <p:sp>
+        <p:nvSpPr>
+          <p:cNvPr id="3" name="Content Placeholder 2">
+            <a:extLst>
+              <a:ext uri="{FF2B5EF4-FFF2-40B4-BE49-F238E27FC236}">
+                <a16:creationId xmlns:a16="http://schemas.microsoft.com/office/drawing/2014/main" id="{081D77C2-CD68-8944-AB87-3A854D1C32EC}"/>
+              </a:ext>
+            </a:extLst>
+          </p:cNvPr>
+          <p:cNvSpPr>
+            <a:spLocks noGrp="1"/>
+          </p:cNvSpPr>
+          <p:nvPr>
+            <p:ph idx="1"/>
+          </p:nvPr>
+        </p:nvSpPr>
+        <p:spPr/>
+        <p:txBody>
+          <a:bodyPr>
+            <a:normAutofit/>
+          </a:bodyPr>
+          <a:lstStyle/>
+          <a:p>
+            <a:r>
+              <a:rPr lang="zh-CN" altLang="en-US" dirty="0"/>
+              <a:t>选用了</a:t>
+            </a:r>
+            <a:r>
+              <a:rPr lang="en-US" altLang="zh-CN" dirty="0" err="1"/>
+              <a:t>relu</a:t>
+            </a:r>
+            <a:r>
+              <a:rPr lang="zh-CN" altLang="en-US" dirty="0"/>
+              <a:t>出来的结果做分析。</a:t>
+            </a:r>
+            <a:endParaRPr lang="en-US" altLang="zh-CN" dirty="0"/>
+          </a:p>
+          <a:p>
+            <a:r>
+              <a:rPr lang="en-US" dirty="0"/>
+              <a:t>Low layer </a:t>
+            </a:r>
+            <a:r>
+              <a:rPr lang="zh-CN" altLang="en-US" dirty="0"/>
+              <a:t>显然更接近输入，不同</a:t>
+            </a:r>
+            <a:r>
+              <a:rPr lang="en-US" altLang="zh-CN" dirty="0"/>
+              <a:t>filter</a:t>
+            </a:r>
+            <a:r>
+              <a:rPr lang="zh-CN" altLang="en-US" dirty="0"/>
+              <a:t>激活的区域显然不相同。比如说</a:t>
+            </a:r>
+            <a:r>
+              <a:rPr lang="en-US" altLang="zh-CN" dirty="0"/>
+              <a:t>6</a:t>
+            </a:r>
+            <a:r>
+              <a:rPr lang="zh-CN" altLang="en-US" dirty="0"/>
+              <a:t>号（左边）和</a:t>
+            </a:r>
+            <a:r>
+              <a:rPr lang="en-US" altLang="zh-CN" dirty="0"/>
+              <a:t>8</a:t>
+            </a:r>
+            <a:r>
+              <a:rPr lang="zh-CN" altLang="en-US" dirty="0"/>
+              <a:t>号（右边），一个背景激活，一个</a:t>
+            </a:r>
+            <a:r>
+              <a:rPr lang="en-US" altLang="zh-CN" dirty="0"/>
+              <a:t>5</a:t>
+            </a:r>
+            <a:r>
+              <a:rPr lang="zh-CN" altLang="en-US" dirty="0"/>
+              <a:t>本身被激活</a:t>
+            </a:r>
+            <a:endParaRPr lang="en-US" altLang="zh-CN" dirty="0"/>
+          </a:p>
+          <a:p>
+            <a:endParaRPr lang="en-US" dirty="0"/>
+          </a:p>
+          <a:p>
+            <a:pPr marL="0" indent="0">
+              <a:buNone/>
+            </a:pPr>
+            <a:endParaRPr lang="en-US" dirty="0"/>
+          </a:p>
+          <a:p>
+            <a:r>
+              <a:rPr lang="en-US" dirty="0"/>
+              <a:t>High layer </a:t>
+            </a:r>
+            <a:r>
+              <a:rPr lang="zh-CN" altLang="en-US" dirty="0"/>
+              <a:t>更抽象，关注的特征难以理解</a:t>
+            </a:r>
+            <a:endParaRPr lang="en-US" altLang="zh-CN" dirty="0"/>
+          </a:p>
+          <a:p>
+            <a:endParaRPr lang="en-US" dirty="0"/>
+          </a:p>
+          <a:p>
+            <a:endParaRPr lang="en-US" dirty="0"/>
+          </a:p>
+        </p:txBody>
+      </p:sp>
+      <p:sp>
+        <p:nvSpPr>
+          <p:cNvPr id="4" name="Date Placeholder 3">
+            <a:extLst>
+              <a:ext uri="{FF2B5EF4-FFF2-40B4-BE49-F238E27FC236}">
+                <a16:creationId xmlns:a16="http://schemas.microsoft.com/office/drawing/2014/main" id="{D4F46E80-CB5D-2846-B36E-EE50A34F84C8}"/>
+              </a:ext>
+            </a:extLst>
+          </p:cNvPr>
+          <p:cNvSpPr>
+            <a:spLocks noGrp="1"/>
+          </p:cNvSpPr>
+          <p:nvPr>
+            <p:ph type="dt" sz="half" idx="10"/>
+          </p:nvPr>
+        </p:nvSpPr>
+        <p:spPr/>
+        <p:txBody>
+          <a:bodyPr/>
+          <a:lstStyle/>
+          <a:p>
+            <a:fld id="{D483111E-5384-4450-87E5-51B3B2328436}" type="datetime1">
+              <a:rPr lang="en-US" altLang="zh-CN" smtClean="0"/>
+              <a:t>9/24/19</a:t>
+            </a:fld>
+            <a:endParaRPr lang="en-US"/>
+          </a:p>
+        </p:txBody>
+      </p:sp>
+      <p:sp>
+        <p:nvSpPr>
+          <p:cNvPr id="5" name="Slide Number Placeholder 4">
+            <a:extLst>
+              <a:ext uri="{FF2B5EF4-FFF2-40B4-BE49-F238E27FC236}">
+                <a16:creationId xmlns:a16="http://schemas.microsoft.com/office/drawing/2014/main" id="{C733172F-CA26-D24C-A717-04495F9B2A0E}"/>
+              </a:ext>
+            </a:extLst>
+          </p:cNvPr>
+          <p:cNvSpPr>
+            <a:spLocks noGrp="1"/>
+          </p:cNvSpPr>
+          <p:nvPr>
+            <p:ph type="sldNum" sz="quarter" idx="12"/>
+          </p:nvPr>
+        </p:nvSpPr>
+        <p:spPr/>
+        <p:txBody>
+          <a:bodyPr/>
+          <a:lstStyle/>
+          <a:p>
+            <a:fld id="{93D7A402-3076-2049-A745-4823B471CC62}" type="slidenum">
+              <a:rPr lang="en-US" smtClean="0"/>
+              <a:t>14</a:t>
+            </a:fld>
+            <a:endParaRPr lang="en-US"/>
+          </a:p>
+        </p:txBody>
+      </p:sp>
+      <p:pic>
+        <p:nvPicPr>
+          <p:cNvPr id="6" name="Picture 5">
+            <a:extLst>
+              <a:ext uri="{FF2B5EF4-FFF2-40B4-BE49-F238E27FC236}">
+                <a16:creationId xmlns:a16="http://schemas.microsoft.com/office/drawing/2014/main" id="{26605874-F861-2546-9BF0-3698178EEF71}"/>
+              </a:ext>
+            </a:extLst>
+          </p:cNvPr>
+          <p:cNvPicPr>
+            <a:picLocks noChangeAspect="1"/>
+          </p:cNvPicPr>
+          <p:nvPr/>
+        </p:nvPicPr>
+        <p:blipFill>
+          <a:blip r:embed="rId2"/>
+          <a:stretch>
+            <a:fillRect/>
+          </a:stretch>
+        </p:blipFill>
+        <p:spPr>
+          <a:xfrm>
+            <a:off x="3306539" y="3496469"/>
+            <a:ext cx="1801776" cy="880868"/>
+          </a:xfrm>
+          <a:prstGeom prst="rect">
+            <a:avLst/>
+          </a:prstGeom>
+        </p:spPr>
+      </p:pic>
+      <p:pic>
+        <p:nvPicPr>
+          <p:cNvPr id="7" name="Picture 6">
+            <a:extLst>
+              <a:ext uri="{FF2B5EF4-FFF2-40B4-BE49-F238E27FC236}">
+                <a16:creationId xmlns:a16="http://schemas.microsoft.com/office/drawing/2014/main" id="{F7FD3785-9DA4-5D41-86F1-F08F1E61C089}"/>
+              </a:ext>
+            </a:extLst>
+          </p:cNvPr>
+          <p:cNvPicPr>
+            <a:picLocks noChangeAspect="1"/>
+          </p:cNvPicPr>
+          <p:nvPr/>
+        </p:nvPicPr>
+        <p:blipFill>
+          <a:blip r:embed="rId3"/>
+          <a:stretch>
+            <a:fillRect/>
+          </a:stretch>
+        </p:blipFill>
+        <p:spPr>
+          <a:xfrm>
+            <a:off x="5535372" y="3429000"/>
+            <a:ext cx="1439503" cy="972637"/>
+          </a:xfrm>
+          <a:prstGeom prst="rect">
+            <a:avLst/>
+          </a:prstGeom>
+        </p:spPr>
+      </p:pic>
+      <p:pic>
+        <p:nvPicPr>
+          <p:cNvPr id="8" name="Picture 7">
+            <a:extLst>
+              <a:ext uri="{FF2B5EF4-FFF2-40B4-BE49-F238E27FC236}">
+                <a16:creationId xmlns:a16="http://schemas.microsoft.com/office/drawing/2014/main" id="{BB3D636A-25C5-4348-ABF6-B89229B18ECA}"/>
+              </a:ext>
+            </a:extLst>
+          </p:cNvPr>
+          <p:cNvPicPr>
+            <a:picLocks noChangeAspect="1"/>
+          </p:cNvPicPr>
+          <p:nvPr/>
+        </p:nvPicPr>
+        <p:blipFill>
+          <a:blip r:embed="rId4"/>
+          <a:stretch>
+            <a:fillRect/>
+          </a:stretch>
+        </p:blipFill>
+        <p:spPr>
+          <a:xfrm rot="16200000">
+            <a:off x="4353303" y="2125237"/>
+            <a:ext cx="1276050" cy="7186176"/>
+          </a:xfrm>
+          <a:prstGeom prst="rect">
+            <a:avLst/>
+          </a:prstGeom>
+        </p:spPr>
+      </p:pic>
+      <p:pic>
+        <p:nvPicPr>
+          <p:cNvPr id="9" name="Picture 8">
+            <a:extLst>
+              <a:ext uri="{FF2B5EF4-FFF2-40B4-BE49-F238E27FC236}">
+                <a16:creationId xmlns:a16="http://schemas.microsoft.com/office/drawing/2014/main" id="{28712C10-3A9E-9F48-B1E1-2C9649A2064B}"/>
+              </a:ext>
+            </a:extLst>
+          </p:cNvPr>
+          <p:cNvPicPr>
+            <a:picLocks noChangeAspect="1"/>
+          </p:cNvPicPr>
+          <p:nvPr/>
+        </p:nvPicPr>
+        <p:blipFill>
+          <a:blip r:embed="rId5"/>
+          <a:stretch>
+            <a:fillRect/>
+          </a:stretch>
+        </p:blipFill>
+        <p:spPr>
+          <a:xfrm>
+            <a:off x="5971522" y="1512671"/>
+            <a:ext cx="1003353" cy="721160"/>
+          </a:xfrm>
+          <a:prstGeom prst="rect">
+            <a:avLst/>
+          </a:prstGeom>
+        </p:spPr>
+      </p:pic>
+    </p:spTree>
+    <p:extLst>
+      <p:ext uri="{BB962C8B-B14F-4D97-AF65-F5344CB8AC3E}">
+        <p14:creationId xmlns:p14="http://schemas.microsoft.com/office/powerpoint/2010/main" val="1916724574"/>
+      </p:ext>
+    </p:extLst>
+  </p:cSld>
+  <p:clrMapOvr>
+    <a:masterClrMapping/>
+  </p:clrMapOvr>
+</p:sld>
+</file>
+
+<file path=ppt/slides/slide15.xml><?xml version="1.0" encoding="utf-8"?>
+<p:sld xmlns:a="http://schemas.openxmlformats.org/drawingml/2006/main" xmlns:r="http://schemas.openxmlformats.org/officeDocument/2006/relationships" xmlns:p="http://schemas.openxmlformats.org/presentationml/2006/main">
+  <p:cSld>
+    <p:spTree>
+      <p:nvGrpSpPr>
+        <p:cNvPr id="1" name=""/>
+        <p:cNvGrpSpPr/>
+        <p:nvPr/>
+      </p:nvGrpSpPr>
+      <p:grpSpPr>
+        <a:xfrm>
+          <a:off x="0" y="0"/>
+          <a:ext cx="0" cy="0"/>
+          <a:chOff x="0" y="0"/>
+          <a:chExt cx="0" cy="0"/>
+        </a:xfrm>
+      </p:grpSpPr>
+      <p:sp>
+        <p:nvSpPr>
+          <p:cNvPr id="2" name="Title 1">
+            <a:extLst>
+              <a:ext uri="{FF2B5EF4-FFF2-40B4-BE49-F238E27FC236}">
+                <a16:creationId xmlns:a16="http://schemas.microsoft.com/office/drawing/2014/main" id="{C7AD168B-F31C-F24B-A01A-D6C41301391F}"/>
+              </a:ext>
+            </a:extLst>
+          </p:cNvPr>
+          <p:cNvSpPr>
+            <a:spLocks noGrp="1"/>
+          </p:cNvSpPr>
+          <p:nvPr>
+            <p:ph type="title"/>
+          </p:nvPr>
+        </p:nvSpPr>
+        <p:spPr/>
+        <p:txBody>
+          <a:bodyPr/>
+          <a:lstStyle/>
+          <a:p>
+            <a:r>
+              <a:rPr lang="en-US" dirty="0"/>
+              <a:t>JX</a:t>
+            </a:r>
+            <a:r>
+              <a:rPr lang="en-US" altLang="zh-CN" dirty="0"/>
+              <a:t>-</a:t>
+            </a:r>
+            <a:r>
+              <a:rPr lang="zh-CN" altLang="en-US" dirty="0"/>
+              <a:t>可视化</a:t>
+            </a:r>
+            <a:r>
+              <a:rPr lang="en-US" altLang="zh-CN" dirty="0"/>
+              <a:t>feature map-</a:t>
+            </a:r>
+            <a:r>
+              <a:rPr lang="zh-CN" altLang="en-US" dirty="0">
+                <a:solidFill>
+                  <a:srgbClr val="FF0000"/>
+                </a:solidFill>
+              </a:rPr>
+              <a:t>结果分析（</a:t>
+            </a:r>
+            <a:r>
+              <a:rPr lang="en-US" altLang="zh-CN" dirty="0">
+                <a:solidFill>
+                  <a:srgbClr val="FF0000"/>
+                </a:solidFill>
+              </a:rPr>
+              <a:t>2</a:t>
+            </a:r>
+            <a:r>
+              <a:rPr lang="zh-CN" altLang="en-US" dirty="0">
+                <a:solidFill>
+                  <a:srgbClr val="FF0000"/>
+                </a:solidFill>
+              </a:rPr>
+              <a:t>）</a:t>
+            </a:r>
+            <a:endParaRPr lang="en-US" dirty="0">
+              <a:solidFill>
+                <a:srgbClr val="FF0000"/>
+              </a:solidFill>
+            </a:endParaRPr>
+          </a:p>
+        </p:txBody>
+      </p:sp>
+      <p:sp>
+        <p:nvSpPr>
+          <p:cNvPr id="3" name="Content Placeholder 2">
+            <a:extLst>
+              <a:ext uri="{FF2B5EF4-FFF2-40B4-BE49-F238E27FC236}">
+                <a16:creationId xmlns:a16="http://schemas.microsoft.com/office/drawing/2014/main" id="{081D77C2-CD68-8944-AB87-3A854D1C32EC}"/>
+              </a:ext>
+            </a:extLst>
+          </p:cNvPr>
+          <p:cNvSpPr>
+            <a:spLocks noGrp="1"/>
+          </p:cNvSpPr>
+          <p:nvPr>
+            <p:ph idx="1"/>
+          </p:nvPr>
+        </p:nvSpPr>
+        <p:spPr/>
+        <p:txBody>
+          <a:bodyPr>
+            <a:normAutofit/>
+          </a:bodyPr>
+          <a:lstStyle/>
+          <a:p>
+            <a:r>
+              <a:rPr lang="zh-CN" altLang="en-US" dirty="0"/>
+              <a:t>根据</a:t>
+            </a:r>
+            <a:r>
+              <a:rPr lang="en-US" altLang="zh-CN" dirty="0"/>
+              <a:t>feature</a:t>
+            </a:r>
+            <a:r>
+              <a:rPr lang="zh-CN" altLang="en-US" dirty="0"/>
+              <a:t> </a:t>
+            </a:r>
+            <a:r>
+              <a:rPr lang="en-US" altLang="zh-CN" dirty="0"/>
+              <a:t>map</a:t>
+            </a:r>
+            <a:r>
+              <a:rPr lang="zh-CN" altLang="en-US" dirty="0"/>
+              <a:t>激活的情况，选择了</a:t>
+            </a:r>
+            <a:r>
+              <a:rPr lang="en-US" altLang="zh-CN" dirty="0"/>
+              <a:t>low layer 8</a:t>
+            </a:r>
+            <a:r>
+              <a:rPr lang="zh-CN" altLang="en-US" dirty="0"/>
+              <a:t>号</a:t>
+            </a:r>
+            <a:r>
+              <a:rPr lang="en-US" altLang="zh-CN" dirty="0"/>
+              <a:t>filter</a:t>
+            </a:r>
+            <a:r>
+              <a:rPr lang="zh-CN" altLang="en-US" dirty="0"/>
+              <a:t>来分析，做了</a:t>
+            </a:r>
+            <a:r>
+              <a:rPr lang="en-US" altLang="zh-CN" dirty="0"/>
+              <a:t>101, 102</a:t>
+            </a:r>
+            <a:r>
+              <a:rPr lang="zh-CN" altLang="en-US" dirty="0"/>
+              <a:t>两组实验</a:t>
+            </a:r>
+            <a:r>
+              <a:rPr lang="en-US" altLang="zh-CN" dirty="0"/>
+              <a:t>, </a:t>
+            </a:r>
+            <a:r>
+              <a:rPr lang="en-US" altLang="zh-CN" dirty="0" err="1"/>
+              <a:t>relu</a:t>
+            </a:r>
+            <a:r>
+              <a:rPr lang="zh-CN" altLang="en-US" dirty="0"/>
+              <a:t>前和</a:t>
+            </a:r>
+            <a:r>
+              <a:rPr lang="en-US" altLang="zh-CN" dirty="0" err="1"/>
+              <a:t>relu</a:t>
+            </a:r>
+            <a:r>
+              <a:rPr lang="zh-CN" altLang="en-US" dirty="0"/>
+              <a:t>后。从效果来看，</a:t>
+            </a:r>
+            <a:r>
+              <a:rPr lang="en-US" altLang="zh-CN" dirty="0" err="1"/>
+              <a:t>relu</a:t>
+            </a:r>
+            <a:r>
+              <a:rPr lang="zh-CN" altLang="en-US" dirty="0"/>
+              <a:t>后可能更好。</a:t>
+            </a:r>
+            <a:endParaRPr lang="en-US" dirty="0"/>
+          </a:p>
+        </p:txBody>
+      </p:sp>
+      <p:sp>
+        <p:nvSpPr>
+          <p:cNvPr id="4" name="Date Placeholder 3">
+            <a:extLst>
+              <a:ext uri="{FF2B5EF4-FFF2-40B4-BE49-F238E27FC236}">
+                <a16:creationId xmlns:a16="http://schemas.microsoft.com/office/drawing/2014/main" id="{D4F46E80-CB5D-2846-B36E-EE50A34F84C8}"/>
+              </a:ext>
+            </a:extLst>
+          </p:cNvPr>
+          <p:cNvSpPr>
+            <a:spLocks noGrp="1"/>
+          </p:cNvSpPr>
+          <p:nvPr>
+            <p:ph type="dt" sz="half" idx="10"/>
+          </p:nvPr>
+        </p:nvSpPr>
+        <p:spPr/>
+        <p:txBody>
+          <a:bodyPr/>
+          <a:lstStyle/>
+          <a:p>
+            <a:fld id="{D483111E-5384-4450-87E5-51B3B2328436}" type="datetime1">
+              <a:rPr lang="en-US" altLang="zh-CN" smtClean="0"/>
+              <a:t>9/24/19</a:t>
+            </a:fld>
+            <a:endParaRPr lang="en-US"/>
+          </a:p>
+        </p:txBody>
+      </p:sp>
+      <p:sp>
+        <p:nvSpPr>
+          <p:cNvPr id="5" name="Slide Number Placeholder 4">
+            <a:extLst>
+              <a:ext uri="{FF2B5EF4-FFF2-40B4-BE49-F238E27FC236}">
+                <a16:creationId xmlns:a16="http://schemas.microsoft.com/office/drawing/2014/main" id="{C733172F-CA26-D24C-A717-04495F9B2A0E}"/>
+              </a:ext>
+            </a:extLst>
+          </p:cNvPr>
+          <p:cNvSpPr>
+            <a:spLocks noGrp="1"/>
+          </p:cNvSpPr>
+          <p:nvPr>
+            <p:ph type="sldNum" sz="quarter" idx="12"/>
+          </p:nvPr>
+        </p:nvSpPr>
+        <p:spPr/>
+        <p:txBody>
+          <a:bodyPr/>
+          <a:lstStyle/>
+          <a:p>
+            <a:fld id="{93D7A402-3076-2049-A745-4823B471CC62}" type="slidenum">
+              <a:rPr lang="en-US" smtClean="0"/>
+              <a:t>15</a:t>
+            </a:fld>
+            <a:endParaRPr lang="en-US"/>
+          </a:p>
+        </p:txBody>
+      </p:sp>
+      <p:pic>
+        <p:nvPicPr>
+          <p:cNvPr id="9" name="Picture 8">
+            <a:extLst>
+              <a:ext uri="{FF2B5EF4-FFF2-40B4-BE49-F238E27FC236}">
+                <a16:creationId xmlns:a16="http://schemas.microsoft.com/office/drawing/2014/main" id="{FED7B5D4-44EA-AE4F-92F4-E813ECBDCD11}"/>
+              </a:ext>
+            </a:extLst>
+          </p:cNvPr>
+          <p:cNvPicPr>
+            <a:picLocks noChangeAspect="1"/>
+          </p:cNvPicPr>
+          <p:nvPr/>
+        </p:nvPicPr>
+        <p:blipFill>
+          <a:blip r:embed="rId2"/>
+          <a:stretch>
+            <a:fillRect/>
+          </a:stretch>
+        </p:blipFill>
+        <p:spPr>
+          <a:xfrm>
+            <a:off x="1943100" y="2786606"/>
+            <a:ext cx="3276600" cy="3263900"/>
+          </a:xfrm>
+          <a:prstGeom prst="rect">
+            <a:avLst/>
+          </a:prstGeom>
+        </p:spPr>
+      </p:pic>
+      <p:pic>
+        <p:nvPicPr>
+          <p:cNvPr id="10" name="Picture 9">
+            <a:extLst>
+              <a:ext uri="{FF2B5EF4-FFF2-40B4-BE49-F238E27FC236}">
+                <a16:creationId xmlns:a16="http://schemas.microsoft.com/office/drawing/2014/main" id="{881186E0-F7FD-DC49-ABE7-E7716A7AB032}"/>
+              </a:ext>
+            </a:extLst>
+          </p:cNvPr>
+          <p:cNvPicPr>
+            <a:picLocks noChangeAspect="1"/>
+          </p:cNvPicPr>
+          <p:nvPr/>
+        </p:nvPicPr>
+        <p:blipFill>
+          <a:blip r:embed="rId3"/>
+          <a:stretch>
+            <a:fillRect/>
+          </a:stretch>
+        </p:blipFill>
+        <p:spPr>
+          <a:xfrm>
+            <a:off x="5916895" y="2748506"/>
+            <a:ext cx="3289300" cy="3302000"/>
+          </a:xfrm>
+          <a:prstGeom prst="rect">
+            <a:avLst/>
+          </a:prstGeom>
+        </p:spPr>
+      </p:pic>
+    </p:spTree>
+    <p:extLst>
+      <p:ext uri="{BB962C8B-B14F-4D97-AF65-F5344CB8AC3E}">
+        <p14:creationId xmlns:p14="http://schemas.microsoft.com/office/powerpoint/2010/main" val="3467647917"/>
+      </p:ext>
+    </p:extLst>
+  </p:cSld>
+  <p:clrMapOvr>
+    <a:masterClrMapping/>
+  </p:clrMapOvr>
+</p:sld>
+</file>
+
+<file path=ppt/slides/slide16.xml><?xml version="1.0" encoding="utf-8"?>
+<p:sld xmlns:a="http://schemas.openxmlformats.org/drawingml/2006/main" xmlns:r="http://schemas.openxmlformats.org/officeDocument/2006/relationships" xmlns:p="http://schemas.openxmlformats.org/presentationml/2006/main">
+  <p:cSld>
+    <p:spTree>
+      <p:nvGrpSpPr>
+        <p:cNvPr id="1" name=""/>
+        <p:cNvGrpSpPr/>
+        <p:nvPr/>
+      </p:nvGrpSpPr>
+      <p:grpSpPr>
+        <a:xfrm>
+          <a:off x="0" y="0"/>
+          <a:ext cx="0" cy="0"/>
+          <a:chOff x="0" y="0"/>
+          <a:chExt cx="0" cy="0"/>
+        </a:xfrm>
+      </p:grpSpPr>
+      <p:sp>
+        <p:nvSpPr>
+          <p:cNvPr id="2" name="Title 1">
+            <a:extLst>
+              <a:ext uri="{FF2B5EF4-FFF2-40B4-BE49-F238E27FC236}">
+                <a16:creationId xmlns:a16="http://schemas.microsoft.com/office/drawing/2014/main" id="{C7AD168B-F31C-F24B-A01A-D6C41301391F}"/>
+              </a:ext>
+            </a:extLst>
+          </p:cNvPr>
+          <p:cNvSpPr>
+            <a:spLocks noGrp="1"/>
+          </p:cNvSpPr>
+          <p:nvPr>
+            <p:ph type="title"/>
+          </p:nvPr>
+        </p:nvSpPr>
+        <p:spPr/>
+        <p:txBody>
+          <a:bodyPr/>
+          <a:lstStyle/>
+          <a:p>
+            <a:r>
+              <a:rPr lang="en-US" dirty="0"/>
+              <a:t>JX</a:t>
+            </a:r>
+            <a:r>
+              <a:rPr lang="en-US" altLang="zh-CN" dirty="0"/>
+              <a:t>-</a:t>
+            </a:r>
+            <a:r>
+              <a:rPr lang="zh-CN" altLang="en-US" dirty="0"/>
+              <a:t>可视化</a:t>
+            </a:r>
+            <a:r>
+              <a:rPr lang="en-US" altLang="zh-CN" dirty="0"/>
+              <a:t>feature map-</a:t>
+            </a:r>
+            <a:r>
+              <a:rPr lang="zh-CN" altLang="en-US" dirty="0">
+                <a:solidFill>
+                  <a:srgbClr val="FF0000"/>
+                </a:solidFill>
+              </a:rPr>
+              <a:t>结果分析（</a:t>
+            </a:r>
+            <a:r>
+              <a:rPr lang="en-US" altLang="zh-CN" dirty="0">
+                <a:solidFill>
+                  <a:srgbClr val="FF0000"/>
+                </a:solidFill>
+              </a:rPr>
+              <a:t>3</a:t>
+            </a:r>
+            <a:r>
+              <a:rPr lang="zh-CN" altLang="en-US" dirty="0">
+                <a:solidFill>
+                  <a:srgbClr val="FF0000"/>
+                </a:solidFill>
+              </a:rPr>
+              <a:t>）</a:t>
+            </a:r>
+            <a:endParaRPr lang="en-US" dirty="0">
+              <a:solidFill>
+                <a:srgbClr val="FF0000"/>
+              </a:solidFill>
+            </a:endParaRPr>
+          </a:p>
+        </p:txBody>
+      </p:sp>
+      <p:sp>
+        <p:nvSpPr>
+          <p:cNvPr id="3" name="Content Placeholder 2">
+            <a:extLst>
+              <a:ext uri="{FF2B5EF4-FFF2-40B4-BE49-F238E27FC236}">
+                <a16:creationId xmlns:a16="http://schemas.microsoft.com/office/drawing/2014/main" id="{081D77C2-CD68-8944-AB87-3A854D1C32EC}"/>
+              </a:ext>
+            </a:extLst>
+          </p:cNvPr>
+          <p:cNvSpPr>
+            <a:spLocks noGrp="1"/>
+          </p:cNvSpPr>
+          <p:nvPr>
+            <p:ph idx="1"/>
+          </p:nvPr>
+        </p:nvSpPr>
+        <p:spPr/>
+        <p:txBody>
+          <a:bodyPr>
+            <a:normAutofit/>
+          </a:bodyPr>
+          <a:lstStyle/>
+          <a:p>
+            <a:r>
+              <a:rPr lang="zh-CN" altLang="en-US" dirty="0"/>
+              <a:t>从损失函数的优化角度来看，两者的损失函数绝对值依旧非常大。相比</a:t>
+            </a:r>
+            <a:r>
+              <a:rPr lang="en-US" altLang="zh-CN" dirty="0"/>
+              <a:t> high layer</a:t>
+            </a:r>
+            <a:r>
+              <a:rPr lang="zh-CN" altLang="en-US" dirty="0"/>
+              <a:t>优化出来的结果。</a:t>
+            </a:r>
+            <a:endParaRPr lang="en-US" dirty="0"/>
+          </a:p>
+        </p:txBody>
+      </p:sp>
+      <p:sp>
+        <p:nvSpPr>
+          <p:cNvPr id="4" name="Date Placeholder 3">
+            <a:extLst>
+              <a:ext uri="{FF2B5EF4-FFF2-40B4-BE49-F238E27FC236}">
+                <a16:creationId xmlns:a16="http://schemas.microsoft.com/office/drawing/2014/main" id="{D4F46E80-CB5D-2846-B36E-EE50A34F84C8}"/>
+              </a:ext>
+            </a:extLst>
+          </p:cNvPr>
+          <p:cNvSpPr>
+            <a:spLocks noGrp="1"/>
+          </p:cNvSpPr>
+          <p:nvPr>
+            <p:ph type="dt" sz="half" idx="10"/>
+          </p:nvPr>
+        </p:nvSpPr>
+        <p:spPr/>
+        <p:txBody>
+          <a:bodyPr/>
+          <a:lstStyle/>
+          <a:p>
+            <a:fld id="{D483111E-5384-4450-87E5-51B3B2328436}" type="datetime1">
+              <a:rPr lang="en-US" altLang="zh-CN" smtClean="0"/>
+              <a:t>9/24/19</a:t>
+            </a:fld>
+            <a:endParaRPr lang="en-US"/>
+          </a:p>
+        </p:txBody>
+      </p:sp>
+      <p:sp>
+        <p:nvSpPr>
+          <p:cNvPr id="5" name="Slide Number Placeholder 4">
+            <a:extLst>
+              <a:ext uri="{FF2B5EF4-FFF2-40B4-BE49-F238E27FC236}">
+                <a16:creationId xmlns:a16="http://schemas.microsoft.com/office/drawing/2014/main" id="{C733172F-CA26-D24C-A717-04495F9B2A0E}"/>
+              </a:ext>
+            </a:extLst>
+          </p:cNvPr>
+          <p:cNvSpPr>
+            <a:spLocks noGrp="1"/>
+          </p:cNvSpPr>
+          <p:nvPr>
+            <p:ph type="sldNum" sz="quarter" idx="12"/>
+          </p:nvPr>
+        </p:nvSpPr>
+        <p:spPr/>
+        <p:txBody>
+          <a:bodyPr/>
+          <a:lstStyle/>
+          <a:p>
+            <a:fld id="{93D7A402-3076-2049-A745-4823B471CC62}" type="slidenum">
+              <a:rPr lang="en-US" smtClean="0"/>
+              <a:t>16</a:t>
+            </a:fld>
+            <a:endParaRPr lang="en-US"/>
+          </a:p>
+        </p:txBody>
+      </p:sp>
+      <p:pic>
+        <p:nvPicPr>
+          <p:cNvPr id="6" name="Picture 5">
+            <a:extLst>
+              <a:ext uri="{FF2B5EF4-FFF2-40B4-BE49-F238E27FC236}">
+                <a16:creationId xmlns:a16="http://schemas.microsoft.com/office/drawing/2014/main" id="{D9C98EEE-C2F6-9446-9893-86282ECDA68A}"/>
+              </a:ext>
+            </a:extLst>
+          </p:cNvPr>
+          <p:cNvPicPr>
+            <a:picLocks noChangeAspect="1"/>
+          </p:cNvPicPr>
+          <p:nvPr/>
+        </p:nvPicPr>
+        <p:blipFill>
+          <a:blip r:embed="rId2"/>
+          <a:stretch>
+            <a:fillRect/>
+          </a:stretch>
+        </p:blipFill>
+        <p:spPr>
+          <a:xfrm>
+            <a:off x="1620420" y="3175478"/>
+            <a:ext cx="8951159" cy="3105150"/>
+          </a:xfrm>
+          <a:prstGeom prst="rect">
+            <a:avLst/>
+          </a:prstGeom>
+        </p:spPr>
+      </p:pic>
+    </p:spTree>
+    <p:extLst>
+      <p:ext uri="{BB962C8B-B14F-4D97-AF65-F5344CB8AC3E}">
+        <p14:creationId xmlns:p14="http://schemas.microsoft.com/office/powerpoint/2010/main" val="3196728068"/>
+      </p:ext>
+    </p:extLst>
+  </p:cSld>
+  <p:clrMapOvr>
+    <a:masterClrMapping/>
+  </p:clrMapOvr>
+</p:sld>
+</file>
+
+<file path=ppt/slides/slide17.xml><?xml version="1.0" encoding="utf-8"?>
+<p:sld xmlns:a="http://schemas.openxmlformats.org/drawingml/2006/main" xmlns:r="http://schemas.openxmlformats.org/officeDocument/2006/relationships" xmlns:p="http://schemas.openxmlformats.org/presentationml/2006/main">
+  <p:cSld>
+    <p:spTree>
+      <p:nvGrpSpPr>
+        <p:cNvPr id="1" name=""/>
+        <p:cNvGrpSpPr/>
+        <p:nvPr/>
+      </p:nvGrpSpPr>
+      <p:grpSpPr>
+        <a:xfrm>
+          <a:off x="0" y="0"/>
+          <a:ext cx="0" cy="0"/>
+          <a:chOff x="0" y="0"/>
+          <a:chExt cx="0" cy="0"/>
+        </a:xfrm>
+      </p:grpSpPr>
+      <p:sp>
+        <p:nvSpPr>
+          <p:cNvPr id="2" name="Title 1">
+            <a:extLst>
+              <a:ext uri="{FF2B5EF4-FFF2-40B4-BE49-F238E27FC236}">
+                <a16:creationId xmlns:a16="http://schemas.microsoft.com/office/drawing/2014/main" id="{C7AD168B-F31C-F24B-A01A-D6C41301391F}"/>
+              </a:ext>
+            </a:extLst>
+          </p:cNvPr>
+          <p:cNvSpPr>
+            <a:spLocks noGrp="1"/>
+          </p:cNvSpPr>
+          <p:nvPr>
+            <p:ph type="title"/>
+          </p:nvPr>
+        </p:nvSpPr>
+        <p:spPr/>
+        <p:txBody>
+          <a:bodyPr/>
+          <a:lstStyle/>
+          <a:p>
+            <a:r>
+              <a:rPr lang="en-US" dirty="0"/>
+              <a:t>JX</a:t>
+            </a:r>
+            <a:r>
+              <a:rPr lang="en-US" altLang="zh-CN" dirty="0"/>
+              <a:t>-</a:t>
+            </a:r>
+            <a:r>
+              <a:rPr lang="zh-CN" altLang="en-US" dirty="0"/>
+              <a:t>可视化</a:t>
+            </a:r>
+            <a:r>
+              <a:rPr lang="en-US" altLang="zh-CN" dirty="0"/>
+              <a:t>feature map-</a:t>
+            </a:r>
+            <a:r>
+              <a:rPr lang="zh-CN" altLang="en-US" dirty="0">
+                <a:solidFill>
+                  <a:srgbClr val="FF0000"/>
+                </a:solidFill>
+              </a:rPr>
+              <a:t>结果分析（</a:t>
+            </a:r>
+            <a:r>
+              <a:rPr lang="en-US" altLang="zh-CN" dirty="0">
+                <a:solidFill>
+                  <a:srgbClr val="FF0000"/>
+                </a:solidFill>
+              </a:rPr>
+              <a:t>4</a:t>
+            </a:r>
+            <a:r>
+              <a:rPr lang="zh-CN" altLang="en-US" dirty="0">
+                <a:solidFill>
+                  <a:srgbClr val="FF0000"/>
+                </a:solidFill>
+              </a:rPr>
+              <a:t>）</a:t>
+            </a:r>
+            <a:endParaRPr lang="en-US" dirty="0">
+              <a:solidFill>
+                <a:srgbClr val="FF0000"/>
+              </a:solidFill>
+            </a:endParaRPr>
+          </a:p>
+        </p:txBody>
+      </p:sp>
+      <p:sp>
+        <p:nvSpPr>
+          <p:cNvPr id="3" name="Content Placeholder 2">
+            <a:extLst>
+              <a:ext uri="{FF2B5EF4-FFF2-40B4-BE49-F238E27FC236}">
+                <a16:creationId xmlns:a16="http://schemas.microsoft.com/office/drawing/2014/main" id="{081D77C2-CD68-8944-AB87-3A854D1C32EC}"/>
+              </a:ext>
+            </a:extLst>
+          </p:cNvPr>
+          <p:cNvSpPr>
+            <a:spLocks noGrp="1"/>
+          </p:cNvSpPr>
+          <p:nvPr>
+            <p:ph idx="1"/>
+          </p:nvPr>
+        </p:nvSpPr>
+        <p:spPr/>
+        <p:txBody>
+          <a:bodyPr>
+            <a:normAutofit/>
+          </a:bodyPr>
+          <a:lstStyle/>
+          <a:p>
+            <a:r>
+              <a:rPr lang="zh-CN" altLang="en-US" dirty="0"/>
+              <a:t>根据</a:t>
+            </a:r>
+            <a:r>
+              <a:rPr lang="en-US" altLang="zh-CN" dirty="0"/>
+              <a:t>feature</a:t>
+            </a:r>
+            <a:r>
+              <a:rPr lang="zh-CN" altLang="en-US" dirty="0"/>
+              <a:t> </a:t>
+            </a:r>
+            <a:r>
+              <a:rPr lang="en-US" altLang="zh-CN" dirty="0"/>
+              <a:t>map</a:t>
+            </a:r>
+            <a:r>
+              <a:rPr lang="zh-CN" altLang="en-US" dirty="0"/>
+              <a:t>激活的情况，选择了</a:t>
+            </a:r>
+            <a:r>
+              <a:rPr lang="en-US" altLang="zh-CN" dirty="0"/>
+              <a:t>low layer 6</a:t>
+            </a:r>
+            <a:r>
+              <a:rPr lang="zh-CN" altLang="en-US" dirty="0"/>
+              <a:t>号</a:t>
+            </a:r>
+            <a:r>
+              <a:rPr lang="en-US" altLang="zh-CN" dirty="0"/>
+              <a:t>filter</a:t>
+            </a:r>
+            <a:r>
+              <a:rPr lang="zh-CN" altLang="en-US" dirty="0"/>
+              <a:t>来分析，做了</a:t>
+            </a:r>
+            <a:r>
+              <a:rPr lang="en-US" altLang="zh-CN" dirty="0"/>
+              <a:t>103</a:t>
+            </a:r>
+            <a:r>
+              <a:rPr lang="zh-CN" altLang="en-US" dirty="0"/>
+              <a:t>实验。优化不出任何东西。</a:t>
+            </a:r>
+            <a:endParaRPr lang="en-US" dirty="0"/>
+          </a:p>
+        </p:txBody>
+      </p:sp>
+      <p:sp>
+        <p:nvSpPr>
+          <p:cNvPr id="4" name="Date Placeholder 3">
+            <a:extLst>
+              <a:ext uri="{FF2B5EF4-FFF2-40B4-BE49-F238E27FC236}">
+                <a16:creationId xmlns:a16="http://schemas.microsoft.com/office/drawing/2014/main" id="{D4F46E80-CB5D-2846-B36E-EE50A34F84C8}"/>
+              </a:ext>
+            </a:extLst>
+          </p:cNvPr>
+          <p:cNvSpPr>
+            <a:spLocks noGrp="1"/>
+          </p:cNvSpPr>
+          <p:nvPr>
+            <p:ph type="dt" sz="half" idx="10"/>
+          </p:nvPr>
+        </p:nvSpPr>
+        <p:spPr/>
+        <p:txBody>
+          <a:bodyPr/>
+          <a:lstStyle/>
+          <a:p>
+            <a:fld id="{D483111E-5384-4450-87E5-51B3B2328436}" type="datetime1">
+              <a:rPr lang="en-US" altLang="zh-CN" smtClean="0"/>
+              <a:t>9/24/19</a:t>
+            </a:fld>
+            <a:endParaRPr lang="en-US"/>
+          </a:p>
+        </p:txBody>
+      </p:sp>
+      <p:sp>
+        <p:nvSpPr>
+          <p:cNvPr id="5" name="Slide Number Placeholder 4">
+            <a:extLst>
+              <a:ext uri="{FF2B5EF4-FFF2-40B4-BE49-F238E27FC236}">
+                <a16:creationId xmlns:a16="http://schemas.microsoft.com/office/drawing/2014/main" id="{C733172F-CA26-D24C-A717-04495F9B2A0E}"/>
+              </a:ext>
+            </a:extLst>
+          </p:cNvPr>
+          <p:cNvSpPr>
+            <a:spLocks noGrp="1"/>
+          </p:cNvSpPr>
+          <p:nvPr>
+            <p:ph type="sldNum" sz="quarter" idx="12"/>
+          </p:nvPr>
+        </p:nvSpPr>
+        <p:spPr/>
+        <p:txBody>
+          <a:bodyPr/>
+          <a:lstStyle/>
+          <a:p>
+            <a:fld id="{93D7A402-3076-2049-A745-4823B471CC62}" type="slidenum">
+              <a:rPr lang="en-US" smtClean="0"/>
+              <a:t>17</a:t>
+            </a:fld>
+            <a:endParaRPr lang="en-US"/>
+          </a:p>
+        </p:txBody>
+      </p:sp>
+      <p:pic>
+        <p:nvPicPr>
+          <p:cNvPr id="7" name="Picture 6">
+            <a:extLst>
+              <a:ext uri="{FF2B5EF4-FFF2-40B4-BE49-F238E27FC236}">
+                <a16:creationId xmlns:a16="http://schemas.microsoft.com/office/drawing/2014/main" id="{3D7F14CC-E12E-D846-A725-4E450EFD1E82}"/>
+              </a:ext>
+            </a:extLst>
+          </p:cNvPr>
+          <p:cNvPicPr>
+            <a:picLocks noChangeAspect="1"/>
+          </p:cNvPicPr>
+          <p:nvPr/>
+        </p:nvPicPr>
+        <p:blipFill>
+          <a:blip r:embed="rId2"/>
+          <a:stretch>
+            <a:fillRect/>
+          </a:stretch>
+        </p:blipFill>
+        <p:spPr>
+          <a:xfrm>
+            <a:off x="1002270" y="2723463"/>
+            <a:ext cx="3403600" cy="3289300"/>
+          </a:xfrm>
+          <a:prstGeom prst="rect">
+            <a:avLst/>
+          </a:prstGeom>
+        </p:spPr>
+      </p:pic>
+      <p:pic>
+        <p:nvPicPr>
+          <p:cNvPr id="8" name="Picture 7">
+            <a:extLst>
+              <a:ext uri="{FF2B5EF4-FFF2-40B4-BE49-F238E27FC236}">
+                <a16:creationId xmlns:a16="http://schemas.microsoft.com/office/drawing/2014/main" id="{A19A2C39-C6CE-9E4A-87CB-FE842F341FAA}"/>
+              </a:ext>
+            </a:extLst>
+          </p:cNvPr>
+          <p:cNvPicPr>
+            <a:picLocks noChangeAspect="1"/>
+          </p:cNvPicPr>
+          <p:nvPr/>
+        </p:nvPicPr>
+        <p:blipFill>
+          <a:blip r:embed="rId3"/>
+          <a:stretch>
+            <a:fillRect/>
+          </a:stretch>
+        </p:blipFill>
+        <p:spPr>
+          <a:xfrm>
+            <a:off x="4509532" y="3429000"/>
+            <a:ext cx="6553200" cy="1600200"/>
+          </a:xfrm>
+          <a:prstGeom prst="rect">
+            <a:avLst/>
+          </a:prstGeom>
+        </p:spPr>
+      </p:pic>
+    </p:spTree>
+    <p:extLst>
+      <p:ext uri="{BB962C8B-B14F-4D97-AF65-F5344CB8AC3E}">
+        <p14:creationId xmlns:p14="http://schemas.microsoft.com/office/powerpoint/2010/main" val="3181450666"/>
+      </p:ext>
+    </p:extLst>
+  </p:cSld>
+  <p:clrMapOvr>
+    <a:masterClrMapping/>
+  </p:clrMapOvr>
+</p:sld>
+</file>
+
+<file path=ppt/slides/slide18.xml><?xml version="1.0" encoding="utf-8"?>
+<p:sld xmlns:a="http://schemas.openxmlformats.org/drawingml/2006/main" xmlns:r="http://schemas.openxmlformats.org/officeDocument/2006/relationships" xmlns:p="http://schemas.openxmlformats.org/presentationml/2006/main">
+  <p:cSld>
+    <p:spTree>
+      <p:nvGrpSpPr>
+        <p:cNvPr id="1" name=""/>
+        <p:cNvGrpSpPr/>
+        <p:nvPr/>
+      </p:nvGrpSpPr>
+      <p:grpSpPr>
+        <a:xfrm>
+          <a:off x="0" y="0"/>
+          <a:ext cx="0" cy="0"/>
+          <a:chOff x="0" y="0"/>
+          <a:chExt cx="0" cy="0"/>
+        </a:xfrm>
+      </p:grpSpPr>
+      <p:sp>
+        <p:nvSpPr>
+          <p:cNvPr id="2" name="Title 1">
+            <a:extLst>
+              <a:ext uri="{FF2B5EF4-FFF2-40B4-BE49-F238E27FC236}">
+                <a16:creationId xmlns:a16="http://schemas.microsoft.com/office/drawing/2014/main" id="{C7AD168B-F31C-F24B-A01A-D6C41301391F}"/>
+              </a:ext>
+            </a:extLst>
+          </p:cNvPr>
+          <p:cNvSpPr>
+            <a:spLocks noGrp="1"/>
+          </p:cNvSpPr>
+          <p:nvPr>
+            <p:ph type="title"/>
+          </p:nvPr>
+        </p:nvSpPr>
+        <p:spPr/>
+        <p:txBody>
+          <a:bodyPr/>
+          <a:lstStyle/>
+          <a:p>
+            <a:r>
+              <a:rPr lang="en-US" dirty="0"/>
+              <a:t>JX</a:t>
+            </a:r>
+            <a:r>
+              <a:rPr lang="en-US" altLang="zh-CN" dirty="0"/>
+              <a:t>-</a:t>
+            </a:r>
+            <a:r>
+              <a:rPr lang="zh-CN" altLang="en-US" dirty="0"/>
+              <a:t>可视化</a:t>
+            </a:r>
+            <a:r>
+              <a:rPr lang="en-US" altLang="zh-CN" dirty="0"/>
+              <a:t>feature map-</a:t>
+            </a:r>
+            <a:r>
+              <a:rPr lang="zh-CN" altLang="en-US" dirty="0">
+                <a:solidFill>
+                  <a:srgbClr val="FF0000"/>
+                </a:solidFill>
+              </a:rPr>
+              <a:t>结果分析（</a:t>
+            </a:r>
+            <a:r>
+              <a:rPr lang="en-US" altLang="zh-CN" dirty="0">
+                <a:solidFill>
+                  <a:srgbClr val="FF0000"/>
+                </a:solidFill>
+              </a:rPr>
+              <a:t>5</a:t>
+            </a:r>
+            <a:r>
+              <a:rPr lang="zh-CN" altLang="en-US" dirty="0">
+                <a:solidFill>
+                  <a:srgbClr val="FF0000"/>
+                </a:solidFill>
+              </a:rPr>
+              <a:t>）</a:t>
+            </a:r>
+            <a:endParaRPr lang="en-US" dirty="0">
+              <a:solidFill>
+                <a:srgbClr val="FF0000"/>
+              </a:solidFill>
+            </a:endParaRPr>
+          </a:p>
+        </p:txBody>
+      </p:sp>
+      <p:sp>
+        <p:nvSpPr>
+          <p:cNvPr id="3" name="Content Placeholder 2">
+            <a:extLst>
+              <a:ext uri="{FF2B5EF4-FFF2-40B4-BE49-F238E27FC236}">
+                <a16:creationId xmlns:a16="http://schemas.microsoft.com/office/drawing/2014/main" id="{081D77C2-CD68-8944-AB87-3A854D1C32EC}"/>
+              </a:ext>
+            </a:extLst>
+          </p:cNvPr>
+          <p:cNvSpPr>
+            <a:spLocks noGrp="1"/>
+          </p:cNvSpPr>
+          <p:nvPr>
+            <p:ph idx="1"/>
+          </p:nvPr>
+        </p:nvSpPr>
+        <p:spPr/>
+        <p:txBody>
+          <a:bodyPr>
+            <a:normAutofit/>
+          </a:bodyPr>
+          <a:lstStyle/>
+          <a:p>
+            <a:r>
+              <a:rPr lang="zh-CN" altLang="en-US" dirty="0"/>
+              <a:t>可视化的结果可能不一定能正确反应数据的分布，要不要考虑使用</a:t>
+            </a:r>
+            <a:r>
+              <a:rPr lang="en-US" altLang="zh-CN" dirty="0"/>
+              <a:t>seaborn</a:t>
+            </a:r>
+            <a:r>
+              <a:rPr lang="zh-CN" altLang="en-US" dirty="0"/>
+              <a:t>之类的将数据分布</a:t>
+            </a:r>
+            <a:r>
+              <a:rPr lang="zh-CN" altLang="en-US"/>
+              <a:t>显示出来？</a:t>
+            </a:r>
+            <a:endParaRPr lang="en-US" dirty="0"/>
+          </a:p>
+        </p:txBody>
+      </p:sp>
+      <p:sp>
+        <p:nvSpPr>
+          <p:cNvPr id="4" name="Date Placeholder 3">
+            <a:extLst>
+              <a:ext uri="{FF2B5EF4-FFF2-40B4-BE49-F238E27FC236}">
+                <a16:creationId xmlns:a16="http://schemas.microsoft.com/office/drawing/2014/main" id="{D4F46E80-CB5D-2846-B36E-EE50A34F84C8}"/>
+              </a:ext>
+            </a:extLst>
+          </p:cNvPr>
+          <p:cNvSpPr>
+            <a:spLocks noGrp="1"/>
+          </p:cNvSpPr>
+          <p:nvPr>
+            <p:ph type="dt" sz="half" idx="10"/>
+          </p:nvPr>
+        </p:nvSpPr>
+        <p:spPr/>
+        <p:txBody>
+          <a:bodyPr/>
+          <a:lstStyle/>
+          <a:p>
+            <a:fld id="{D483111E-5384-4450-87E5-51B3B2328436}" type="datetime1">
+              <a:rPr lang="en-US" altLang="zh-CN" smtClean="0"/>
+              <a:t>9/24/19</a:t>
+            </a:fld>
+            <a:endParaRPr lang="en-US"/>
+          </a:p>
+        </p:txBody>
+      </p:sp>
+      <p:sp>
+        <p:nvSpPr>
+          <p:cNvPr id="5" name="Slide Number Placeholder 4">
+            <a:extLst>
+              <a:ext uri="{FF2B5EF4-FFF2-40B4-BE49-F238E27FC236}">
+                <a16:creationId xmlns:a16="http://schemas.microsoft.com/office/drawing/2014/main" id="{C733172F-CA26-D24C-A717-04495F9B2A0E}"/>
+              </a:ext>
+            </a:extLst>
+          </p:cNvPr>
+          <p:cNvSpPr>
+            <a:spLocks noGrp="1"/>
+          </p:cNvSpPr>
+          <p:nvPr>
+            <p:ph type="sldNum" sz="quarter" idx="12"/>
+          </p:nvPr>
+        </p:nvSpPr>
+        <p:spPr/>
+        <p:txBody>
+          <a:bodyPr/>
+          <a:lstStyle/>
+          <a:p>
+            <a:fld id="{93D7A402-3076-2049-A745-4823B471CC62}" type="slidenum">
+              <a:rPr lang="en-US" smtClean="0"/>
+              <a:t>18</a:t>
+            </a:fld>
+            <a:endParaRPr lang="en-US"/>
+          </a:p>
+        </p:txBody>
+      </p:sp>
+    </p:spTree>
+    <p:extLst>
+      <p:ext uri="{BB962C8B-B14F-4D97-AF65-F5344CB8AC3E}">
+        <p14:creationId xmlns:p14="http://schemas.microsoft.com/office/powerpoint/2010/main" val="920862445"/>
+      </p:ext>
+    </p:extLst>
+  </p:cSld>
+  <p:clrMapOvr>
+    <a:masterClrMapping/>
+  </p:clrMapOvr>
+</p:sld>
+</file>
+
+<file path=ppt/slides/slide19.xml><?xml version="1.0" encoding="utf-8"?>
+<p:sld xmlns:a="http://schemas.openxmlformats.org/drawingml/2006/main" xmlns:r="http://schemas.openxmlformats.org/officeDocument/2006/relationships" xmlns:p="http://schemas.openxmlformats.org/presentationml/2006/main">
+  <p:cSld>
+    <p:spTree>
+      <p:nvGrpSpPr>
+        <p:cNvPr id="1" name=""/>
+        <p:cNvGrpSpPr/>
+        <p:nvPr/>
+      </p:nvGrpSpPr>
+      <p:grpSpPr>
+        <a:xfrm>
+          <a:off x="0" y="0"/>
+          <a:ext cx="0" cy="0"/>
+          <a:chOff x="0" y="0"/>
+          <a:chExt cx="0" cy="0"/>
+        </a:xfrm>
+      </p:grpSpPr>
+      <p:sp>
+        <p:nvSpPr>
+          <p:cNvPr id="2" name="Title 1">
+            <a:extLst>
+              <a:ext uri="{FF2B5EF4-FFF2-40B4-BE49-F238E27FC236}">
+                <a16:creationId xmlns:a16="http://schemas.microsoft.com/office/drawing/2014/main" id="{C7AD168B-F31C-F24B-A01A-D6C41301391F}"/>
+              </a:ext>
+            </a:extLst>
+          </p:cNvPr>
+          <p:cNvSpPr>
+            <a:spLocks noGrp="1"/>
+          </p:cNvSpPr>
+          <p:nvPr>
+            <p:ph type="title"/>
+          </p:nvPr>
+        </p:nvSpPr>
+        <p:spPr/>
+        <p:txBody>
+          <a:bodyPr/>
+          <a:lstStyle/>
+          <a:p>
+            <a:r>
+              <a:rPr lang="en-US" dirty="0"/>
+              <a:t>JX</a:t>
+            </a:r>
+            <a:r>
+              <a:rPr lang="en-US" altLang="zh-CN" dirty="0"/>
+              <a:t>-</a:t>
+            </a:r>
+            <a:r>
+              <a:rPr lang="zh-CN" altLang="en-US" dirty="0"/>
+              <a:t>损失函数的范数</a:t>
+            </a:r>
+            <a:endParaRPr lang="en-US" dirty="0"/>
+          </a:p>
+        </p:txBody>
+      </p:sp>
+      <p:sp>
+        <p:nvSpPr>
+          <p:cNvPr id="3" name="Content Placeholder 2">
+            <a:extLst>
+              <a:ext uri="{FF2B5EF4-FFF2-40B4-BE49-F238E27FC236}">
+                <a16:creationId xmlns:a16="http://schemas.microsoft.com/office/drawing/2014/main" id="{081D77C2-CD68-8944-AB87-3A854D1C32EC}"/>
+              </a:ext>
+            </a:extLst>
+          </p:cNvPr>
+          <p:cNvSpPr>
+            <a:spLocks noGrp="1"/>
+          </p:cNvSpPr>
+          <p:nvPr>
+            <p:ph idx="1"/>
+          </p:nvPr>
+        </p:nvSpPr>
+        <p:spPr/>
+        <p:txBody>
+          <a:bodyPr/>
+          <a:lstStyle/>
+          <a:p>
+            <a:r>
+              <a:rPr lang="zh-CN" altLang="en-US" dirty="0"/>
+              <a:t>损失函数的范数可以尝试</a:t>
+            </a:r>
+            <a:r>
+              <a:rPr lang="en-US" altLang="zh-CN" dirty="0"/>
+              <a:t>L2</a:t>
+            </a:r>
+            <a:r>
+              <a:rPr lang="zh-CN" altLang="en-US" dirty="0"/>
+              <a:t>或者</a:t>
+            </a:r>
+            <a:r>
+              <a:rPr lang="en-US" altLang="zh-CN" dirty="0"/>
+              <a:t>L1, </a:t>
+            </a:r>
+            <a:r>
+              <a:rPr lang="zh-CN" altLang="en-US" dirty="0"/>
+              <a:t>需要通过实验比较其意义</a:t>
+            </a:r>
+            <a:endParaRPr lang="en-US" altLang="zh-CN" dirty="0"/>
+          </a:p>
+          <a:p>
+            <a:r>
+              <a:rPr lang="zh-CN" altLang="en-US" dirty="0"/>
+              <a:t>在</a:t>
+            </a:r>
+            <a:r>
+              <a:rPr lang="en-US" altLang="zh-CN" dirty="0" err="1"/>
+              <a:t>config.py</a:t>
+            </a:r>
+            <a:r>
+              <a:rPr lang="zh-CN" altLang="en-US" dirty="0"/>
+              <a:t>中增加该选项</a:t>
+            </a:r>
+            <a:endParaRPr lang="en-US" altLang="zh-CN" dirty="0"/>
+          </a:p>
+        </p:txBody>
+      </p:sp>
+      <p:sp>
+        <p:nvSpPr>
+          <p:cNvPr id="4" name="Date Placeholder 3">
+            <a:extLst>
+              <a:ext uri="{FF2B5EF4-FFF2-40B4-BE49-F238E27FC236}">
+                <a16:creationId xmlns:a16="http://schemas.microsoft.com/office/drawing/2014/main" id="{D4F46E80-CB5D-2846-B36E-EE50A34F84C8}"/>
+              </a:ext>
+            </a:extLst>
+          </p:cNvPr>
+          <p:cNvSpPr>
+            <a:spLocks noGrp="1"/>
+          </p:cNvSpPr>
+          <p:nvPr>
+            <p:ph type="dt" sz="half" idx="10"/>
+          </p:nvPr>
+        </p:nvSpPr>
+        <p:spPr/>
+        <p:txBody>
+          <a:bodyPr/>
+          <a:lstStyle/>
+          <a:p>
+            <a:fld id="{D483111E-5384-4450-87E5-51B3B2328436}" type="datetime1">
+              <a:rPr lang="en-US" altLang="zh-CN" smtClean="0"/>
+              <a:t>9/24/19</a:t>
+            </a:fld>
+            <a:endParaRPr lang="en-US"/>
+          </a:p>
+        </p:txBody>
+      </p:sp>
+      <p:sp>
+        <p:nvSpPr>
+          <p:cNvPr id="5" name="Slide Number Placeholder 4">
+            <a:extLst>
+              <a:ext uri="{FF2B5EF4-FFF2-40B4-BE49-F238E27FC236}">
+                <a16:creationId xmlns:a16="http://schemas.microsoft.com/office/drawing/2014/main" id="{C733172F-CA26-D24C-A717-04495F9B2A0E}"/>
+              </a:ext>
+            </a:extLst>
+          </p:cNvPr>
+          <p:cNvSpPr>
+            <a:spLocks noGrp="1"/>
+          </p:cNvSpPr>
+          <p:nvPr>
+            <p:ph type="sldNum" sz="quarter" idx="12"/>
+          </p:nvPr>
+        </p:nvSpPr>
+        <p:spPr/>
+        <p:txBody>
+          <a:bodyPr/>
+          <a:lstStyle/>
+          <a:p>
+            <a:fld id="{93D7A402-3076-2049-A745-4823B471CC62}" type="slidenum">
+              <a:rPr lang="en-US" smtClean="0"/>
+              <a:t>19</a:t>
             </a:fld>
             <a:endParaRPr lang="en-US"/>
           </a:p>
@@ -4832,7 +6490,7 @@
           <a:p>
             <a:fld id="{C563B692-CE74-499F-9357-A4F8D07A9D42}" type="datetime1">
               <a:rPr lang="en-US" altLang="zh-CN" smtClean="0"/>
-              <a:t>9/23/19</a:t>
+              <a:t>9/24/19</a:t>
             </a:fld>
             <a:endParaRPr lang="en-US"/>
           </a:p>
@@ -5276,7 +6934,7 @@
           <a:p>
             <a:fld id="{A871C4F0-1127-448D-8D03-CE814C5D2706}" type="datetime1">
               <a:rPr lang="en-US" altLang="zh-CN" smtClean="0"/>
-              <a:t>9/23/19</a:t>
+              <a:t>9/24/19</a:t>
             </a:fld>
             <a:endParaRPr lang="en-US"/>
           </a:p>
@@ -6091,7 +7749,7 @@
           <a:p>
             <a:fld id="{1255B269-F348-439F-A6D0-CBB90A314411}" type="datetime1">
               <a:rPr lang="en-US" altLang="zh-CN" smtClean="0"/>
-              <a:t>9/23/19</a:t>
+              <a:t>9/24/19</a:t>
             </a:fld>
             <a:endParaRPr lang="en-US"/>
           </a:p>
@@ -6482,7 +8140,7 @@
           <a:p>
             <a:fld id="{CF64532A-7BDE-40DC-A051-D57142ED605E}" type="datetime1">
               <a:rPr lang="en-US" altLang="zh-CN" smtClean="0"/>
-              <a:t>9/23/19</a:t>
+              <a:t>9/24/19</a:t>
             </a:fld>
             <a:endParaRPr lang="en-US"/>
           </a:p>
@@ -6707,7 +8365,7 @@
           <a:p>
             <a:fld id="{57C153ED-CC8E-4B72-9AF7-5F1AF4B98566}" type="datetime1">
               <a:rPr lang="en-US" altLang="zh-CN" smtClean="0"/>
-              <a:t>9/23/19</a:t>
+              <a:t>9/24/19</a:t>
             </a:fld>
             <a:endParaRPr lang="en-US"/>
           </a:p>
@@ -6948,7 +8606,7 @@
           <a:p>
             <a:fld id="{BF677F50-21D8-40BE-B8F0-B2270733CF6B}" type="datetime1">
               <a:rPr lang="en-US" altLang="zh-CN" smtClean="0"/>
-              <a:t>9/23/19</a:t>
+              <a:t>9/24/19</a:t>
             </a:fld>
             <a:endParaRPr lang="en-US" dirty="0"/>
           </a:p>
@@ -7233,7 +8891,7 @@
           <a:p>
             <a:fld id="{BF677F50-21D8-40BE-B8F0-B2270733CF6B}" type="datetime1">
               <a:rPr lang="en-US" altLang="zh-CN" smtClean="0"/>
-              <a:t>9/23/19</a:t>
+              <a:t>9/24/19</a:t>
             </a:fld>
             <a:endParaRPr lang="en-US"/>
           </a:p>
@@ -7434,7 +9092,7 @@
           <a:p>
             <a:fld id="{BF677F50-21D8-40BE-B8F0-B2270733CF6B}" type="datetime1">
               <a:rPr lang="en-US" altLang="zh-CN" smtClean="0"/>
-              <a:t>9/23/19</a:t>
+              <a:t>9/24/19</a:t>
             </a:fld>
             <a:endParaRPr lang="en-US"/>
           </a:p>

</xml_diff>